<commit_message>
Adicionados Mockups ao power point
Mockups
</commit_message>
<xml_diff>
--- a/UBI_CompWeb_2018_templates.pptx
+++ b/UBI_CompWeb_2018_templates.pptx
@@ -5,7 +5,7 @@
     <p:sldMasterId id="2147483660" r:id="rId1"/>
   </p:sldMasterIdLst>
   <p:notesMasterIdLst>
-    <p:notesMasterId r:id="rId16"/>
+    <p:notesMasterId r:id="rId12"/>
   </p:notesMasterIdLst>
   <p:sldIdLst>
     <p:sldId id="256" r:id="rId2"/>
@@ -14,14 +14,10 @@
     <p:sldId id="261" r:id="rId5"/>
     <p:sldId id="263" r:id="rId6"/>
     <p:sldId id="262" r:id="rId7"/>
-    <p:sldId id="264" r:id="rId8"/>
-    <p:sldId id="265" r:id="rId9"/>
-    <p:sldId id="266" r:id="rId10"/>
-    <p:sldId id="267" r:id="rId11"/>
-    <p:sldId id="268" r:id="rId12"/>
-    <p:sldId id="269" r:id="rId13"/>
-    <p:sldId id="270" r:id="rId14"/>
-    <p:sldId id="271" r:id="rId15"/>
+    <p:sldId id="265" r:id="rId8"/>
+    <p:sldId id="266" r:id="rId9"/>
+    <p:sldId id="267" r:id="rId10"/>
+    <p:sldId id="268" r:id="rId11"/>
   </p:sldIdLst>
   <p:sldSz cx="9144000" cy="6858000" type="screen4x3"/>
   <p:notesSz cx="6858000" cy="9144000"/>
@@ -11170,7 +11166,7 @@
           <a:p>
             <a:fld id="{FE46BE1C-E5B9-40EB-B480-3B6CCE635393}" type="datetimeFigureOut">
               <a:rPr lang="en-GB" smtClean="0"/>
-              <a:t>12/12/2018</a:t>
+              <a:t>29/12/2018</a:t>
             </a:fld>
             <a:endParaRPr lang="en-GB"/>
           </a:p>
@@ -12322,7 +12318,7 @@
           <a:p>
             <a:fld id="{46E4206C-CDB6-49DB-A49C-1C74FE4EA3F6}" type="datetime1">
               <a:rPr lang="en-GB" smtClean="0"/>
-              <a:t>12/12/2018</a:t>
+              <a:t>29/12/2018</a:t>
             </a:fld>
             <a:endParaRPr lang="en-GB"/>
           </a:p>
@@ -12492,7 +12488,7 @@
           <a:p>
             <a:fld id="{EC42A3EE-7AFB-4F73-B39D-FB9AAAE09D70}" type="datetime1">
               <a:rPr lang="en-GB" smtClean="0"/>
-              <a:t>12/12/2018</a:t>
+              <a:t>29/12/2018</a:t>
             </a:fld>
             <a:endParaRPr lang="en-GB"/>
           </a:p>
@@ -12672,7 +12668,7 @@
           <a:p>
             <a:fld id="{297491F8-B1AD-48C8-B450-A9DE8FC9B4BC}" type="datetime1">
               <a:rPr lang="en-GB" smtClean="0"/>
-              <a:t>12/12/2018</a:t>
+              <a:t>29/12/2018</a:t>
             </a:fld>
             <a:endParaRPr lang="en-GB"/>
           </a:p>
@@ -13574,7 +13570,7 @@
           <a:p>
             <a:fld id="{1241B6BE-13A3-40C5-BAF7-2CC773D00FB0}" type="datetime1">
               <a:rPr lang="en-GB" smtClean="0"/>
-              <a:t>12/12/2018</a:t>
+              <a:t>29/12/2018</a:t>
             </a:fld>
             <a:endParaRPr lang="en-GB"/>
           </a:p>
@@ -13818,7 +13814,7 @@
           <a:p>
             <a:fld id="{30A9CCEB-FEAA-4C72-9118-04BDF5966FFB}" type="datetime1">
               <a:rPr lang="en-GB" smtClean="0"/>
-              <a:t>12/12/2018</a:t>
+              <a:t>29/12/2018</a:t>
             </a:fld>
             <a:endParaRPr lang="en-GB"/>
           </a:p>
@@ -14050,7 +14046,7 @@
           <a:p>
             <a:fld id="{DFAB555E-071C-48B6-AB80-445E4540AC68}" type="datetime1">
               <a:rPr lang="en-GB" smtClean="0"/>
-              <a:t>12/12/2018</a:t>
+              <a:t>29/12/2018</a:t>
             </a:fld>
             <a:endParaRPr lang="en-GB"/>
           </a:p>
@@ -14417,7 +14413,7 @@
           <a:p>
             <a:fld id="{71C8195A-F236-4C56-A7B6-A9E3130AE1F9}" type="datetime1">
               <a:rPr lang="en-GB" smtClean="0"/>
-              <a:t>12/12/2018</a:t>
+              <a:t>29/12/2018</a:t>
             </a:fld>
             <a:endParaRPr lang="en-GB"/>
           </a:p>
@@ -14535,7 +14531,7 @@
           <a:p>
             <a:fld id="{2F2BBF01-7E4A-4B0A-98AA-6A611EFD036E}" type="datetime1">
               <a:rPr lang="en-GB" smtClean="0"/>
-              <a:t>12/12/2018</a:t>
+              <a:t>29/12/2018</a:t>
             </a:fld>
             <a:endParaRPr lang="en-GB"/>
           </a:p>
@@ -14630,7 +14626,7 @@
           <a:p>
             <a:fld id="{6EBF66CE-A945-42FA-B1CB-E96DCD998F84}" type="datetime1">
               <a:rPr lang="en-GB" smtClean="0"/>
-              <a:t>12/12/2018</a:t>
+              <a:t>29/12/2018</a:t>
             </a:fld>
             <a:endParaRPr lang="en-GB"/>
           </a:p>
@@ -14907,7 +14903,7 @@
           <a:p>
             <a:fld id="{8E2C1C88-A111-4B14-B38C-BDD24B4F2065}" type="datetime1">
               <a:rPr lang="en-GB" smtClean="0"/>
-              <a:t>12/12/2018</a:t>
+              <a:t>29/12/2018</a:t>
             </a:fld>
             <a:endParaRPr lang="en-GB"/>
           </a:p>
@@ -15164,7 +15160,7 @@
           <a:p>
             <a:fld id="{A033B5E6-D2E8-4024-8FEA-9A34E9CC2096}" type="datetime1">
               <a:rPr lang="en-GB" smtClean="0"/>
-              <a:t>12/12/2018</a:t>
+              <a:t>29/12/2018</a:t>
             </a:fld>
             <a:endParaRPr lang="en-GB"/>
           </a:p>
@@ -15376,7 +15372,7 @@
           <a:p>
             <a:fld id="{86124722-C52C-4725-B554-5890676B8B27}" type="datetime1">
               <a:rPr lang="en-GB" smtClean="0"/>
-              <a:t>12/12/2018</a:t>
+              <a:t>29/12/2018</a:t>
             </a:fld>
             <a:endParaRPr lang="en-GB"/>
           </a:p>
@@ -16648,31 +16644,41 @@
           </a:p>
         </p:txBody>
       </p:sp>
-      <p:sp>
-        <p:nvSpPr>
-          <p:cNvPr id="4" name="Content Placeholder 3">
+      <p:pic>
+        <p:nvPicPr>
+          <p:cNvPr id="8" name="Marcador de Posição de Conteúdo 7">
             <a:extLst>
               <a:ext uri="{FF2B5EF4-FFF2-40B4-BE49-F238E27FC236}">
-                <a16:creationId xmlns:a16="http://schemas.microsoft.com/office/drawing/2014/main" id="{B573A8A9-0BDE-4B35-955D-A5C9FAFE6755}"/>
+                <a16:creationId xmlns:a16="http://schemas.microsoft.com/office/drawing/2014/main" id="{D57307F2-761F-454D-9762-EAF356FCC061}"/>
               </a:ext>
             </a:extLst>
           </p:cNvPr>
-          <p:cNvSpPr>
-            <a:spLocks noGrp="1"/>
-          </p:cNvSpPr>
+          <p:cNvPicPr>
+            <a:picLocks noGrp="1" noChangeAspect="1"/>
+          </p:cNvPicPr>
           <p:nvPr>
             <p:ph idx="11"/>
           </p:nvPr>
-        </p:nvSpPr>
-        <p:spPr/>
-        <p:txBody>
-          <a:bodyPr/>
-          <a:lstStyle/>
-          <a:p>
-            <a:endParaRPr lang="pt-PT" dirty="0"/>
-          </a:p>
-        </p:txBody>
-      </p:sp>
+        </p:nvPicPr>
+        <p:blipFill>
+          <a:blip r:embed="rId2">
+            <a:extLst>
+              <a:ext uri="{28A0092B-C50C-407E-A947-70E740481C1C}">
+                <a14:useLocalDpi xmlns:a14="http://schemas.microsoft.com/office/drawing/2010/main" val="0"/>
+              </a:ext>
+            </a:extLst>
+          </a:blip>
+          <a:stretch>
+            <a:fillRect/>
+          </a:stretch>
+        </p:blipFill>
+        <p:spPr>
+          <a:xfrm>
+            <a:off x="1967430" y="684213"/>
+            <a:ext cx="3367639" cy="3194050"/>
+          </a:xfrm>
+        </p:spPr>
+      </p:pic>
       <p:sp>
         <p:nvSpPr>
           <p:cNvPr id="5" name="Content Placeholder 4">
@@ -16721,166 +16727,14 @@
           <a:p>
             <a:r>
               <a:rPr lang="pt-PT" dirty="0"/>
-              <a:t>Início</a:t>
+              <a:t>Contactos</a:t>
             </a:r>
           </a:p>
-        </p:txBody>
-      </p:sp>
-    </p:spTree>
-    <p:extLst>
-      <p:ext uri="{BB962C8B-B14F-4D97-AF65-F5344CB8AC3E}">
-        <p14:creationId xmlns:p14="http://schemas.microsoft.com/office/powerpoint/2010/main" val="1324516063"/>
-      </p:ext>
-    </p:extLst>
-  </p:cSld>
-  <p:clrMapOvr>
-    <a:masterClrMapping/>
-  </p:clrMapOvr>
-</p:sld>
-</file>
-
-<file path=ppt/slides/slide11.xml><?xml version="1.0" encoding="utf-8"?>
-<p:sld xmlns:a="http://schemas.openxmlformats.org/drawingml/2006/main" xmlns:r="http://schemas.openxmlformats.org/officeDocument/2006/relationships" xmlns:p="http://schemas.openxmlformats.org/presentationml/2006/main">
-  <p:cSld>
-    <p:spTree>
-      <p:nvGrpSpPr>
-        <p:cNvPr id="1" name=""/>
-        <p:cNvGrpSpPr/>
-        <p:nvPr/>
-      </p:nvGrpSpPr>
-      <p:grpSpPr>
-        <a:xfrm>
-          <a:off x="0" y="0"/>
-          <a:ext cx="0" cy="0"/>
-          <a:chOff x="0" y="0"/>
-          <a:chExt cx="0" cy="0"/>
-        </a:xfrm>
-      </p:grpSpPr>
-      <p:sp>
-        <p:nvSpPr>
-          <p:cNvPr id="2" name="Content Placeholder 1">
-            <a:extLst>
-              <a:ext uri="{FF2B5EF4-FFF2-40B4-BE49-F238E27FC236}">
-                <a16:creationId xmlns:a16="http://schemas.microsoft.com/office/drawing/2014/main" id="{61284A3C-35C7-47BB-B5EF-3A5AFD39F048}"/>
-              </a:ext>
-            </a:extLst>
-          </p:cNvPr>
-          <p:cNvSpPr>
-            <a:spLocks noGrp="1"/>
-          </p:cNvSpPr>
-          <p:nvPr>
-            <p:ph idx="1"/>
-          </p:nvPr>
-        </p:nvSpPr>
-        <p:spPr/>
-        <p:txBody>
-          <a:bodyPr/>
-          <a:lstStyle/>
           <a:p>
+            <a:pPr marL="0" indent="0">
+              <a:buNone/>
+            </a:pPr>
             <a:endParaRPr lang="pt-PT" dirty="0"/>
-          </a:p>
-        </p:txBody>
-      </p:sp>
-      <p:sp>
-        <p:nvSpPr>
-          <p:cNvPr id="3" name="Content Placeholder 2">
-            <a:extLst>
-              <a:ext uri="{FF2B5EF4-FFF2-40B4-BE49-F238E27FC236}">
-                <a16:creationId xmlns:a16="http://schemas.microsoft.com/office/drawing/2014/main" id="{75B62007-2099-491F-B9CC-679828859075}"/>
-              </a:ext>
-            </a:extLst>
-          </p:cNvPr>
-          <p:cNvSpPr>
-            <a:spLocks noGrp="1"/>
-          </p:cNvSpPr>
-          <p:nvPr>
-            <p:ph idx="10"/>
-          </p:nvPr>
-        </p:nvSpPr>
-        <p:spPr/>
-        <p:txBody>
-          <a:bodyPr/>
-          <a:lstStyle/>
-          <a:p>
-            <a:endParaRPr lang="pt-PT" dirty="0"/>
-          </a:p>
-        </p:txBody>
-      </p:sp>
-      <p:sp>
-        <p:nvSpPr>
-          <p:cNvPr id="4" name="Content Placeholder 3">
-            <a:extLst>
-              <a:ext uri="{FF2B5EF4-FFF2-40B4-BE49-F238E27FC236}">
-                <a16:creationId xmlns:a16="http://schemas.microsoft.com/office/drawing/2014/main" id="{B573A8A9-0BDE-4B35-955D-A5C9FAFE6755}"/>
-              </a:ext>
-            </a:extLst>
-          </p:cNvPr>
-          <p:cNvSpPr>
-            <a:spLocks noGrp="1"/>
-          </p:cNvSpPr>
-          <p:nvPr>
-            <p:ph idx="11"/>
-          </p:nvPr>
-        </p:nvSpPr>
-        <p:spPr/>
-        <p:txBody>
-          <a:bodyPr/>
-          <a:lstStyle/>
-          <a:p>
-            <a:endParaRPr lang="pt-PT" dirty="0"/>
-          </a:p>
-        </p:txBody>
-      </p:sp>
-      <p:sp>
-        <p:nvSpPr>
-          <p:cNvPr id="5" name="Content Placeholder 4">
-            <a:extLst>
-              <a:ext uri="{FF2B5EF4-FFF2-40B4-BE49-F238E27FC236}">
-                <a16:creationId xmlns:a16="http://schemas.microsoft.com/office/drawing/2014/main" id="{03F0B0E7-9DC5-4E64-84FC-E41A42350BE1}"/>
-              </a:ext>
-            </a:extLst>
-          </p:cNvPr>
-          <p:cNvSpPr>
-            <a:spLocks noGrp="1"/>
-          </p:cNvSpPr>
-          <p:nvPr>
-            <p:ph idx="12"/>
-          </p:nvPr>
-        </p:nvSpPr>
-        <p:spPr/>
-        <p:txBody>
-          <a:bodyPr/>
-          <a:lstStyle/>
-          <a:p>
-            <a:endParaRPr lang="pt-PT" dirty="0"/>
-          </a:p>
-        </p:txBody>
-      </p:sp>
-      <p:sp>
-        <p:nvSpPr>
-          <p:cNvPr id="6" name="Content Placeholder 5">
-            <a:extLst>
-              <a:ext uri="{FF2B5EF4-FFF2-40B4-BE49-F238E27FC236}">
-                <a16:creationId xmlns:a16="http://schemas.microsoft.com/office/drawing/2014/main" id="{AAD76EA7-FFDD-4221-8BFA-2CF2F90A53A9}"/>
-              </a:ext>
-            </a:extLst>
-          </p:cNvPr>
-          <p:cNvSpPr>
-            <a:spLocks noGrp="1"/>
-          </p:cNvSpPr>
-          <p:nvPr>
-            <p:ph idx="13"/>
-          </p:nvPr>
-        </p:nvSpPr>
-        <p:spPr/>
-        <p:txBody>
-          <a:bodyPr/>
-          <a:lstStyle/>
-          <a:p>
-            <a:r>
-              <a:rPr lang="pt-PT" dirty="0"/>
-              <a:t>Início</a:t>
-            </a:r>
           </a:p>
         </p:txBody>
       </p:sp>
@@ -16888,480 +16742,6 @@
     <p:extLst>
       <p:ext uri="{BB962C8B-B14F-4D97-AF65-F5344CB8AC3E}">
         <p14:creationId xmlns:p14="http://schemas.microsoft.com/office/powerpoint/2010/main" val="3402220871"/>
-      </p:ext>
-    </p:extLst>
-  </p:cSld>
-  <p:clrMapOvr>
-    <a:masterClrMapping/>
-  </p:clrMapOvr>
-</p:sld>
-</file>
-
-<file path=ppt/slides/slide12.xml><?xml version="1.0" encoding="utf-8"?>
-<p:sld xmlns:a="http://schemas.openxmlformats.org/drawingml/2006/main" xmlns:r="http://schemas.openxmlformats.org/officeDocument/2006/relationships" xmlns:p="http://schemas.openxmlformats.org/presentationml/2006/main">
-  <p:cSld>
-    <p:spTree>
-      <p:nvGrpSpPr>
-        <p:cNvPr id="1" name=""/>
-        <p:cNvGrpSpPr/>
-        <p:nvPr/>
-      </p:nvGrpSpPr>
-      <p:grpSpPr>
-        <a:xfrm>
-          <a:off x="0" y="0"/>
-          <a:ext cx="0" cy="0"/>
-          <a:chOff x="0" y="0"/>
-          <a:chExt cx="0" cy="0"/>
-        </a:xfrm>
-      </p:grpSpPr>
-      <p:sp>
-        <p:nvSpPr>
-          <p:cNvPr id="2" name="Content Placeholder 1">
-            <a:extLst>
-              <a:ext uri="{FF2B5EF4-FFF2-40B4-BE49-F238E27FC236}">
-                <a16:creationId xmlns:a16="http://schemas.microsoft.com/office/drawing/2014/main" id="{61284A3C-35C7-47BB-B5EF-3A5AFD39F048}"/>
-              </a:ext>
-            </a:extLst>
-          </p:cNvPr>
-          <p:cNvSpPr>
-            <a:spLocks noGrp="1"/>
-          </p:cNvSpPr>
-          <p:nvPr>
-            <p:ph idx="1"/>
-          </p:nvPr>
-        </p:nvSpPr>
-        <p:spPr/>
-        <p:txBody>
-          <a:bodyPr/>
-          <a:lstStyle/>
-          <a:p>
-            <a:endParaRPr lang="pt-PT" dirty="0"/>
-          </a:p>
-        </p:txBody>
-      </p:sp>
-      <p:sp>
-        <p:nvSpPr>
-          <p:cNvPr id="3" name="Content Placeholder 2">
-            <a:extLst>
-              <a:ext uri="{FF2B5EF4-FFF2-40B4-BE49-F238E27FC236}">
-                <a16:creationId xmlns:a16="http://schemas.microsoft.com/office/drawing/2014/main" id="{75B62007-2099-491F-B9CC-679828859075}"/>
-              </a:ext>
-            </a:extLst>
-          </p:cNvPr>
-          <p:cNvSpPr>
-            <a:spLocks noGrp="1"/>
-          </p:cNvSpPr>
-          <p:nvPr>
-            <p:ph idx="10"/>
-          </p:nvPr>
-        </p:nvSpPr>
-        <p:spPr/>
-        <p:txBody>
-          <a:bodyPr/>
-          <a:lstStyle/>
-          <a:p>
-            <a:endParaRPr lang="pt-PT" dirty="0"/>
-          </a:p>
-        </p:txBody>
-      </p:sp>
-      <p:sp>
-        <p:nvSpPr>
-          <p:cNvPr id="4" name="Content Placeholder 3">
-            <a:extLst>
-              <a:ext uri="{FF2B5EF4-FFF2-40B4-BE49-F238E27FC236}">
-                <a16:creationId xmlns:a16="http://schemas.microsoft.com/office/drawing/2014/main" id="{B573A8A9-0BDE-4B35-955D-A5C9FAFE6755}"/>
-              </a:ext>
-            </a:extLst>
-          </p:cNvPr>
-          <p:cNvSpPr>
-            <a:spLocks noGrp="1"/>
-          </p:cNvSpPr>
-          <p:nvPr>
-            <p:ph idx="11"/>
-          </p:nvPr>
-        </p:nvSpPr>
-        <p:spPr/>
-        <p:txBody>
-          <a:bodyPr/>
-          <a:lstStyle/>
-          <a:p>
-            <a:endParaRPr lang="pt-PT" dirty="0"/>
-          </a:p>
-        </p:txBody>
-      </p:sp>
-      <p:sp>
-        <p:nvSpPr>
-          <p:cNvPr id="5" name="Content Placeholder 4">
-            <a:extLst>
-              <a:ext uri="{FF2B5EF4-FFF2-40B4-BE49-F238E27FC236}">
-                <a16:creationId xmlns:a16="http://schemas.microsoft.com/office/drawing/2014/main" id="{03F0B0E7-9DC5-4E64-84FC-E41A42350BE1}"/>
-              </a:ext>
-            </a:extLst>
-          </p:cNvPr>
-          <p:cNvSpPr>
-            <a:spLocks noGrp="1"/>
-          </p:cNvSpPr>
-          <p:nvPr>
-            <p:ph idx="12"/>
-          </p:nvPr>
-        </p:nvSpPr>
-        <p:spPr/>
-        <p:txBody>
-          <a:bodyPr/>
-          <a:lstStyle/>
-          <a:p>
-            <a:endParaRPr lang="pt-PT" dirty="0"/>
-          </a:p>
-        </p:txBody>
-      </p:sp>
-      <p:sp>
-        <p:nvSpPr>
-          <p:cNvPr id="6" name="Content Placeholder 5">
-            <a:extLst>
-              <a:ext uri="{FF2B5EF4-FFF2-40B4-BE49-F238E27FC236}">
-                <a16:creationId xmlns:a16="http://schemas.microsoft.com/office/drawing/2014/main" id="{AAD76EA7-FFDD-4221-8BFA-2CF2F90A53A9}"/>
-              </a:ext>
-            </a:extLst>
-          </p:cNvPr>
-          <p:cNvSpPr>
-            <a:spLocks noGrp="1"/>
-          </p:cNvSpPr>
-          <p:nvPr>
-            <p:ph idx="13"/>
-          </p:nvPr>
-        </p:nvSpPr>
-        <p:spPr/>
-        <p:txBody>
-          <a:bodyPr/>
-          <a:lstStyle/>
-          <a:p>
-            <a:r>
-              <a:rPr lang="pt-PT" dirty="0"/>
-              <a:t>Início</a:t>
-            </a:r>
-          </a:p>
-        </p:txBody>
-      </p:sp>
-    </p:spTree>
-    <p:extLst>
-      <p:ext uri="{BB962C8B-B14F-4D97-AF65-F5344CB8AC3E}">
-        <p14:creationId xmlns:p14="http://schemas.microsoft.com/office/powerpoint/2010/main" val="4011758723"/>
-      </p:ext>
-    </p:extLst>
-  </p:cSld>
-  <p:clrMapOvr>
-    <a:masterClrMapping/>
-  </p:clrMapOvr>
-</p:sld>
-</file>
-
-<file path=ppt/slides/slide13.xml><?xml version="1.0" encoding="utf-8"?>
-<p:sld xmlns:a="http://schemas.openxmlformats.org/drawingml/2006/main" xmlns:r="http://schemas.openxmlformats.org/officeDocument/2006/relationships" xmlns:p="http://schemas.openxmlformats.org/presentationml/2006/main">
-  <p:cSld>
-    <p:spTree>
-      <p:nvGrpSpPr>
-        <p:cNvPr id="1" name=""/>
-        <p:cNvGrpSpPr/>
-        <p:nvPr/>
-      </p:nvGrpSpPr>
-      <p:grpSpPr>
-        <a:xfrm>
-          <a:off x="0" y="0"/>
-          <a:ext cx="0" cy="0"/>
-          <a:chOff x="0" y="0"/>
-          <a:chExt cx="0" cy="0"/>
-        </a:xfrm>
-      </p:grpSpPr>
-      <p:sp>
-        <p:nvSpPr>
-          <p:cNvPr id="2" name="Content Placeholder 1">
-            <a:extLst>
-              <a:ext uri="{FF2B5EF4-FFF2-40B4-BE49-F238E27FC236}">
-                <a16:creationId xmlns:a16="http://schemas.microsoft.com/office/drawing/2014/main" id="{61284A3C-35C7-47BB-B5EF-3A5AFD39F048}"/>
-              </a:ext>
-            </a:extLst>
-          </p:cNvPr>
-          <p:cNvSpPr>
-            <a:spLocks noGrp="1"/>
-          </p:cNvSpPr>
-          <p:nvPr>
-            <p:ph idx="1"/>
-          </p:nvPr>
-        </p:nvSpPr>
-        <p:spPr/>
-        <p:txBody>
-          <a:bodyPr/>
-          <a:lstStyle/>
-          <a:p>
-            <a:endParaRPr lang="pt-PT" dirty="0"/>
-          </a:p>
-        </p:txBody>
-      </p:sp>
-      <p:sp>
-        <p:nvSpPr>
-          <p:cNvPr id="3" name="Content Placeholder 2">
-            <a:extLst>
-              <a:ext uri="{FF2B5EF4-FFF2-40B4-BE49-F238E27FC236}">
-                <a16:creationId xmlns:a16="http://schemas.microsoft.com/office/drawing/2014/main" id="{75B62007-2099-491F-B9CC-679828859075}"/>
-              </a:ext>
-            </a:extLst>
-          </p:cNvPr>
-          <p:cNvSpPr>
-            <a:spLocks noGrp="1"/>
-          </p:cNvSpPr>
-          <p:nvPr>
-            <p:ph idx="10"/>
-          </p:nvPr>
-        </p:nvSpPr>
-        <p:spPr/>
-        <p:txBody>
-          <a:bodyPr/>
-          <a:lstStyle/>
-          <a:p>
-            <a:endParaRPr lang="pt-PT" dirty="0"/>
-          </a:p>
-        </p:txBody>
-      </p:sp>
-      <p:sp>
-        <p:nvSpPr>
-          <p:cNvPr id="4" name="Content Placeholder 3">
-            <a:extLst>
-              <a:ext uri="{FF2B5EF4-FFF2-40B4-BE49-F238E27FC236}">
-                <a16:creationId xmlns:a16="http://schemas.microsoft.com/office/drawing/2014/main" id="{B573A8A9-0BDE-4B35-955D-A5C9FAFE6755}"/>
-              </a:ext>
-            </a:extLst>
-          </p:cNvPr>
-          <p:cNvSpPr>
-            <a:spLocks noGrp="1"/>
-          </p:cNvSpPr>
-          <p:nvPr>
-            <p:ph idx="11"/>
-          </p:nvPr>
-        </p:nvSpPr>
-        <p:spPr/>
-        <p:txBody>
-          <a:bodyPr/>
-          <a:lstStyle/>
-          <a:p>
-            <a:endParaRPr lang="pt-PT" dirty="0"/>
-          </a:p>
-        </p:txBody>
-      </p:sp>
-      <p:sp>
-        <p:nvSpPr>
-          <p:cNvPr id="5" name="Content Placeholder 4">
-            <a:extLst>
-              <a:ext uri="{FF2B5EF4-FFF2-40B4-BE49-F238E27FC236}">
-                <a16:creationId xmlns:a16="http://schemas.microsoft.com/office/drawing/2014/main" id="{03F0B0E7-9DC5-4E64-84FC-E41A42350BE1}"/>
-              </a:ext>
-            </a:extLst>
-          </p:cNvPr>
-          <p:cNvSpPr>
-            <a:spLocks noGrp="1"/>
-          </p:cNvSpPr>
-          <p:nvPr>
-            <p:ph idx="12"/>
-          </p:nvPr>
-        </p:nvSpPr>
-        <p:spPr/>
-        <p:txBody>
-          <a:bodyPr/>
-          <a:lstStyle/>
-          <a:p>
-            <a:endParaRPr lang="pt-PT" dirty="0"/>
-          </a:p>
-        </p:txBody>
-      </p:sp>
-      <p:sp>
-        <p:nvSpPr>
-          <p:cNvPr id="6" name="Content Placeholder 5">
-            <a:extLst>
-              <a:ext uri="{FF2B5EF4-FFF2-40B4-BE49-F238E27FC236}">
-                <a16:creationId xmlns:a16="http://schemas.microsoft.com/office/drawing/2014/main" id="{AAD76EA7-FFDD-4221-8BFA-2CF2F90A53A9}"/>
-              </a:ext>
-            </a:extLst>
-          </p:cNvPr>
-          <p:cNvSpPr>
-            <a:spLocks noGrp="1"/>
-          </p:cNvSpPr>
-          <p:nvPr>
-            <p:ph idx="13"/>
-          </p:nvPr>
-        </p:nvSpPr>
-        <p:spPr/>
-        <p:txBody>
-          <a:bodyPr/>
-          <a:lstStyle/>
-          <a:p>
-            <a:r>
-              <a:rPr lang="pt-PT" dirty="0"/>
-              <a:t>Início</a:t>
-            </a:r>
-          </a:p>
-        </p:txBody>
-      </p:sp>
-    </p:spTree>
-    <p:extLst>
-      <p:ext uri="{BB962C8B-B14F-4D97-AF65-F5344CB8AC3E}">
-        <p14:creationId xmlns:p14="http://schemas.microsoft.com/office/powerpoint/2010/main" val="3944840309"/>
-      </p:ext>
-    </p:extLst>
-  </p:cSld>
-  <p:clrMapOvr>
-    <a:masterClrMapping/>
-  </p:clrMapOvr>
-</p:sld>
-</file>
-
-<file path=ppt/slides/slide14.xml><?xml version="1.0" encoding="utf-8"?>
-<p:sld xmlns:a="http://schemas.openxmlformats.org/drawingml/2006/main" xmlns:r="http://schemas.openxmlformats.org/officeDocument/2006/relationships" xmlns:p="http://schemas.openxmlformats.org/presentationml/2006/main">
-  <p:cSld>
-    <p:spTree>
-      <p:nvGrpSpPr>
-        <p:cNvPr id="1" name=""/>
-        <p:cNvGrpSpPr/>
-        <p:nvPr/>
-      </p:nvGrpSpPr>
-      <p:grpSpPr>
-        <a:xfrm>
-          <a:off x="0" y="0"/>
-          <a:ext cx="0" cy="0"/>
-          <a:chOff x="0" y="0"/>
-          <a:chExt cx="0" cy="0"/>
-        </a:xfrm>
-      </p:grpSpPr>
-      <p:sp>
-        <p:nvSpPr>
-          <p:cNvPr id="2" name="Content Placeholder 1">
-            <a:extLst>
-              <a:ext uri="{FF2B5EF4-FFF2-40B4-BE49-F238E27FC236}">
-                <a16:creationId xmlns:a16="http://schemas.microsoft.com/office/drawing/2014/main" id="{61284A3C-35C7-47BB-B5EF-3A5AFD39F048}"/>
-              </a:ext>
-            </a:extLst>
-          </p:cNvPr>
-          <p:cNvSpPr>
-            <a:spLocks noGrp="1"/>
-          </p:cNvSpPr>
-          <p:nvPr>
-            <p:ph idx="1"/>
-          </p:nvPr>
-        </p:nvSpPr>
-        <p:spPr/>
-        <p:txBody>
-          <a:bodyPr/>
-          <a:lstStyle/>
-          <a:p>
-            <a:endParaRPr lang="pt-PT" dirty="0"/>
-          </a:p>
-        </p:txBody>
-      </p:sp>
-      <p:sp>
-        <p:nvSpPr>
-          <p:cNvPr id="3" name="Content Placeholder 2">
-            <a:extLst>
-              <a:ext uri="{FF2B5EF4-FFF2-40B4-BE49-F238E27FC236}">
-                <a16:creationId xmlns:a16="http://schemas.microsoft.com/office/drawing/2014/main" id="{75B62007-2099-491F-B9CC-679828859075}"/>
-              </a:ext>
-            </a:extLst>
-          </p:cNvPr>
-          <p:cNvSpPr>
-            <a:spLocks noGrp="1"/>
-          </p:cNvSpPr>
-          <p:nvPr>
-            <p:ph idx="10"/>
-          </p:nvPr>
-        </p:nvSpPr>
-        <p:spPr/>
-        <p:txBody>
-          <a:bodyPr/>
-          <a:lstStyle/>
-          <a:p>
-            <a:endParaRPr lang="pt-PT" dirty="0"/>
-          </a:p>
-        </p:txBody>
-      </p:sp>
-      <p:sp>
-        <p:nvSpPr>
-          <p:cNvPr id="4" name="Content Placeholder 3">
-            <a:extLst>
-              <a:ext uri="{FF2B5EF4-FFF2-40B4-BE49-F238E27FC236}">
-                <a16:creationId xmlns:a16="http://schemas.microsoft.com/office/drawing/2014/main" id="{B573A8A9-0BDE-4B35-955D-A5C9FAFE6755}"/>
-              </a:ext>
-            </a:extLst>
-          </p:cNvPr>
-          <p:cNvSpPr>
-            <a:spLocks noGrp="1"/>
-          </p:cNvSpPr>
-          <p:nvPr>
-            <p:ph idx="11"/>
-          </p:nvPr>
-        </p:nvSpPr>
-        <p:spPr/>
-        <p:txBody>
-          <a:bodyPr/>
-          <a:lstStyle/>
-          <a:p>
-            <a:endParaRPr lang="pt-PT" dirty="0"/>
-          </a:p>
-        </p:txBody>
-      </p:sp>
-      <p:sp>
-        <p:nvSpPr>
-          <p:cNvPr id="5" name="Content Placeholder 4">
-            <a:extLst>
-              <a:ext uri="{FF2B5EF4-FFF2-40B4-BE49-F238E27FC236}">
-                <a16:creationId xmlns:a16="http://schemas.microsoft.com/office/drawing/2014/main" id="{03F0B0E7-9DC5-4E64-84FC-E41A42350BE1}"/>
-              </a:ext>
-            </a:extLst>
-          </p:cNvPr>
-          <p:cNvSpPr>
-            <a:spLocks noGrp="1"/>
-          </p:cNvSpPr>
-          <p:nvPr>
-            <p:ph idx="12"/>
-          </p:nvPr>
-        </p:nvSpPr>
-        <p:spPr/>
-        <p:txBody>
-          <a:bodyPr/>
-          <a:lstStyle/>
-          <a:p>
-            <a:endParaRPr lang="pt-PT" dirty="0"/>
-          </a:p>
-        </p:txBody>
-      </p:sp>
-      <p:sp>
-        <p:nvSpPr>
-          <p:cNvPr id="6" name="Content Placeholder 5">
-            <a:extLst>
-              <a:ext uri="{FF2B5EF4-FFF2-40B4-BE49-F238E27FC236}">
-                <a16:creationId xmlns:a16="http://schemas.microsoft.com/office/drawing/2014/main" id="{AAD76EA7-FFDD-4221-8BFA-2CF2F90A53A9}"/>
-              </a:ext>
-            </a:extLst>
-          </p:cNvPr>
-          <p:cNvSpPr>
-            <a:spLocks noGrp="1"/>
-          </p:cNvSpPr>
-          <p:nvPr>
-            <p:ph idx="13"/>
-          </p:nvPr>
-        </p:nvSpPr>
-        <p:spPr/>
-        <p:txBody>
-          <a:bodyPr/>
-          <a:lstStyle/>
-          <a:p>
-            <a:r>
-              <a:rPr lang="pt-PT" dirty="0"/>
-              <a:t>Início</a:t>
-            </a:r>
-          </a:p>
-        </p:txBody>
-      </p:sp>
-    </p:spTree>
-    <p:extLst>
-      <p:ext uri="{BB962C8B-B14F-4D97-AF65-F5344CB8AC3E}">
-        <p14:creationId xmlns:p14="http://schemas.microsoft.com/office/powerpoint/2010/main" val="3201941665"/>
       </p:ext>
     </p:extLst>
   </p:cSld>
@@ -17989,31 +17369,41 @@
           </a:p>
         </p:txBody>
       </p:sp>
-      <p:sp>
-        <p:nvSpPr>
-          <p:cNvPr id="4" name="Content Placeholder 3">
+      <p:pic>
+        <p:nvPicPr>
+          <p:cNvPr id="8" name="Marcador de Posição de Conteúdo 7">
             <a:extLst>
               <a:ext uri="{FF2B5EF4-FFF2-40B4-BE49-F238E27FC236}">
-                <a16:creationId xmlns:a16="http://schemas.microsoft.com/office/drawing/2014/main" id="{B573A8A9-0BDE-4B35-955D-A5C9FAFE6755}"/>
+                <a16:creationId xmlns:a16="http://schemas.microsoft.com/office/drawing/2014/main" id="{91622725-0EBF-4314-A3C3-2DE18C5E2496}"/>
               </a:ext>
             </a:extLst>
           </p:cNvPr>
-          <p:cNvSpPr>
-            <a:spLocks noGrp="1"/>
-          </p:cNvSpPr>
+          <p:cNvPicPr>
+            <a:picLocks noGrp="1" noChangeAspect="1"/>
+          </p:cNvPicPr>
           <p:nvPr>
             <p:ph idx="11"/>
           </p:nvPr>
-        </p:nvSpPr>
-        <p:spPr/>
-        <p:txBody>
-          <a:bodyPr/>
-          <a:lstStyle/>
-          <a:p>
-            <a:endParaRPr lang="pt-PT" dirty="0"/>
-          </a:p>
-        </p:txBody>
-      </p:sp>
+        </p:nvPicPr>
+        <p:blipFill>
+          <a:blip r:embed="rId2" cstate="print">
+            <a:extLst>
+              <a:ext uri="{28A0092B-C50C-407E-A947-70E740481C1C}">
+                <a14:useLocalDpi xmlns:a14="http://schemas.microsoft.com/office/drawing/2010/main" val="0"/>
+              </a:ext>
+            </a:extLst>
+          </a:blip>
+          <a:stretch>
+            <a:fillRect/>
+          </a:stretch>
+        </p:blipFill>
+        <p:spPr>
+          <a:xfrm>
+            <a:off x="2703833" y="684213"/>
+            <a:ext cx="1894834" cy="3194050"/>
+          </a:xfrm>
+        </p:spPr>
+      </p:pic>
       <p:sp>
         <p:nvSpPr>
           <p:cNvPr id="5" name="Content Placeholder 4">
@@ -18147,31 +17537,41 @@
           </a:p>
         </p:txBody>
       </p:sp>
-      <p:sp>
-        <p:nvSpPr>
-          <p:cNvPr id="4" name="Content Placeholder 3">
+      <p:pic>
+        <p:nvPicPr>
+          <p:cNvPr id="8" name="Marcador de Posição de Conteúdo 7">
             <a:extLst>
               <a:ext uri="{FF2B5EF4-FFF2-40B4-BE49-F238E27FC236}">
-                <a16:creationId xmlns:a16="http://schemas.microsoft.com/office/drawing/2014/main" id="{B573A8A9-0BDE-4B35-955D-A5C9FAFE6755}"/>
+                <a16:creationId xmlns:a16="http://schemas.microsoft.com/office/drawing/2014/main" id="{22D9AB50-3517-4BC0-8EFE-4945CB2E2349}"/>
               </a:ext>
             </a:extLst>
           </p:cNvPr>
-          <p:cNvSpPr>
-            <a:spLocks noGrp="1"/>
-          </p:cNvSpPr>
+          <p:cNvPicPr>
+            <a:picLocks noGrp="1" noChangeAspect="1"/>
+          </p:cNvPicPr>
           <p:nvPr>
             <p:ph idx="11"/>
           </p:nvPr>
-        </p:nvSpPr>
-        <p:spPr/>
-        <p:txBody>
-          <a:bodyPr/>
-          <a:lstStyle/>
-          <a:p>
-            <a:endParaRPr lang="pt-PT" dirty="0"/>
-          </a:p>
-        </p:txBody>
-      </p:sp>
+        </p:nvPicPr>
+        <p:blipFill>
+          <a:blip r:embed="rId2">
+            <a:extLst>
+              <a:ext uri="{28A0092B-C50C-407E-A947-70E740481C1C}">
+                <a14:useLocalDpi xmlns:a14="http://schemas.microsoft.com/office/drawing/2010/main" val="0"/>
+              </a:ext>
+            </a:extLst>
+          </a:blip>
+          <a:stretch>
+            <a:fillRect/>
+          </a:stretch>
+        </p:blipFill>
+        <p:spPr>
+          <a:xfrm>
+            <a:off x="1969910" y="684213"/>
+            <a:ext cx="3362679" cy="3194050"/>
+          </a:xfrm>
+        </p:spPr>
+      </p:pic>
       <p:sp>
         <p:nvSpPr>
           <p:cNvPr id="5" name="Content Placeholder 4">
@@ -18220,15 +17620,21 @@
           <a:p>
             <a:r>
               <a:rPr lang="pt-PT" dirty="0"/>
-              <a:t>Porquê Covilhã</a:t>
-            </a:r>
+              <a:t>Calendário</a:t>
+            </a:r>
+          </a:p>
+          <a:p>
+            <a:pPr marL="0" indent="0">
+              <a:buNone/>
+            </a:pPr>
+            <a:endParaRPr lang="pt-PT" dirty="0"/>
           </a:p>
         </p:txBody>
       </p:sp>
     </p:spTree>
     <p:extLst>
       <p:ext uri="{BB962C8B-B14F-4D97-AF65-F5344CB8AC3E}">
-        <p14:creationId xmlns:p14="http://schemas.microsoft.com/office/powerpoint/2010/main" val="2316728216"/>
+        <p14:creationId xmlns:p14="http://schemas.microsoft.com/office/powerpoint/2010/main" val="452397108"/>
       </p:ext>
     </p:extLst>
   </p:cSld>
@@ -18305,31 +17711,41 @@
           </a:p>
         </p:txBody>
       </p:sp>
-      <p:sp>
-        <p:nvSpPr>
-          <p:cNvPr id="4" name="Content Placeholder 3">
+      <p:pic>
+        <p:nvPicPr>
+          <p:cNvPr id="8" name="Marcador de Posição de Conteúdo 7">
             <a:extLst>
               <a:ext uri="{FF2B5EF4-FFF2-40B4-BE49-F238E27FC236}">
-                <a16:creationId xmlns:a16="http://schemas.microsoft.com/office/drawing/2014/main" id="{B573A8A9-0BDE-4B35-955D-A5C9FAFE6755}"/>
+                <a16:creationId xmlns:a16="http://schemas.microsoft.com/office/drawing/2014/main" id="{F43A5508-6070-4E5E-8921-EAFC2FB51964}"/>
               </a:ext>
             </a:extLst>
           </p:cNvPr>
-          <p:cNvSpPr>
-            <a:spLocks noGrp="1"/>
-          </p:cNvSpPr>
+          <p:cNvPicPr>
+            <a:picLocks noGrp="1" noChangeAspect="1"/>
+          </p:cNvPicPr>
           <p:nvPr>
             <p:ph idx="11"/>
           </p:nvPr>
-        </p:nvSpPr>
-        <p:spPr/>
-        <p:txBody>
-          <a:bodyPr/>
-          <a:lstStyle/>
-          <a:p>
-            <a:endParaRPr lang="pt-PT" dirty="0"/>
-          </a:p>
-        </p:txBody>
-      </p:sp>
+        </p:nvPicPr>
+        <p:blipFill>
+          <a:blip r:embed="rId2">
+            <a:extLst>
+              <a:ext uri="{28A0092B-C50C-407E-A947-70E740481C1C}">
+                <a14:useLocalDpi xmlns:a14="http://schemas.microsoft.com/office/drawing/2010/main" val="0"/>
+              </a:ext>
+            </a:extLst>
+          </a:blip>
+          <a:stretch>
+            <a:fillRect/>
+          </a:stretch>
+        </p:blipFill>
+        <p:spPr>
+          <a:xfrm>
+            <a:off x="1967430" y="684213"/>
+            <a:ext cx="3367639" cy="3194050"/>
+          </a:xfrm>
+        </p:spPr>
+      </p:pic>
       <p:sp>
         <p:nvSpPr>
           <p:cNvPr id="5" name="Content Placeholder 4">
@@ -18378,7 +17794,7 @@
           <a:p>
             <a:r>
               <a:rPr lang="pt-PT" dirty="0"/>
-              <a:t>Início</a:t>
+              <a:t>Categorias</a:t>
             </a:r>
           </a:p>
         </p:txBody>
@@ -18386,7 +17802,7 @@
     </p:spTree>
     <p:extLst>
       <p:ext uri="{BB962C8B-B14F-4D97-AF65-F5344CB8AC3E}">
-        <p14:creationId xmlns:p14="http://schemas.microsoft.com/office/powerpoint/2010/main" val="452397108"/>
+        <p14:creationId xmlns:p14="http://schemas.microsoft.com/office/powerpoint/2010/main" val="2701093968"/>
       </p:ext>
     </p:extLst>
   </p:cSld>
@@ -18463,31 +17879,41 @@
           </a:p>
         </p:txBody>
       </p:sp>
-      <p:sp>
-        <p:nvSpPr>
-          <p:cNvPr id="4" name="Content Placeholder 3">
+      <p:pic>
+        <p:nvPicPr>
+          <p:cNvPr id="8" name="Marcador de Posição de Conteúdo 7">
             <a:extLst>
               <a:ext uri="{FF2B5EF4-FFF2-40B4-BE49-F238E27FC236}">
-                <a16:creationId xmlns:a16="http://schemas.microsoft.com/office/drawing/2014/main" id="{B573A8A9-0BDE-4B35-955D-A5C9FAFE6755}"/>
+                <a16:creationId xmlns:a16="http://schemas.microsoft.com/office/drawing/2014/main" id="{321413A4-3E2B-48AD-9C12-CBD60B3A8759}"/>
               </a:ext>
             </a:extLst>
           </p:cNvPr>
-          <p:cNvSpPr>
-            <a:spLocks noGrp="1"/>
-          </p:cNvSpPr>
+          <p:cNvPicPr>
+            <a:picLocks noGrp="1" noChangeAspect="1"/>
+          </p:cNvPicPr>
           <p:nvPr>
             <p:ph idx="11"/>
           </p:nvPr>
-        </p:nvSpPr>
-        <p:spPr/>
-        <p:txBody>
-          <a:bodyPr/>
-          <a:lstStyle/>
-          <a:p>
-            <a:endParaRPr lang="pt-PT" dirty="0"/>
-          </a:p>
-        </p:txBody>
-      </p:sp>
+        </p:nvPicPr>
+        <p:blipFill>
+          <a:blip r:embed="rId2">
+            <a:extLst>
+              <a:ext uri="{28A0092B-C50C-407E-A947-70E740481C1C}">
+                <a14:useLocalDpi xmlns:a14="http://schemas.microsoft.com/office/drawing/2010/main" val="0"/>
+              </a:ext>
+            </a:extLst>
+          </a:blip>
+          <a:stretch>
+            <a:fillRect/>
+          </a:stretch>
+        </p:blipFill>
+        <p:spPr>
+          <a:xfrm>
+            <a:off x="1967430" y="684213"/>
+            <a:ext cx="3367639" cy="3194050"/>
+          </a:xfrm>
+        </p:spPr>
+      </p:pic>
       <p:sp>
         <p:nvSpPr>
           <p:cNvPr id="5" name="Content Placeholder 4">
@@ -18531,20 +17957,28 @@
         </p:nvSpPr>
         <p:spPr/>
         <p:txBody>
-          <a:bodyPr/>
+          <a:bodyPr>
+            <a:normAutofit/>
+          </a:bodyPr>
           <a:lstStyle/>
           <a:p>
             <a:r>
               <a:rPr lang="pt-PT" dirty="0"/>
-              <a:t>Início</a:t>
-            </a:r>
+              <a:t>Sobre</a:t>
+            </a:r>
+          </a:p>
+          <a:p>
+            <a:pPr marL="0" indent="0">
+              <a:buNone/>
+            </a:pPr>
+            <a:endParaRPr lang="pt-PT" dirty="0"/>
           </a:p>
         </p:txBody>
       </p:sp>
     </p:spTree>
     <p:extLst>
       <p:ext uri="{BB962C8B-B14F-4D97-AF65-F5344CB8AC3E}">
-        <p14:creationId xmlns:p14="http://schemas.microsoft.com/office/powerpoint/2010/main" val="2701093968"/>
+        <p14:creationId xmlns:p14="http://schemas.microsoft.com/office/powerpoint/2010/main" val="1324516063"/>
       </p:ext>
     </p:extLst>
   </p:cSld>

</xml_diff>

<commit_message>
Procura os textos no powerpoint no storyboard "início"
</commit_message>
<xml_diff>
--- a/UBI_CompWeb_2018_templates.pptx
+++ b/UBI_CompWeb_2018_templates.pptx
@@ -14,16 +14,16 @@
     <p:sldId id="261" r:id="rId5"/>
     <p:sldId id="263" r:id="rId6"/>
     <p:sldId id="262" r:id="rId7"/>
-    <p:sldId id="264" r:id="rId8"/>
-    <p:sldId id="265" r:id="rId9"/>
-    <p:sldId id="266" r:id="rId10"/>
-    <p:sldId id="267" r:id="rId11"/>
-    <p:sldId id="268" r:id="rId12"/>
-    <p:sldId id="269" r:id="rId13"/>
-    <p:sldId id="272" r:id="rId14"/>
-    <p:sldId id="270" r:id="rId15"/>
-    <p:sldId id="271" r:id="rId16"/>
-    <p:sldId id="273" r:id="rId17"/>
+    <p:sldId id="267" r:id="rId8"/>
+    <p:sldId id="268" r:id="rId9"/>
+    <p:sldId id="275" r:id="rId10"/>
+    <p:sldId id="269" r:id="rId11"/>
+    <p:sldId id="272" r:id="rId12"/>
+    <p:sldId id="270" r:id="rId13"/>
+    <p:sldId id="271" r:id="rId14"/>
+    <p:sldId id="273" r:id="rId15"/>
+    <p:sldId id="274" r:id="rId16"/>
+    <p:sldId id="276" r:id="rId17"/>
   </p:sldIdLst>
   <p:sldSz cx="9144000" cy="6858000" type="screen4x3"/>
   <p:notesSz cx="6858000" cy="9144000"/>
@@ -2752,47 +2752,6 @@
         </a:p>
       </dgm:t>
     </dgm:pt>
-    <dgm:pt modelId="{6D859D06-D440-4495-BC38-4B0653417247}">
-      <dgm:prSet custT="1"/>
-      <dgm:spPr/>
-      <dgm:t>
-        <a:bodyPr/>
-        <a:lstStyle/>
-        <a:p>
-          <a:r>
-            <a:rPr lang="pt-PT" sz="3000" u="none" dirty="0"/>
-            <a:t>Porquê </a:t>
-          </a:r>
-          <a:r>
-            <a:rPr lang="pt-PT" sz="3000" u="none" dirty="0" smtClean="0"/>
-            <a:t>Covilhã?</a:t>
-          </a:r>
-          <a:endParaRPr lang="pt-PT" sz="3000" u="none" dirty="0"/>
-        </a:p>
-      </dgm:t>
-    </dgm:pt>
-    <dgm:pt modelId="{7ABF7F75-BA81-498E-8999-139ABA277B4F}" type="parTrans" cxnId="{979B3921-65D4-4C21-A108-2DBE1B0AAAE5}">
-      <dgm:prSet/>
-      <dgm:spPr/>
-      <dgm:t>
-        <a:bodyPr/>
-        <a:lstStyle/>
-        <a:p>
-          <a:endParaRPr lang="pt-PT" u="none"/>
-        </a:p>
-      </dgm:t>
-    </dgm:pt>
-    <dgm:pt modelId="{F0F770A4-A5C9-424C-93C8-86B63DB8FE87}" type="sibTrans" cxnId="{979B3921-65D4-4C21-A108-2DBE1B0AAAE5}">
-      <dgm:prSet/>
-      <dgm:spPr/>
-      <dgm:t>
-        <a:bodyPr/>
-        <a:lstStyle/>
-        <a:p>
-          <a:endParaRPr lang="pt-PT" u="none"/>
-        </a:p>
-      </dgm:t>
-    </dgm:pt>
     <dgm:pt modelId="{C4E9236B-D5FB-402F-9C08-8917C5806671}">
       <dgm:prSet/>
       <dgm:spPr/>
@@ -3009,7 +2968,7 @@
         </a:p>
       </dgm:t>
     </dgm:pt>
-    <dgm:pt modelId="{AF9FAEE0-D707-4D4A-BC4E-B00284790C09}">
+    <dgm:pt modelId="{01DE5603-A9BA-48DC-A812-A9D236837822}">
       <dgm:prSet/>
       <dgm:spPr/>
       <dgm:t>
@@ -3017,40 +2976,36 @@
         <a:lstStyle/>
         <a:p>
           <a:r>
-            <a:rPr lang="pt-PT" u="none" dirty="0"/>
-            <a:t>Chegar à </a:t>
+            <a:rPr lang="pt-PT" dirty="0" smtClean="0"/>
+            <a:t>Porquê Covilhã?</a:t>
           </a:r>
-          <a:r>
-            <a:rPr lang="pt-PT" u="none" dirty="0" smtClean="0"/>
-            <a:t>Covilhã</a:t>
-          </a:r>
-          <a:endParaRPr lang="pt-PT" u="none" dirty="0"/>
+          <a:endParaRPr lang="pt-PT" dirty="0"/>
         </a:p>
       </dgm:t>
     </dgm:pt>
-    <dgm:pt modelId="{DF2FF718-F2C1-46BD-B3D2-69C34DDD97AC}" type="parTrans" cxnId="{BA7D9214-91C9-43C5-930D-8662E2D96E9F}">
+    <dgm:pt modelId="{0B69B6BC-1E4A-4E1F-9BE1-0C53B92E33BC}" type="parTrans" cxnId="{43284CFA-223A-4049-87BA-3120E63505C3}">
       <dgm:prSet/>
       <dgm:spPr/>
       <dgm:t>
         <a:bodyPr/>
         <a:lstStyle/>
         <a:p>
-          <a:endParaRPr lang="pt-PT" u="none"/>
+          <a:endParaRPr lang="pt-PT"/>
         </a:p>
       </dgm:t>
     </dgm:pt>
-    <dgm:pt modelId="{9F96BC34-2F99-4857-9537-755790E34536}" type="sibTrans" cxnId="{BA7D9214-91C9-43C5-930D-8662E2D96E9F}">
+    <dgm:pt modelId="{69D0B4C8-A61E-4CEB-8F52-6CC20FED1FF6}" type="sibTrans" cxnId="{43284CFA-223A-4049-87BA-3120E63505C3}">
       <dgm:prSet/>
       <dgm:spPr/>
       <dgm:t>
         <a:bodyPr/>
         <a:lstStyle/>
         <a:p>
-          <a:endParaRPr lang="pt-PT" u="none"/>
+          <a:endParaRPr lang="pt-PT"/>
         </a:p>
       </dgm:t>
     </dgm:pt>
-    <dgm:pt modelId="{32A588C2-228D-4B26-9C8B-90CDFD0FC08B}">
+    <dgm:pt modelId="{25553316-AE0F-433F-BD8A-E0F17F5D747E}">
       <dgm:prSet/>
       <dgm:spPr/>
       <dgm:t>
@@ -3058,31 +3013,69 @@
         <a:lstStyle/>
         <a:p>
           <a:r>
-            <a:rPr lang="pt-PT" u="none" dirty="0"/>
+            <a:rPr lang="pt-PT" dirty="0" smtClean="0"/>
             <a:t>Mapa</a:t>
           </a:r>
+          <a:endParaRPr lang="pt-PT" dirty="0"/>
         </a:p>
       </dgm:t>
     </dgm:pt>
-    <dgm:pt modelId="{188D1000-0E2B-4CE9-B4EC-57DF98E5B370}" type="parTrans" cxnId="{50574EE2-B791-402B-8982-5F339D14BC2A}">
+    <dgm:pt modelId="{9D1FF7F3-6BB1-485B-ABFB-CBC54EB7FB2F}" type="parTrans" cxnId="{7DECDEAA-0DFB-4024-BC99-75211E705204}">
       <dgm:prSet/>
       <dgm:spPr/>
       <dgm:t>
         <a:bodyPr/>
         <a:lstStyle/>
         <a:p>
-          <a:endParaRPr lang="pt-PT" u="none"/>
+          <a:endParaRPr lang="pt-PT"/>
         </a:p>
       </dgm:t>
     </dgm:pt>
-    <dgm:pt modelId="{14B0CDC8-4FDC-419A-B7CE-8BD710F85676}" type="sibTrans" cxnId="{50574EE2-B791-402B-8982-5F339D14BC2A}">
+    <dgm:pt modelId="{178316FB-DCE2-4974-BB3C-AD7713B01F9F}" type="sibTrans" cxnId="{7DECDEAA-0DFB-4024-BC99-75211E705204}">
       <dgm:prSet/>
       <dgm:spPr/>
       <dgm:t>
         <a:bodyPr/>
         <a:lstStyle/>
         <a:p>
-          <a:endParaRPr lang="pt-PT" u="none"/>
+          <a:endParaRPr lang="pt-PT"/>
+        </a:p>
+      </dgm:t>
+    </dgm:pt>
+    <dgm:pt modelId="{FFC74FC4-00ED-4EE0-BC51-6639C0CAB4C0}">
+      <dgm:prSet/>
+      <dgm:spPr/>
+      <dgm:t>
+        <a:bodyPr/>
+        <a:lstStyle/>
+        <a:p>
+          <a:r>
+            <a:rPr lang="pt-PT" dirty="0" smtClean="0"/>
+            <a:t>Chegar à Covilhã</a:t>
+          </a:r>
+          <a:endParaRPr lang="pt-PT" dirty="0"/>
+        </a:p>
+      </dgm:t>
+    </dgm:pt>
+    <dgm:pt modelId="{2A732842-69BB-4863-B446-B741C889B5B1}" type="parTrans" cxnId="{4874DAB9-E15D-43E4-ABDC-D9A3CCB4EBFE}">
+      <dgm:prSet/>
+      <dgm:spPr/>
+      <dgm:t>
+        <a:bodyPr/>
+        <a:lstStyle/>
+        <a:p>
+          <a:endParaRPr lang="pt-PT"/>
+        </a:p>
+      </dgm:t>
+    </dgm:pt>
+    <dgm:pt modelId="{DCE4D878-D34A-4E3F-84A7-0DCD129058B0}" type="sibTrans" cxnId="{4874DAB9-E15D-43E4-ABDC-D9A3CCB4EBFE}">
+      <dgm:prSet/>
+      <dgm:spPr/>
+      <dgm:t>
+        <a:bodyPr/>
+        <a:lstStyle/>
+        <a:p>
+          <a:endParaRPr lang="pt-PT"/>
         </a:p>
       </dgm:t>
     </dgm:pt>
@@ -3201,8 +3194,28 @@
       <dgm:prSet presAssocID="{D0D5EBBE-C984-451E-A77C-06635B96115A}" presName="hierChild4" presStyleCnt="0"/>
       <dgm:spPr/>
     </dgm:pt>
-    <dgm:pt modelId="{BCCB5965-B0E0-45CC-8894-BE1731CC57E2}" type="pres">
-      <dgm:prSet presAssocID="{7ABF7F75-BA81-498E-8999-139ABA277B4F}" presName="Name37" presStyleLbl="parChTrans1D3" presStyleIdx="0" presStyleCnt="9"/>
+    <dgm:pt modelId="{CF63EB70-7A6D-4FA2-8E46-21CF359D0286}" type="pres">
+      <dgm:prSet presAssocID="{0B69B6BC-1E4A-4E1F-9BE1-0C53B92E33BC}" presName="Name37" presStyleLbl="parChTrans1D3" presStyleIdx="0" presStyleCnt="9"/>
+      <dgm:spPr/>
+    </dgm:pt>
+    <dgm:pt modelId="{EEE897D5-0D96-4624-AD67-2EBF28C86E46}" type="pres">
+      <dgm:prSet presAssocID="{01DE5603-A9BA-48DC-A812-A9D236837822}" presName="hierRoot2" presStyleCnt="0">
+        <dgm:presLayoutVars>
+          <dgm:hierBranch val="init"/>
+        </dgm:presLayoutVars>
+      </dgm:prSet>
+      <dgm:spPr/>
+    </dgm:pt>
+    <dgm:pt modelId="{61949F78-54AF-445F-A9C1-09BCC8AB6818}" type="pres">
+      <dgm:prSet presAssocID="{01DE5603-A9BA-48DC-A812-A9D236837822}" presName="rootComposite" presStyleCnt="0"/>
+      <dgm:spPr/>
+    </dgm:pt>
+    <dgm:pt modelId="{A11B1B3B-548B-4BF3-BD14-6C594BE6A489}" type="pres">
+      <dgm:prSet presAssocID="{01DE5603-A9BA-48DC-A812-A9D236837822}" presName="rootText" presStyleLbl="node3" presStyleIdx="0" presStyleCnt="9" custLinFactNeighborX="0" custLinFactNeighborY="7617">
+        <dgm:presLayoutVars>
+          <dgm:chPref val="3"/>
+        </dgm:presLayoutVars>
+      </dgm:prSet>
       <dgm:spPr/>
       <dgm:t>
         <a:bodyPr/>
@@ -3212,20 +3225,36 @@
         </a:p>
       </dgm:t>
     </dgm:pt>
-    <dgm:pt modelId="{1CD8D106-1B91-496C-B3DB-996AC3AD5822}" type="pres">
-      <dgm:prSet presAssocID="{6D859D06-D440-4495-BC38-4B0653417247}" presName="hierRoot2" presStyleCnt="0">
+    <dgm:pt modelId="{CE70EDA1-CEC3-4F76-B0D5-08C75AA61789}" type="pres">
+      <dgm:prSet presAssocID="{01DE5603-A9BA-48DC-A812-A9D236837822}" presName="rootConnector" presStyleLbl="node3" presStyleIdx="0" presStyleCnt="9"/>
+      <dgm:spPr/>
+    </dgm:pt>
+    <dgm:pt modelId="{6D8D787A-8B24-44D0-B2C8-8BFD2439CC10}" type="pres">
+      <dgm:prSet presAssocID="{01DE5603-A9BA-48DC-A812-A9D236837822}" presName="hierChild4" presStyleCnt="0"/>
+      <dgm:spPr/>
+    </dgm:pt>
+    <dgm:pt modelId="{18923BB7-BB28-4E99-BA26-5534ED5EA94F}" type="pres">
+      <dgm:prSet presAssocID="{01DE5603-A9BA-48DC-A812-A9D236837822}" presName="hierChild5" presStyleCnt="0"/>
+      <dgm:spPr/>
+    </dgm:pt>
+    <dgm:pt modelId="{FDCF2E21-0BBF-4C89-8E46-93D1F2D60A4C}" type="pres">
+      <dgm:prSet presAssocID="{9D1FF7F3-6BB1-485B-ABFB-CBC54EB7FB2F}" presName="Name37" presStyleLbl="parChTrans1D3" presStyleIdx="1" presStyleCnt="9"/>
+      <dgm:spPr/>
+    </dgm:pt>
+    <dgm:pt modelId="{579C8BBC-679D-4883-BCD3-A803A1F4A041}" type="pres">
+      <dgm:prSet presAssocID="{25553316-AE0F-433F-BD8A-E0F17F5D747E}" presName="hierRoot2" presStyleCnt="0">
         <dgm:presLayoutVars>
           <dgm:hierBranch val="init"/>
         </dgm:presLayoutVars>
       </dgm:prSet>
       <dgm:spPr/>
     </dgm:pt>
-    <dgm:pt modelId="{1B9CED18-CF7D-4AF9-975C-1844914138B0}" type="pres">
-      <dgm:prSet presAssocID="{6D859D06-D440-4495-BC38-4B0653417247}" presName="rootComposite" presStyleCnt="0"/>
-      <dgm:spPr/>
-    </dgm:pt>
-    <dgm:pt modelId="{5BD05F6E-C87D-423B-8545-489C3582E9A5}" type="pres">
-      <dgm:prSet presAssocID="{6D859D06-D440-4495-BC38-4B0653417247}" presName="rootText" presStyleLbl="node3" presStyleIdx="0" presStyleCnt="9" custLinFactNeighborX="-11737" custLinFactNeighborY="2608">
+    <dgm:pt modelId="{6837DE00-8205-422F-BDDD-F17E99CB1BE8}" type="pres">
+      <dgm:prSet presAssocID="{25553316-AE0F-433F-BD8A-E0F17F5D747E}" presName="rootComposite" presStyleCnt="0"/>
+      <dgm:spPr/>
+    </dgm:pt>
+    <dgm:pt modelId="{3DA29272-8B54-4109-B1CF-306966EBCEA6}" type="pres">
+      <dgm:prSet presAssocID="{25553316-AE0F-433F-BD8A-E0F17F5D747E}" presName="rootText" presStyleLbl="node3" presStyleIdx="1" presStyleCnt="9" custLinFactY="934" custLinFactNeighborX="0" custLinFactNeighborY="100000">
         <dgm:presLayoutVars>
           <dgm:chPref val="3"/>
         </dgm:presLayoutVars>
@@ -3239,8 +3268,60 @@
         </a:p>
       </dgm:t>
     </dgm:pt>
-    <dgm:pt modelId="{257BA37D-C7F9-4FC4-8625-2A044432F45E}" type="pres">
-      <dgm:prSet presAssocID="{6D859D06-D440-4495-BC38-4B0653417247}" presName="rootConnector" presStyleLbl="node3" presStyleIdx="0" presStyleCnt="9"/>
+    <dgm:pt modelId="{CFE66D09-E0AC-4059-9D41-E1709E524C84}" type="pres">
+      <dgm:prSet presAssocID="{25553316-AE0F-433F-BD8A-E0F17F5D747E}" presName="rootConnector" presStyleLbl="node3" presStyleIdx="1" presStyleCnt="9"/>
+      <dgm:spPr/>
+    </dgm:pt>
+    <dgm:pt modelId="{C27F06AF-A642-4C0F-A633-4CDF443BC104}" type="pres">
+      <dgm:prSet presAssocID="{25553316-AE0F-433F-BD8A-E0F17F5D747E}" presName="hierChild4" presStyleCnt="0"/>
+      <dgm:spPr/>
+    </dgm:pt>
+    <dgm:pt modelId="{945F342B-9689-4322-9AE7-BFD6B915DAEE}" type="pres">
+      <dgm:prSet presAssocID="{25553316-AE0F-433F-BD8A-E0F17F5D747E}" presName="hierChild5" presStyleCnt="0"/>
+      <dgm:spPr/>
+    </dgm:pt>
+    <dgm:pt modelId="{DABE2A97-8AFC-46F1-9229-CDFF582F36CD}" type="pres">
+      <dgm:prSet presAssocID="{2A732842-69BB-4863-B446-B741C889B5B1}" presName="Name37" presStyleLbl="parChTrans1D3" presStyleIdx="2" presStyleCnt="9"/>
+      <dgm:spPr/>
+    </dgm:pt>
+    <dgm:pt modelId="{F79A91D2-31E3-4214-A5B3-FDB94EEF9285}" type="pres">
+      <dgm:prSet presAssocID="{FFC74FC4-00ED-4EE0-BC51-6639C0CAB4C0}" presName="hierRoot2" presStyleCnt="0">
+        <dgm:presLayoutVars>
+          <dgm:hierBranch val="init"/>
+        </dgm:presLayoutVars>
+      </dgm:prSet>
+      <dgm:spPr/>
+    </dgm:pt>
+    <dgm:pt modelId="{7D9010F7-3374-45E6-BB14-A40A8C0DA9AF}" type="pres">
+      <dgm:prSet presAssocID="{FFC74FC4-00ED-4EE0-BC51-6639C0CAB4C0}" presName="rootComposite" presStyleCnt="0"/>
+      <dgm:spPr/>
+    </dgm:pt>
+    <dgm:pt modelId="{B13177B0-B616-471A-B673-341F50F836B6}" type="pres">
+      <dgm:prSet presAssocID="{FFC74FC4-00ED-4EE0-BC51-6639C0CAB4C0}" presName="rootText" presStyleLbl="node3" presStyleIdx="2" presStyleCnt="9" custLinFactY="-58067" custLinFactNeighborX="952" custLinFactNeighborY="-100000">
+        <dgm:presLayoutVars>
+          <dgm:chPref val="3"/>
+        </dgm:presLayoutVars>
+      </dgm:prSet>
+      <dgm:spPr/>
+    </dgm:pt>
+    <dgm:pt modelId="{29898FD7-6D50-464C-B5FD-8C53A87EEE52}" type="pres">
+      <dgm:prSet presAssocID="{FFC74FC4-00ED-4EE0-BC51-6639C0CAB4C0}" presName="rootConnector" presStyleLbl="node3" presStyleIdx="2" presStyleCnt="9"/>
+      <dgm:spPr/>
+    </dgm:pt>
+    <dgm:pt modelId="{D77A1B47-932A-44EA-B7CE-1DAA48EA4A4B}" type="pres">
+      <dgm:prSet presAssocID="{FFC74FC4-00ED-4EE0-BC51-6639C0CAB4C0}" presName="hierChild4" presStyleCnt="0"/>
+      <dgm:spPr/>
+    </dgm:pt>
+    <dgm:pt modelId="{7DF5EC82-B2B7-4CDE-A286-05BBF6851BA8}" type="pres">
+      <dgm:prSet presAssocID="{FFC74FC4-00ED-4EE0-BC51-6639C0CAB4C0}" presName="hierChild5" presStyleCnt="0"/>
+      <dgm:spPr/>
+    </dgm:pt>
+    <dgm:pt modelId="{AFF660C7-7594-4A5C-9B19-EA55042202B5}" type="pres">
+      <dgm:prSet presAssocID="{D0D5EBBE-C984-451E-A77C-06635B96115A}" presName="hierChild5" presStyleCnt="0"/>
+      <dgm:spPr/>
+    </dgm:pt>
+    <dgm:pt modelId="{A3C064E1-EB83-4A90-BC9B-363A4369B1D9}" type="pres">
+      <dgm:prSet presAssocID="{AE15057E-D275-4CBA-BBDA-7AFB5273F6D0}" presName="Name37" presStyleLbl="parChTrans1D2" presStyleIdx="1" presStyleCnt="5"/>
       <dgm:spPr/>
       <dgm:t>
         <a:bodyPr/>
@@ -3250,16 +3331,24 @@
         </a:p>
       </dgm:t>
     </dgm:pt>
-    <dgm:pt modelId="{21FA8DE6-BE13-427F-B07D-34101809347A}" type="pres">
-      <dgm:prSet presAssocID="{6D859D06-D440-4495-BC38-4B0653417247}" presName="hierChild4" presStyleCnt="0"/>
-      <dgm:spPr/>
-    </dgm:pt>
-    <dgm:pt modelId="{36C55898-F9BD-4CF0-99A2-28DD2F3C66C5}" type="pres">
-      <dgm:prSet presAssocID="{6D859D06-D440-4495-BC38-4B0653417247}" presName="hierChild5" presStyleCnt="0"/>
-      <dgm:spPr/>
-    </dgm:pt>
-    <dgm:pt modelId="{F5935B02-3EAE-43D8-83D7-0568EA754FE3}" type="pres">
-      <dgm:prSet presAssocID="{DF2FF718-F2C1-46BD-B3D2-69C34DDD97AC}" presName="Name37" presStyleLbl="parChTrans1D3" presStyleIdx="1" presStyleCnt="9"/>
+    <dgm:pt modelId="{5F49EB11-AF2A-43A7-A5F6-C818A93333A4}" type="pres">
+      <dgm:prSet presAssocID="{DEB3A288-72B2-4CE3-BA0E-2385DCEA1166}" presName="hierRoot2" presStyleCnt="0">
+        <dgm:presLayoutVars>
+          <dgm:hierBranch val="init"/>
+        </dgm:presLayoutVars>
+      </dgm:prSet>
+      <dgm:spPr/>
+    </dgm:pt>
+    <dgm:pt modelId="{3EA9B75B-9B66-4B39-BB46-6C7E1F816C1E}" type="pres">
+      <dgm:prSet presAssocID="{DEB3A288-72B2-4CE3-BA0E-2385DCEA1166}" presName="rootComposite" presStyleCnt="0"/>
+      <dgm:spPr/>
+    </dgm:pt>
+    <dgm:pt modelId="{3DCFB508-F20D-419B-97A2-A0EA8AAE62B8}" type="pres">
+      <dgm:prSet presAssocID="{DEB3A288-72B2-4CE3-BA0E-2385DCEA1166}" presName="rootText" presStyleLbl="node2" presStyleIdx="1" presStyleCnt="5">
+        <dgm:presLayoutVars>
+          <dgm:chPref val="3"/>
+        </dgm:presLayoutVars>
+      </dgm:prSet>
       <dgm:spPr/>
       <dgm:t>
         <a:bodyPr/>
@@ -3269,24 +3358,8 @@
         </a:p>
       </dgm:t>
     </dgm:pt>
-    <dgm:pt modelId="{65098B79-47B8-45AD-84EC-59F788BDFBC1}" type="pres">
-      <dgm:prSet presAssocID="{AF9FAEE0-D707-4D4A-BC4E-B00284790C09}" presName="hierRoot2" presStyleCnt="0">
-        <dgm:presLayoutVars>
-          <dgm:hierBranch val="init"/>
-        </dgm:presLayoutVars>
-      </dgm:prSet>
-      <dgm:spPr/>
-    </dgm:pt>
-    <dgm:pt modelId="{B7D893E0-1D88-4382-B898-4989216383B2}" type="pres">
-      <dgm:prSet presAssocID="{AF9FAEE0-D707-4D4A-BC4E-B00284790C09}" presName="rootComposite" presStyleCnt="0"/>
-      <dgm:spPr/>
-    </dgm:pt>
-    <dgm:pt modelId="{AED2CD70-00FB-4D86-A988-A2B3331A944F}" type="pres">
-      <dgm:prSet presAssocID="{AF9FAEE0-D707-4D4A-BC4E-B00284790C09}" presName="rootText" presStyleLbl="node3" presStyleIdx="1" presStyleCnt="9" custLinFactNeighborX="-11737" custLinFactNeighborY="2608">
-        <dgm:presLayoutVars>
-          <dgm:chPref val="3"/>
-        </dgm:presLayoutVars>
-      </dgm:prSet>
+    <dgm:pt modelId="{D1586E0D-5339-4871-B373-DE07F6A4B31A}" type="pres">
+      <dgm:prSet presAssocID="{DEB3A288-72B2-4CE3-BA0E-2385DCEA1166}" presName="rootConnector" presStyleLbl="node2" presStyleIdx="1" presStyleCnt="5"/>
       <dgm:spPr/>
       <dgm:t>
         <a:bodyPr/>
@@ -3296,8 +3369,16 @@
         </a:p>
       </dgm:t>
     </dgm:pt>
-    <dgm:pt modelId="{7A248573-B914-4159-ACEE-81EFF21A290C}" type="pres">
-      <dgm:prSet presAssocID="{AF9FAEE0-D707-4D4A-BC4E-B00284790C09}" presName="rootConnector" presStyleLbl="node3" presStyleIdx="1" presStyleCnt="9"/>
+    <dgm:pt modelId="{1E188EC2-DBC6-4C65-BECE-BD2803FEF22A}" type="pres">
+      <dgm:prSet presAssocID="{DEB3A288-72B2-4CE3-BA0E-2385DCEA1166}" presName="hierChild4" presStyleCnt="0"/>
+      <dgm:spPr/>
+    </dgm:pt>
+    <dgm:pt modelId="{7BDB545F-D926-4F24-ADC0-2F94B2F38341}" type="pres">
+      <dgm:prSet presAssocID="{DEB3A288-72B2-4CE3-BA0E-2385DCEA1166}" presName="hierChild5" presStyleCnt="0"/>
+      <dgm:spPr/>
+    </dgm:pt>
+    <dgm:pt modelId="{075DE7FD-AB6D-45A1-88B5-F6DE55537A5C}" type="pres">
+      <dgm:prSet presAssocID="{1F891C72-4331-4225-9131-EE90A5156BCC}" presName="Name37" presStyleLbl="parChTrans1D2" presStyleIdx="2" presStyleCnt="5"/>
       <dgm:spPr/>
       <dgm:t>
         <a:bodyPr/>
@@ -3307,16 +3388,24 @@
         </a:p>
       </dgm:t>
     </dgm:pt>
-    <dgm:pt modelId="{DEA8D9E0-A8CA-48EF-A2A5-7B4EACBDC6EA}" type="pres">
-      <dgm:prSet presAssocID="{AF9FAEE0-D707-4D4A-BC4E-B00284790C09}" presName="hierChild4" presStyleCnt="0"/>
-      <dgm:spPr/>
-    </dgm:pt>
-    <dgm:pt modelId="{601F07B1-5063-4BCA-9450-53D749FA758F}" type="pres">
-      <dgm:prSet presAssocID="{AF9FAEE0-D707-4D4A-BC4E-B00284790C09}" presName="hierChild5" presStyleCnt="0"/>
-      <dgm:spPr/>
-    </dgm:pt>
-    <dgm:pt modelId="{83BFE1B7-4CFE-4414-B2E2-2937D4F9C17F}" type="pres">
-      <dgm:prSet presAssocID="{188D1000-0E2B-4CE9-B4EC-57DF98E5B370}" presName="Name37" presStyleLbl="parChTrans1D3" presStyleIdx="2" presStyleCnt="9"/>
+    <dgm:pt modelId="{9D85BD58-234E-4F80-9935-D3C313D0B352}" type="pres">
+      <dgm:prSet presAssocID="{3E7D5DE8-38A7-4D01-B3B1-C41B904AFB24}" presName="hierRoot2" presStyleCnt="0">
+        <dgm:presLayoutVars>
+          <dgm:hierBranch val="init"/>
+        </dgm:presLayoutVars>
+      </dgm:prSet>
+      <dgm:spPr/>
+    </dgm:pt>
+    <dgm:pt modelId="{65E4694B-41D9-4797-84FF-7E0A04BEBBE2}" type="pres">
+      <dgm:prSet presAssocID="{3E7D5DE8-38A7-4D01-B3B1-C41B904AFB24}" presName="rootComposite" presStyleCnt="0"/>
+      <dgm:spPr/>
+    </dgm:pt>
+    <dgm:pt modelId="{D0C42A0A-227F-498C-9217-1F2A4E39F4AC}" type="pres">
+      <dgm:prSet presAssocID="{3E7D5DE8-38A7-4D01-B3B1-C41B904AFB24}" presName="rootText" presStyleLbl="node2" presStyleIdx="2" presStyleCnt="5">
+        <dgm:presLayoutVars>
+          <dgm:chPref val="3"/>
+        </dgm:presLayoutVars>
+      </dgm:prSet>
       <dgm:spPr/>
       <dgm:t>
         <a:bodyPr/>
@@ -3326,24 +3415,8 @@
         </a:p>
       </dgm:t>
     </dgm:pt>
-    <dgm:pt modelId="{459CC44D-C8B1-4635-A6BE-852CC0735C79}" type="pres">
-      <dgm:prSet presAssocID="{32A588C2-228D-4B26-9C8B-90CDFD0FC08B}" presName="hierRoot2" presStyleCnt="0">
-        <dgm:presLayoutVars>
-          <dgm:hierBranch val="init"/>
-        </dgm:presLayoutVars>
-      </dgm:prSet>
-      <dgm:spPr/>
-    </dgm:pt>
-    <dgm:pt modelId="{729F2795-3FC9-482D-A6E8-681E4BBC0F27}" type="pres">
-      <dgm:prSet presAssocID="{32A588C2-228D-4B26-9C8B-90CDFD0FC08B}" presName="rootComposite" presStyleCnt="0"/>
-      <dgm:spPr/>
-    </dgm:pt>
-    <dgm:pt modelId="{9C5E7AE7-E733-492C-8D9D-2B4E12574136}" type="pres">
-      <dgm:prSet presAssocID="{32A588C2-228D-4B26-9C8B-90CDFD0FC08B}" presName="rootText" presStyleLbl="node3" presStyleIdx="2" presStyleCnt="9" custLinFactNeighborX="-11737" custLinFactNeighborY="2608">
-        <dgm:presLayoutVars>
-          <dgm:chPref val="3"/>
-        </dgm:presLayoutVars>
-      </dgm:prSet>
+    <dgm:pt modelId="{D47F8C64-7351-47DD-ABB9-3A4D5CE04EBC}" type="pres">
+      <dgm:prSet presAssocID="{3E7D5DE8-38A7-4D01-B3B1-C41B904AFB24}" presName="rootConnector" presStyleLbl="node2" presStyleIdx="2" presStyleCnt="5"/>
       <dgm:spPr/>
       <dgm:t>
         <a:bodyPr/>
@@ -3353,8 +3426,12 @@
         </a:p>
       </dgm:t>
     </dgm:pt>
-    <dgm:pt modelId="{6AB2AA11-CB4E-478D-B63B-A0BF5B893B44}" type="pres">
-      <dgm:prSet presAssocID="{32A588C2-228D-4B26-9C8B-90CDFD0FC08B}" presName="rootConnector" presStyleLbl="node3" presStyleIdx="2" presStyleCnt="9"/>
+    <dgm:pt modelId="{0EB07231-3CA0-42A8-AE42-EFF984FC9A65}" type="pres">
+      <dgm:prSet presAssocID="{3E7D5DE8-38A7-4D01-B3B1-C41B904AFB24}" presName="hierChild4" presStyleCnt="0"/>
+      <dgm:spPr/>
+    </dgm:pt>
+    <dgm:pt modelId="{A148AF3D-8225-4C90-9973-D39067016BF1}" type="pres">
+      <dgm:prSet presAssocID="{5A94BF89-F459-4076-B825-3EF69867B9E6}" presName="Name37" presStyleLbl="parChTrans1D3" presStyleIdx="3" presStyleCnt="9"/>
       <dgm:spPr/>
       <dgm:t>
         <a:bodyPr/>
@@ -3364,20 +3441,24 @@
         </a:p>
       </dgm:t>
     </dgm:pt>
-    <dgm:pt modelId="{CB7BB7FB-F6D9-464D-8147-B1D785A2A656}" type="pres">
-      <dgm:prSet presAssocID="{32A588C2-228D-4B26-9C8B-90CDFD0FC08B}" presName="hierChild4" presStyleCnt="0"/>
-      <dgm:spPr/>
-    </dgm:pt>
-    <dgm:pt modelId="{7D98686E-4B2F-406D-9145-91C4756133B1}" type="pres">
-      <dgm:prSet presAssocID="{32A588C2-228D-4B26-9C8B-90CDFD0FC08B}" presName="hierChild5" presStyleCnt="0"/>
-      <dgm:spPr/>
-    </dgm:pt>
-    <dgm:pt modelId="{AFF660C7-7594-4A5C-9B19-EA55042202B5}" type="pres">
-      <dgm:prSet presAssocID="{D0D5EBBE-C984-451E-A77C-06635B96115A}" presName="hierChild5" presStyleCnt="0"/>
-      <dgm:spPr/>
-    </dgm:pt>
-    <dgm:pt modelId="{A3C064E1-EB83-4A90-BC9B-363A4369B1D9}" type="pres">
-      <dgm:prSet presAssocID="{AE15057E-D275-4CBA-BBDA-7AFB5273F6D0}" presName="Name37" presStyleLbl="parChTrans1D2" presStyleIdx="1" presStyleCnt="5"/>
+    <dgm:pt modelId="{0ACF801A-7B48-49C3-8A6E-CA4C0C45AF98}" type="pres">
+      <dgm:prSet presAssocID="{C4E9236B-D5FB-402F-9C08-8917C5806671}" presName="hierRoot2" presStyleCnt="0">
+        <dgm:presLayoutVars>
+          <dgm:hierBranch val="init"/>
+        </dgm:presLayoutVars>
+      </dgm:prSet>
+      <dgm:spPr/>
+    </dgm:pt>
+    <dgm:pt modelId="{40E4F4C8-F940-4406-A70A-5688CE993E72}" type="pres">
+      <dgm:prSet presAssocID="{C4E9236B-D5FB-402F-9C08-8917C5806671}" presName="rootComposite" presStyleCnt="0"/>
+      <dgm:spPr/>
+    </dgm:pt>
+    <dgm:pt modelId="{426BD5C4-6298-4765-92B5-5BE6F449DD28}" type="pres">
+      <dgm:prSet presAssocID="{C4E9236B-D5FB-402F-9C08-8917C5806671}" presName="rootText" presStyleLbl="node3" presStyleIdx="3" presStyleCnt="9" custScaleX="82877" custScaleY="56225">
+        <dgm:presLayoutVars>
+          <dgm:chPref val="3"/>
+        </dgm:presLayoutVars>
+      </dgm:prSet>
       <dgm:spPr/>
       <dgm:t>
         <a:bodyPr/>
@@ -3387,24 +3468,8 @@
         </a:p>
       </dgm:t>
     </dgm:pt>
-    <dgm:pt modelId="{5F49EB11-AF2A-43A7-A5F6-C818A93333A4}" type="pres">
-      <dgm:prSet presAssocID="{DEB3A288-72B2-4CE3-BA0E-2385DCEA1166}" presName="hierRoot2" presStyleCnt="0">
-        <dgm:presLayoutVars>
-          <dgm:hierBranch val="init"/>
-        </dgm:presLayoutVars>
-      </dgm:prSet>
-      <dgm:spPr/>
-    </dgm:pt>
-    <dgm:pt modelId="{3EA9B75B-9B66-4B39-BB46-6C7E1F816C1E}" type="pres">
-      <dgm:prSet presAssocID="{DEB3A288-72B2-4CE3-BA0E-2385DCEA1166}" presName="rootComposite" presStyleCnt="0"/>
-      <dgm:spPr/>
-    </dgm:pt>
-    <dgm:pt modelId="{3DCFB508-F20D-419B-97A2-A0EA8AAE62B8}" type="pres">
-      <dgm:prSet presAssocID="{DEB3A288-72B2-4CE3-BA0E-2385DCEA1166}" presName="rootText" presStyleLbl="node2" presStyleIdx="1" presStyleCnt="5">
-        <dgm:presLayoutVars>
-          <dgm:chPref val="3"/>
-        </dgm:presLayoutVars>
-      </dgm:prSet>
+    <dgm:pt modelId="{1A4D12E3-2EEF-4745-BCD2-3B9AFD0CBE3F}" type="pres">
+      <dgm:prSet presAssocID="{C4E9236B-D5FB-402F-9C08-8917C5806671}" presName="rootConnector" presStyleLbl="node3" presStyleIdx="3" presStyleCnt="9"/>
       <dgm:spPr/>
       <dgm:t>
         <a:bodyPr/>
@@ -3414,8 +3479,16 @@
         </a:p>
       </dgm:t>
     </dgm:pt>
-    <dgm:pt modelId="{D1586E0D-5339-4871-B373-DE07F6A4B31A}" type="pres">
-      <dgm:prSet presAssocID="{DEB3A288-72B2-4CE3-BA0E-2385DCEA1166}" presName="rootConnector" presStyleLbl="node2" presStyleIdx="1" presStyleCnt="5"/>
+    <dgm:pt modelId="{691979FA-4AA7-499E-96E3-2630F7706F7C}" type="pres">
+      <dgm:prSet presAssocID="{C4E9236B-D5FB-402F-9C08-8917C5806671}" presName="hierChild4" presStyleCnt="0"/>
+      <dgm:spPr/>
+    </dgm:pt>
+    <dgm:pt modelId="{B2195A48-A994-49B7-AD2C-C016D6FF4D55}" type="pres">
+      <dgm:prSet presAssocID="{C4E9236B-D5FB-402F-9C08-8917C5806671}" presName="hierChild5" presStyleCnt="0"/>
+      <dgm:spPr/>
+    </dgm:pt>
+    <dgm:pt modelId="{DE72DF6E-144C-454B-9565-EC52D8FB4D37}" type="pres">
+      <dgm:prSet presAssocID="{04B442D8-6F45-4C79-8A4C-6886FDE02F97}" presName="Name37" presStyleLbl="parChTrans1D3" presStyleIdx="4" presStyleCnt="9"/>
       <dgm:spPr/>
       <dgm:t>
         <a:bodyPr/>
@@ -3425,16 +3498,24 @@
         </a:p>
       </dgm:t>
     </dgm:pt>
-    <dgm:pt modelId="{1E188EC2-DBC6-4C65-BECE-BD2803FEF22A}" type="pres">
-      <dgm:prSet presAssocID="{DEB3A288-72B2-4CE3-BA0E-2385DCEA1166}" presName="hierChild4" presStyleCnt="0"/>
-      <dgm:spPr/>
-    </dgm:pt>
-    <dgm:pt modelId="{7BDB545F-D926-4F24-ADC0-2F94B2F38341}" type="pres">
-      <dgm:prSet presAssocID="{DEB3A288-72B2-4CE3-BA0E-2385DCEA1166}" presName="hierChild5" presStyleCnt="0"/>
-      <dgm:spPr/>
-    </dgm:pt>
-    <dgm:pt modelId="{075DE7FD-AB6D-45A1-88B5-F6DE55537A5C}" type="pres">
-      <dgm:prSet presAssocID="{1F891C72-4331-4225-9131-EE90A5156BCC}" presName="Name37" presStyleLbl="parChTrans1D2" presStyleIdx="2" presStyleCnt="5"/>
+    <dgm:pt modelId="{BB759B9C-E166-4318-8783-39AF6A31B605}" type="pres">
+      <dgm:prSet presAssocID="{C5D14313-4718-4BA4-8034-5E4E2ACBCC70}" presName="hierRoot2" presStyleCnt="0">
+        <dgm:presLayoutVars>
+          <dgm:hierBranch val="init"/>
+        </dgm:presLayoutVars>
+      </dgm:prSet>
+      <dgm:spPr/>
+    </dgm:pt>
+    <dgm:pt modelId="{BCEFBE32-E840-4B19-88F0-92A0A913E41C}" type="pres">
+      <dgm:prSet presAssocID="{C5D14313-4718-4BA4-8034-5E4E2ACBCC70}" presName="rootComposite" presStyleCnt="0"/>
+      <dgm:spPr/>
+    </dgm:pt>
+    <dgm:pt modelId="{425B22CD-323F-4E0B-BEA0-EC7E00D9ABF2}" type="pres">
+      <dgm:prSet presAssocID="{C5D14313-4718-4BA4-8034-5E4E2ACBCC70}" presName="rootText" presStyleLbl="node3" presStyleIdx="4" presStyleCnt="9" custScaleX="82877" custScaleY="56225">
+        <dgm:presLayoutVars>
+          <dgm:chPref val="3"/>
+        </dgm:presLayoutVars>
+      </dgm:prSet>
       <dgm:spPr/>
       <dgm:t>
         <a:bodyPr/>
@@ -3444,24 +3525,8 @@
         </a:p>
       </dgm:t>
     </dgm:pt>
-    <dgm:pt modelId="{9D85BD58-234E-4F80-9935-D3C313D0B352}" type="pres">
-      <dgm:prSet presAssocID="{3E7D5DE8-38A7-4D01-B3B1-C41B904AFB24}" presName="hierRoot2" presStyleCnt="0">
-        <dgm:presLayoutVars>
-          <dgm:hierBranch val="init"/>
-        </dgm:presLayoutVars>
-      </dgm:prSet>
-      <dgm:spPr/>
-    </dgm:pt>
-    <dgm:pt modelId="{65E4694B-41D9-4797-84FF-7E0A04BEBBE2}" type="pres">
-      <dgm:prSet presAssocID="{3E7D5DE8-38A7-4D01-B3B1-C41B904AFB24}" presName="rootComposite" presStyleCnt="0"/>
-      <dgm:spPr/>
-    </dgm:pt>
-    <dgm:pt modelId="{D0C42A0A-227F-498C-9217-1F2A4E39F4AC}" type="pres">
-      <dgm:prSet presAssocID="{3E7D5DE8-38A7-4D01-B3B1-C41B904AFB24}" presName="rootText" presStyleLbl="node2" presStyleIdx="2" presStyleCnt="5">
-        <dgm:presLayoutVars>
-          <dgm:chPref val="3"/>
-        </dgm:presLayoutVars>
-      </dgm:prSet>
+    <dgm:pt modelId="{CFB84857-AF84-4F8B-907E-44B005282350}" type="pres">
+      <dgm:prSet presAssocID="{C5D14313-4718-4BA4-8034-5E4E2ACBCC70}" presName="rootConnector" presStyleLbl="node3" presStyleIdx="4" presStyleCnt="9"/>
       <dgm:spPr/>
       <dgm:t>
         <a:bodyPr/>
@@ -3471,8 +3536,16 @@
         </a:p>
       </dgm:t>
     </dgm:pt>
-    <dgm:pt modelId="{D47F8C64-7351-47DD-ABB9-3A4D5CE04EBC}" type="pres">
-      <dgm:prSet presAssocID="{3E7D5DE8-38A7-4D01-B3B1-C41B904AFB24}" presName="rootConnector" presStyleLbl="node2" presStyleIdx="2" presStyleCnt="5"/>
+    <dgm:pt modelId="{555F9CE5-6B4F-41EE-A503-E2A482DE4442}" type="pres">
+      <dgm:prSet presAssocID="{C5D14313-4718-4BA4-8034-5E4E2ACBCC70}" presName="hierChild4" presStyleCnt="0"/>
+      <dgm:spPr/>
+    </dgm:pt>
+    <dgm:pt modelId="{C3278657-5DCC-4AAB-B407-739B9E618D69}" type="pres">
+      <dgm:prSet presAssocID="{C5D14313-4718-4BA4-8034-5E4E2ACBCC70}" presName="hierChild5" presStyleCnt="0"/>
+      <dgm:spPr/>
+    </dgm:pt>
+    <dgm:pt modelId="{FB0D67E1-4705-4C5A-A8BE-E373C4C7F8DC}" type="pres">
+      <dgm:prSet presAssocID="{D81EE60C-1689-4013-8B94-71E45948E61C}" presName="Name37" presStyleLbl="parChTrans1D3" presStyleIdx="5" presStyleCnt="9"/>
       <dgm:spPr/>
       <dgm:t>
         <a:bodyPr/>
@@ -3482,12 +3555,24 @@
         </a:p>
       </dgm:t>
     </dgm:pt>
-    <dgm:pt modelId="{0EB07231-3CA0-42A8-AE42-EFF984FC9A65}" type="pres">
-      <dgm:prSet presAssocID="{3E7D5DE8-38A7-4D01-B3B1-C41B904AFB24}" presName="hierChild4" presStyleCnt="0"/>
-      <dgm:spPr/>
-    </dgm:pt>
-    <dgm:pt modelId="{A148AF3D-8225-4C90-9973-D39067016BF1}" type="pres">
-      <dgm:prSet presAssocID="{5A94BF89-F459-4076-B825-3EF69867B9E6}" presName="Name37" presStyleLbl="parChTrans1D3" presStyleIdx="3" presStyleCnt="9"/>
+    <dgm:pt modelId="{12F69B15-CF2E-40D3-8957-9480010322BC}" type="pres">
+      <dgm:prSet presAssocID="{9CF9D14A-D997-48A5-ACA0-BD0A85F323A1}" presName="hierRoot2" presStyleCnt="0">
+        <dgm:presLayoutVars>
+          <dgm:hierBranch val="init"/>
+        </dgm:presLayoutVars>
+      </dgm:prSet>
+      <dgm:spPr/>
+    </dgm:pt>
+    <dgm:pt modelId="{00B0645B-7068-4CF2-86BC-E71D677EED41}" type="pres">
+      <dgm:prSet presAssocID="{9CF9D14A-D997-48A5-ACA0-BD0A85F323A1}" presName="rootComposite" presStyleCnt="0"/>
+      <dgm:spPr/>
+    </dgm:pt>
+    <dgm:pt modelId="{AB7ECE86-F423-469A-804C-9E0A6711CE75}" type="pres">
+      <dgm:prSet presAssocID="{9CF9D14A-D997-48A5-ACA0-BD0A85F323A1}" presName="rootText" presStyleLbl="node3" presStyleIdx="5" presStyleCnt="9" custScaleX="82877" custScaleY="56225">
+        <dgm:presLayoutVars>
+          <dgm:chPref val="3"/>
+        </dgm:presLayoutVars>
+      </dgm:prSet>
       <dgm:spPr/>
       <dgm:t>
         <a:bodyPr/>
@@ -3497,24 +3582,8 @@
         </a:p>
       </dgm:t>
     </dgm:pt>
-    <dgm:pt modelId="{0ACF801A-7B48-49C3-8A6E-CA4C0C45AF98}" type="pres">
-      <dgm:prSet presAssocID="{C4E9236B-D5FB-402F-9C08-8917C5806671}" presName="hierRoot2" presStyleCnt="0">
-        <dgm:presLayoutVars>
-          <dgm:hierBranch val="init"/>
-        </dgm:presLayoutVars>
-      </dgm:prSet>
-      <dgm:spPr/>
-    </dgm:pt>
-    <dgm:pt modelId="{40E4F4C8-F940-4406-A70A-5688CE993E72}" type="pres">
-      <dgm:prSet presAssocID="{C4E9236B-D5FB-402F-9C08-8917C5806671}" presName="rootComposite" presStyleCnt="0"/>
-      <dgm:spPr/>
-    </dgm:pt>
-    <dgm:pt modelId="{426BD5C4-6298-4765-92B5-5BE6F449DD28}" type="pres">
-      <dgm:prSet presAssocID="{C4E9236B-D5FB-402F-9C08-8917C5806671}" presName="rootText" presStyleLbl="node3" presStyleIdx="3" presStyleCnt="9" custScaleX="82877" custScaleY="56225">
-        <dgm:presLayoutVars>
-          <dgm:chPref val="3"/>
-        </dgm:presLayoutVars>
-      </dgm:prSet>
+    <dgm:pt modelId="{37F9F289-47AC-4257-A31F-E2E8F2183DC3}" type="pres">
+      <dgm:prSet presAssocID="{9CF9D14A-D997-48A5-ACA0-BD0A85F323A1}" presName="rootConnector" presStyleLbl="node3" presStyleIdx="5" presStyleCnt="9"/>
       <dgm:spPr/>
       <dgm:t>
         <a:bodyPr/>
@@ -3524,8 +3593,16 @@
         </a:p>
       </dgm:t>
     </dgm:pt>
-    <dgm:pt modelId="{1A4D12E3-2EEF-4745-BCD2-3B9AFD0CBE3F}" type="pres">
-      <dgm:prSet presAssocID="{C4E9236B-D5FB-402F-9C08-8917C5806671}" presName="rootConnector" presStyleLbl="node3" presStyleIdx="3" presStyleCnt="9"/>
+    <dgm:pt modelId="{0756DBE1-0E1B-4509-A40C-2596EFA974BD}" type="pres">
+      <dgm:prSet presAssocID="{9CF9D14A-D997-48A5-ACA0-BD0A85F323A1}" presName="hierChild4" presStyleCnt="0"/>
+      <dgm:spPr/>
+    </dgm:pt>
+    <dgm:pt modelId="{2CC3C5A6-212A-406C-A47B-1E4C5C93C0F1}" type="pres">
+      <dgm:prSet presAssocID="{9CF9D14A-D997-48A5-ACA0-BD0A85F323A1}" presName="hierChild5" presStyleCnt="0"/>
+      <dgm:spPr/>
+    </dgm:pt>
+    <dgm:pt modelId="{6BB70260-FBF6-4FD9-8B99-A7ECE1F53A39}" type="pres">
+      <dgm:prSet presAssocID="{C206CBEC-A310-48C5-A1E3-51069AAB7E06}" presName="Name37" presStyleLbl="parChTrans1D3" presStyleIdx="6" presStyleCnt="9"/>
       <dgm:spPr/>
       <dgm:t>
         <a:bodyPr/>
@@ -3535,16 +3612,24 @@
         </a:p>
       </dgm:t>
     </dgm:pt>
-    <dgm:pt modelId="{691979FA-4AA7-499E-96E3-2630F7706F7C}" type="pres">
-      <dgm:prSet presAssocID="{C4E9236B-D5FB-402F-9C08-8917C5806671}" presName="hierChild4" presStyleCnt="0"/>
-      <dgm:spPr/>
-    </dgm:pt>
-    <dgm:pt modelId="{B2195A48-A994-49B7-AD2C-C016D6FF4D55}" type="pres">
-      <dgm:prSet presAssocID="{C4E9236B-D5FB-402F-9C08-8917C5806671}" presName="hierChild5" presStyleCnt="0"/>
-      <dgm:spPr/>
-    </dgm:pt>
-    <dgm:pt modelId="{DE72DF6E-144C-454B-9565-EC52D8FB4D37}" type="pres">
-      <dgm:prSet presAssocID="{04B442D8-6F45-4C79-8A4C-6886FDE02F97}" presName="Name37" presStyleLbl="parChTrans1D3" presStyleIdx="4" presStyleCnt="9"/>
+    <dgm:pt modelId="{CB8079F8-3BBB-455B-A366-62293B5B4128}" type="pres">
+      <dgm:prSet presAssocID="{FEF5EF31-1DF3-4F02-8BF5-0FAA9FBF05DF}" presName="hierRoot2" presStyleCnt="0">
+        <dgm:presLayoutVars>
+          <dgm:hierBranch val="init"/>
+        </dgm:presLayoutVars>
+      </dgm:prSet>
+      <dgm:spPr/>
+    </dgm:pt>
+    <dgm:pt modelId="{20A941C0-6B5C-4306-BB47-C60AB75805F0}" type="pres">
+      <dgm:prSet presAssocID="{FEF5EF31-1DF3-4F02-8BF5-0FAA9FBF05DF}" presName="rootComposite" presStyleCnt="0"/>
+      <dgm:spPr/>
+    </dgm:pt>
+    <dgm:pt modelId="{51735A62-65C8-4B72-BC21-EC0033831CB7}" type="pres">
+      <dgm:prSet presAssocID="{FEF5EF31-1DF3-4F02-8BF5-0FAA9FBF05DF}" presName="rootText" presStyleLbl="node3" presStyleIdx="6" presStyleCnt="9" custScaleX="82877" custScaleY="56225">
+        <dgm:presLayoutVars>
+          <dgm:chPref val="3"/>
+        </dgm:presLayoutVars>
+      </dgm:prSet>
       <dgm:spPr/>
       <dgm:t>
         <a:bodyPr/>
@@ -3554,24 +3639,8 @@
         </a:p>
       </dgm:t>
     </dgm:pt>
-    <dgm:pt modelId="{BB759B9C-E166-4318-8783-39AF6A31B605}" type="pres">
-      <dgm:prSet presAssocID="{C5D14313-4718-4BA4-8034-5E4E2ACBCC70}" presName="hierRoot2" presStyleCnt="0">
-        <dgm:presLayoutVars>
-          <dgm:hierBranch val="init"/>
-        </dgm:presLayoutVars>
-      </dgm:prSet>
-      <dgm:spPr/>
-    </dgm:pt>
-    <dgm:pt modelId="{BCEFBE32-E840-4B19-88F0-92A0A913E41C}" type="pres">
-      <dgm:prSet presAssocID="{C5D14313-4718-4BA4-8034-5E4E2ACBCC70}" presName="rootComposite" presStyleCnt="0"/>
-      <dgm:spPr/>
-    </dgm:pt>
-    <dgm:pt modelId="{425B22CD-323F-4E0B-BEA0-EC7E00D9ABF2}" type="pres">
-      <dgm:prSet presAssocID="{C5D14313-4718-4BA4-8034-5E4E2ACBCC70}" presName="rootText" presStyleLbl="node3" presStyleIdx="4" presStyleCnt="9" custScaleX="82877" custScaleY="56225">
-        <dgm:presLayoutVars>
-          <dgm:chPref val="3"/>
-        </dgm:presLayoutVars>
-      </dgm:prSet>
+    <dgm:pt modelId="{29C82EC9-E8DF-43E5-AE26-7FE69F2FE8E3}" type="pres">
+      <dgm:prSet presAssocID="{FEF5EF31-1DF3-4F02-8BF5-0FAA9FBF05DF}" presName="rootConnector" presStyleLbl="node3" presStyleIdx="6" presStyleCnt="9"/>
       <dgm:spPr/>
       <dgm:t>
         <a:bodyPr/>
@@ -3581,8 +3650,16 @@
         </a:p>
       </dgm:t>
     </dgm:pt>
-    <dgm:pt modelId="{CFB84857-AF84-4F8B-907E-44B005282350}" type="pres">
-      <dgm:prSet presAssocID="{C5D14313-4718-4BA4-8034-5E4E2ACBCC70}" presName="rootConnector" presStyleLbl="node3" presStyleIdx="4" presStyleCnt="9"/>
+    <dgm:pt modelId="{0226FF58-35DD-44DA-8330-812BB9861BAB}" type="pres">
+      <dgm:prSet presAssocID="{FEF5EF31-1DF3-4F02-8BF5-0FAA9FBF05DF}" presName="hierChild4" presStyleCnt="0"/>
+      <dgm:spPr/>
+    </dgm:pt>
+    <dgm:pt modelId="{A95144A9-7340-441E-82FD-F72E1E4F2FC1}" type="pres">
+      <dgm:prSet presAssocID="{FEF5EF31-1DF3-4F02-8BF5-0FAA9FBF05DF}" presName="hierChild5" presStyleCnt="0"/>
+      <dgm:spPr/>
+    </dgm:pt>
+    <dgm:pt modelId="{1BF37D4C-6B8D-491C-BFA6-EF055187F912}" type="pres">
+      <dgm:prSet presAssocID="{AE6AB92A-B651-446C-B90D-191341024DCA}" presName="Name37" presStyleLbl="parChTrans1D3" presStyleIdx="7" presStyleCnt="9"/>
       <dgm:spPr/>
       <dgm:t>
         <a:bodyPr/>
@@ -3592,16 +3669,24 @@
         </a:p>
       </dgm:t>
     </dgm:pt>
-    <dgm:pt modelId="{555F9CE5-6B4F-41EE-A503-E2A482DE4442}" type="pres">
-      <dgm:prSet presAssocID="{C5D14313-4718-4BA4-8034-5E4E2ACBCC70}" presName="hierChild4" presStyleCnt="0"/>
-      <dgm:spPr/>
-    </dgm:pt>
-    <dgm:pt modelId="{C3278657-5DCC-4AAB-B407-739B9E618D69}" type="pres">
-      <dgm:prSet presAssocID="{C5D14313-4718-4BA4-8034-5E4E2ACBCC70}" presName="hierChild5" presStyleCnt="0"/>
-      <dgm:spPr/>
-    </dgm:pt>
-    <dgm:pt modelId="{FB0D67E1-4705-4C5A-A8BE-E373C4C7F8DC}" type="pres">
-      <dgm:prSet presAssocID="{D81EE60C-1689-4013-8B94-71E45948E61C}" presName="Name37" presStyleLbl="parChTrans1D3" presStyleIdx="5" presStyleCnt="9"/>
+    <dgm:pt modelId="{86602689-6C9B-46AE-9978-4661220F57E8}" type="pres">
+      <dgm:prSet presAssocID="{2FF04469-EC18-4DEF-9211-026033421D7F}" presName="hierRoot2" presStyleCnt="0">
+        <dgm:presLayoutVars>
+          <dgm:hierBranch val="init"/>
+        </dgm:presLayoutVars>
+      </dgm:prSet>
+      <dgm:spPr/>
+    </dgm:pt>
+    <dgm:pt modelId="{8113BA05-6646-49AD-88B0-3E36D247C6C9}" type="pres">
+      <dgm:prSet presAssocID="{2FF04469-EC18-4DEF-9211-026033421D7F}" presName="rootComposite" presStyleCnt="0"/>
+      <dgm:spPr/>
+    </dgm:pt>
+    <dgm:pt modelId="{BCC10AE4-DC99-4EA0-B027-3C11C8AFFA0B}" type="pres">
+      <dgm:prSet presAssocID="{2FF04469-EC18-4DEF-9211-026033421D7F}" presName="rootText" presStyleLbl="node3" presStyleIdx="7" presStyleCnt="9" custScaleX="82877" custScaleY="56225">
+        <dgm:presLayoutVars>
+          <dgm:chPref val="3"/>
+        </dgm:presLayoutVars>
+      </dgm:prSet>
       <dgm:spPr/>
       <dgm:t>
         <a:bodyPr/>
@@ -3611,24 +3696,8 @@
         </a:p>
       </dgm:t>
     </dgm:pt>
-    <dgm:pt modelId="{12F69B15-CF2E-40D3-8957-9480010322BC}" type="pres">
-      <dgm:prSet presAssocID="{9CF9D14A-D997-48A5-ACA0-BD0A85F323A1}" presName="hierRoot2" presStyleCnt="0">
-        <dgm:presLayoutVars>
-          <dgm:hierBranch val="init"/>
-        </dgm:presLayoutVars>
-      </dgm:prSet>
-      <dgm:spPr/>
-    </dgm:pt>
-    <dgm:pt modelId="{00B0645B-7068-4CF2-86BC-E71D677EED41}" type="pres">
-      <dgm:prSet presAssocID="{9CF9D14A-D997-48A5-ACA0-BD0A85F323A1}" presName="rootComposite" presStyleCnt="0"/>
-      <dgm:spPr/>
-    </dgm:pt>
-    <dgm:pt modelId="{AB7ECE86-F423-469A-804C-9E0A6711CE75}" type="pres">
-      <dgm:prSet presAssocID="{9CF9D14A-D997-48A5-ACA0-BD0A85F323A1}" presName="rootText" presStyleLbl="node3" presStyleIdx="5" presStyleCnt="9" custScaleX="82877" custScaleY="56225">
-        <dgm:presLayoutVars>
-          <dgm:chPref val="3"/>
-        </dgm:presLayoutVars>
-      </dgm:prSet>
+    <dgm:pt modelId="{98EBC135-7D61-4607-8673-88321824B19A}" type="pres">
+      <dgm:prSet presAssocID="{2FF04469-EC18-4DEF-9211-026033421D7F}" presName="rootConnector" presStyleLbl="node3" presStyleIdx="7" presStyleCnt="9"/>
       <dgm:spPr/>
       <dgm:t>
         <a:bodyPr/>
@@ -3638,8 +3707,16 @@
         </a:p>
       </dgm:t>
     </dgm:pt>
-    <dgm:pt modelId="{37F9F289-47AC-4257-A31F-E2E8F2183DC3}" type="pres">
-      <dgm:prSet presAssocID="{9CF9D14A-D997-48A5-ACA0-BD0A85F323A1}" presName="rootConnector" presStyleLbl="node3" presStyleIdx="5" presStyleCnt="9"/>
+    <dgm:pt modelId="{39D676ED-D687-45A8-BAE2-452B3A691EB1}" type="pres">
+      <dgm:prSet presAssocID="{2FF04469-EC18-4DEF-9211-026033421D7F}" presName="hierChild4" presStyleCnt="0"/>
+      <dgm:spPr/>
+    </dgm:pt>
+    <dgm:pt modelId="{C7E5117E-BF0C-4A61-8073-5E57B6BE8C3F}" type="pres">
+      <dgm:prSet presAssocID="{2FF04469-EC18-4DEF-9211-026033421D7F}" presName="hierChild5" presStyleCnt="0"/>
+      <dgm:spPr/>
+    </dgm:pt>
+    <dgm:pt modelId="{00416E62-FBAF-4AA7-AE51-74C6003471F9}" type="pres">
+      <dgm:prSet presAssocID="{ADCBE1B0-B6AB-4350-9FC6-856DD57E9562}" presName="Name37" presStyleLbl="parChTrans1D3" presStyleIdx="8" presStyleCnt="9"/>
       <dgm:spPr/>
       <dgm:t>
         <a:bodyPr/>
@@ -3649,16 +3726,24 @@
         </a:p>
       </dgm:t>
     </dgm:pt>
-    <dgm:pt modelId="{0756DBE1-0E1B-4509-A40C-2596EFA974BD}" type="pres">
-      <dgm:prSet presAssocID="{9CF9D14A-D997-48A5-ACA0-BD0A85F323A1}" presName="hierChild4" presStyleCnt="0"/>
-      <dgm:spPr/>
-    </dgm:pt>
-    <dgm:pt modelId="{2CC3C5A6-212A-406C-A47B-1E4C5C93C0F1}" type="pres">
-      <dgm:prSet presAssocID="{9CF9D14A-D997-48A5-ACA0-BD0A85F323A1}" presName="hierChild5" presStyleCnt="0"/>
-      <dgm:spPr/>
-    </dgm:pt>
-    <dgm:pt modelId="{6BB70260-FBF6-4FD9-8B99-A7ECE1F53A39}" type="pres">
-      <dgm:prSet presAssocID="{C206CBEC-A310-48C5-A1E3-51069AAB7E06}" presName="Name37" presStyleLbl="parChTrans1D3" presStyleIdx="6" presStyleCnt="9"/>
+    <dgm:pt modelId="{63B03767-680D-4D62-96A6-23F74154861A}" type="pres">
+      <dgm:prSet presAssocID="{210B0EF3-C281-4060-A271-E34BD8547342}" presName="hierRoot2" presStyleCnt="0">
+        <dgm:presLayoutVars>
+          <dgm:hierBranch val="init"/>
+        </dgm:presLayoutVars>
+      </dgm:prSet>
+      <dgm:spPr/>
+    </dgm:pt>
+    <dgm:pt modelId="{49735B28-1F9C-4BE5-847A-BC143641476E}" type="pres">
+      <dgm:prSet presAssocID="{210B0EF3-C281-4060-A271-E34BD8547342}" presName="rootComposite" presStyleCnt="0"/>
+      <dgm:spPr/>
+    </dgm:pt>
+    <dgm:pt modelId="{F75D6229-E722-4C5A-8752-308DFF186597}" type="pres">
+      <dgm:prSet presAssocID="{210B0EF3-C281-4060-A271-E34BD8547342}" presName="rootText" presStyleLbl="node3" presStyleIdx="8" presStyleCnt="9" custScaleX="82877" custScaleY="56225">
+        <dgm:presLayoutVars>
+          <dgm:chPref val="3"/>
+        </dgm:presLayoutVars>
+      </dgm:prSet>
       <dgm:spPr/>
       <dgm:t>
         <a:bodyPr/>
@@ -3668,24 +3753,8 @@
         </a:p>
       </dgm:t>
     </dgm:pt>
-    <dgm:pt modelId="{CB8079F8-3BBB-455B-A366-62293B5B4128}" type="pres">
-      <dgm:prSet presAssocID="{FEF5EF31-1DF3-4F02-8BF5-0FAA9FBF05DF}" presName="hierRoot2" presStyleCnt="0">
-        <dgm:presLayoutVars>
-          <dgm:hierBranch val="init"/>
-        </dgm:presLayoutVars>
-      </dgm:prSet>
-      <dgm:spPr/>
-    </dgm:pt>
-    <dgm:pt modelId="{20A941C0-6B5C-4306-BB47-C60AB75805F0}" type="pres">
-      <dgm:prSet presAssocID="{FEF5EF31-1DF3-4F02-8BF5-0FAA9FBF05DF}" presName="rootComposite" presStyleCnt="0"/>
-      <dgm:spPr/>
-    </dgm:pt>
-    <dgm:pt modelId="{51735A62-65C8-4B72-BC21-EC0033831CB7}" type="pres">
-      <dgm:prSet presAssocID="{FEF5EF31-1DF3-4F02-8BF5-0FAA9FBF05DF}" presName="rootText" presStyleLbl="node3" presStyleIdx="6" presStyleCnt="9" custScaleX="82877" custScaleY="56225">
-        <dgm:presLayoutVars>
-          <dgm:chPref val="3"/>
-        </dgm:presLayoutVars>
-      </dgm:prSet>
+    <dgm:pt modelId="{D84F31A6-8A16-490F-B798-6B1CCC52D4CD}" type="pres">
+      <dgm:prSet presAssocID="{210B0EF3-C281-4060-A271-E34BD8547342}" presName="rootConnector" presStyleLbl="node3" presStyleIdx="8" presStyleCnt="9"/>
       <dgm:spPr/>
       <dgm:t>
         <a:bodyPr/>
@@ -3695,8 +3764,20 @@
         </a:p>
       </dgm:t>
     </dgm:pt>
-    <dgm:pt modelId="{29C82EC9-E8DF-43E5-AE26-7FE69F2FE8E3}" type="pres">
-      <dgm:prSet presAssocID="{FEF5EF31-1DF3-4F02-8BF5-0FAA9FBF05DF}" presName="rootConnector" presStyleLbl="node3" presStyleIdx="6" presStyleCnt="9"/>
+    <dgm:pt modelId="{B7DCC22D-685E-4B67-91EC-8CA4B10F28F1}" type="pres">
+      <dgm:prSet presAssocID="{210B0EF3-C281-4060-A271-E34BD8547342}" presName="hierChild4" presStyleCnt="0"/>
+      <dgm:spPr/>
+    </dgm:pt>
+    <dgm:pt modelId="{6AF3560C-5408-4952-8A6A-679FB0CCDFD1}" type="pres">
+      <dgm:prSet presAssocID="{210B0EF3-C281-4060-A271-E34BD8547342}" presName="hierChild5" presStyleCnt="0"/>
+      <dgm:spPr/>
+    </dgm:pt>
+    <dgm:pt modelId="{9CDF5DD1-7548-4624-9C39-EA2F57F03E6C}" type="pres">
+      <dgm:prSet presAssocID="{3E7D5DE8-38A7-4D01-B3B1-C41B904AFB24}" presName="hierChild5" presStyleCnt="0"/>
+      <dgm:spPr/>
+    </dgm:pt>
+    <dgm:pt modelId="{1FD30025-BE06-4C8D-8024-6353A3A86C64}" type="pres">
+      <dgm:prSet presAssocID="{06A4DF89-C148-4CB0-BC1C-719E15C3A380}" presName="Name37" presStyleLbl="parChTrans1D2" presStyleIdx="3" presStyleCnt="5"/>
       <dgm:spPr/>
       <dgm:t>
         <a:bodyPr/>
@@ -3706,16 +3787,24 @@
         </a:p>
       </dgm:t>
     </dgm:pt>
-    <dgm:pt modelId="{0226FF58-35DD-44DA-8330-812BB9861BAB}" type="pres">
-      <dgm:prSet presAssocID="{FEF5EF31-1DF3-4F02-8BF5-0FAA9FBF05DF}" presName="hierChild4" presStyleCnt="0"/>
-      <dgm:spPr/>
-    </dgm:pt>
-    <dgm:pt modelId="{A95144A9-7340-441E-82FD-F72E1E4F2FC1}" type="pres">
-      <dgm:prSet presAssocID="{FEF5EF31-1DF3-4F02-8BF5-0FAA9FBF05DF}" presName="hierChild5" presStyleCnt="0"/>
-      <dgm:spPr/>
-    </dgm:pt>
-    <dgm:pt modelId="{1BF37D4C-6B8D-491C-BFA6-EF055187F912}" type="pres">
-      <dgm:prSet presAssocID="{AE6AB92A-B651-446C-B90D-191341024DCA}" presName="Name37" presStyleLbl="parChTrans1D3" presStyleIdx="7" presStyleCnt="9"/>
+    <dgm:pt modelId="{031ED071-E8F0-4ADE-BB27-DE25D6F99C8E}" type="pres">
+      <dgm:prSet presAssocID="{CFC8A77C-E037-4F39-89BC-7C46B2FFF6C3}" presName="hierRoot2" presStyleCnt="0">
+        <dgm:presLayoutVars>
+          <dgm:hierBranch val="init"/>
+        </dgm:presLayoutVars>
+      </dgm:prSet>
+      <dgm:spPr/>
+    </dgm:pt>
+    <dgm:pt modelId="{ED920AE2-8DD7-43C4-A091-03032651C021}" type="pres">
+      <dgm:prSet presAssocID="{CFC8A77C-E037-4F39-89BC-7C46B2FFF6C3}" presName="rootComposite" presStyleCnt="0"/>
+      <dgm:spPr/>
+    </dgm:pt>
+    <dgm:pt modelId="{B512DCC2-F8AD-4A88-8224-BF794CC14E60}" type="pres">
+      <dgm:prSet presAssocID="{CFC8A77C-E037-4F39-89BC-7C46B2FFF6C3}" presName="rootText" presStyleLbl="node2" presStyleIdx="3" presStyleCnt="5">
+        <dgm:presLayoutVars>
+          <dgm:chPref val="3"/>
+        </dgm:presLayoutVars>
+      </dgm:prSet>
       <dgm:spPr/>
       <dgm:t>
         <a:bodyPr/>
@@ -3725,24 +3814,8 @@
         </a:p>
       </dgm:t>
     </dgm:pt>
-    <dgm:pt modelId="{86602689-6C9B-46AE-9978-4661220F57E8}" type="pres">
-      <dgm:prSet presAssocID="{2FF04469-EC18-4DEF-9211-026033421D7F}" presName="hierRoot2" presStyleCnt="0">
-        <dgm:presLayoutVars>
-          <dgm:hierBranch val="init"/>
-        </dgm:presLayoutVars>
-      </dgm:prSet>
-      <dgm:spPr/>
-    </dgm:pt>
-    <dgm:pt modelId="{8113BA05-6646-49AD-88B0-3E36D247C6C9}" type="pres">
-      <dgm:prSet presAssocID="{2FF04469-EC18-4DEF-9211-026033421D7F}" presName="rootComposite" presStyleCnt="0"/>
-      <dgm:spPr/>
-    </dgm:pt>
-    <dgm:pt modelId="{BCC10AE4-DC99-4EA0-B027-3C11C8AFFA0B}" type="pres">
-      <dgm:prSet presAssocID="{2FF04469-EC18-4DEF-9211-026033421D7F}" presName="rootText" presStyleLbl="node3" presStyleIdx="7" presStyleCnt="9" custScaleX="82877" custScaleY="56225">
-        <dgm:presLayoutVars>
-          <dgm:chPref val="3"/>
-        </dgm:presLayoutVars>
-      </dgm:prSet>
+    <dgm:pt modelId="{C385DBD7-122C-4C76-95AA-F0EDDD576213}" type="pres">
+      <dgm:prSet presAssocID="{CFC8A77C-E037-4F39-89BC-7C46B2FFF6C3}" presName="rootConnector" presStyleLbl="node2" presStyleIdx="3" presStyleCnt="5"/>
       <dgm:spPr/>
       <dgm:t>
         <a:bodyPr/>
@@ -3752,8 +3825,16 @@
         </a:p>
       </dgm:t>
     </dgm:pt>
-    <dgm:pt modelId="{98EBC135-7D61-4607-8673-88321824B19A}" type="pres">
-      <dgm:prSet presAssocID="{2FF04469-EC18-4DEF-9211-026033421D7F}" presName="rootConnector" presStyleLbl="node3" presStyleIdx="7" presStyleCnt="9"/>
+    <dgm:pt modelId="{DE86AFEF-E43B-4AD5-AF14-454FCFC84E45}" type="pres">
+      <dgm:prSet presAssocID="{CFC8A77C-E037-4F39-89BC-7C46B2FFF6C3}" presName="hierChild4" presStyleCnt="0"/>
+      <dgm:spPr/>
+    </dgm:pt>
+    <dgm:pt modelId="{6FF4677D-D383-478C-80F4-343DD5F2C277}" type="pres">
+      <dgm:prSet presAssocID="{CFC8A77C-E037-4F39-89BC-7C46B2FFF6C3}" presName="hierChild5" presStyleCnt="0"/>
+      <dgm:spPr/>
+    </dgm:pt>
+    <dgm:pt modelId="{87BE5EB3-DB60-4F74-8CAB-579081070155}" type="pres">
+      <dgm:prSet presAssocID="{77057196-36D4-4297-8DBE-9DF4DC99769E}" presName="Name37" presStyleLbl="parChTrans1D2" presStyleIdx="4" presStyleCnt="5"/>
       <dgm:spPr/>
       <dgm:t>
         <a:bodyPr/>
@@ -3763,16 +3844,24 @@
         </a:p>
       </dgm:t>
     </dgm:pt>
-    <dgm:pt modelId="{39D676ED-D687-45A8-BAE2-452B3A691EB1}" type="pres">
-      <dgm:prSet presAssocID="{2FF04469-EC18-4DEF-9211-026033421D7F}" presName="hierChild4" presStyleCnt="0"/>
-      <dgm:spPr/>
-    </dgm:pt>
-    <dgm:pt modelId="{C7E5117E-BF0C-4A61-8073-5E57B6BE8C3F}" type="pres">
-      <dgm:prSet presAssocID="{2FF04469-EC18-4DEF-9211-026033421D7F}" presName="hierChild5" presStyleCnt="0"/>
-      <dgm:spPr/>
-    </dgm:pt>
-    <dgm:pt modelId="{00416E62-FBAF-4AA7-AE51-74C6003471F9}" type="pres">
-      <dgm:prSet presAssocID="{ADCBE1B0-B6AB-4350-9FC6-856DD57E9562}" presName="Name37" presStyleLbl="parChTrans1D3" presStyleIdx="8" presStyleCnt="9"/>
+    <dgm:pt modelId="{B70BC062-C551-4FA6-AA0B-24CA90B943F5}" type="pres">
+      <dgm:prSet presAssocID="{6BCCACC8-297A-434B-B4C0-CBF55E8A799D}" presName="hierRoot2" presStyleCnt="0">
+        <dgm:presLayoutVars>
+          <dgm:hierBranch val="init"/>
+        </dgm:presLayoutVars>
+      </dgm:prSet>
+      <dgm:spPr/>
+    </dgm:pt>
+    <dgm:pt modelId="{A89E6E14-AB18-41E1-BB47-136AAF17BB47}" type="pres">
+      <dgm:prSet presAssocID="{6BCCACC8-297A-434B-B4C0-CBF55E8A799D}" presName="rootComposite" presStyleCnt="0"/>
+      <dgm:spPr/>
+    </dgm:pt>
+    <dgm:pt modelId="{8659CC59-2E2C-408C-A138-42297FB1F7FC}" type="pres">
+      <dgm:prSet presAssocID="{6BCCACC8-297A-434B-B4C0-CBF55E8A799D}" presName="rootText" presStyleLbl="node2" presStyleIdx="4" presStyleCnt="5">
+        <dgm:presLayoutVars>
+          <dgm:chPref val="3"/>
+        </dgm:presLayoutVars>
+      </dgm:prSet>
       <dgm:spPr/>
       <dgm:t>
         <a:bodyPr/>
@@ -3782,24 +3871,8 @@
         </a:p>
       </dgm:t>
     </dgm:pt>
-    <dgm:pt modelId="{63B03767-680D-4D62-96A6-23F74154861A}" type="pres">
-      <dgm:prSet presAssocID="{210B0EF3-C281-4060-A271-E34BD8547342}" presName="hierRoot2" presStyleCnt="0">
-        <dgm:presLayoutVars>
-          <dgm:hierBranch val="init"/>
-        </dgm:presLayoutVars>
-      </dgm:prSet>
-      <dgm:spPr/>
-    </dgm:pt>
-    <dgm:pt modelId="{49735B28-1F9C-4BE5-847A-BC143641476E}" type="pres">
-      <dgm:prSet presAssocID="{210B0EF3-C281-4060-A271-E34BD8547342}" presName="rootComposite" presStyleCnt="0"/>
-      <dgm:spPr/>
-    </dgm:pt>
-    <dgm:pt modelId="{F75D6229-E722-4C5A-8752-308DFF186597}" type="pres">
-      <dgm:prSet presAssocID="{210B0EF3-C281-4060-A271-E34BD8547342}" presName="rootText" presStyleLbl="node3" presStyleIdx="8" presStyleCnt="9" custScaleX="82877" custScaleY="56225">
-        <dgm:presLayoutVars>
-          <dgm:chPref val="3"/>
-        </dgm:presLayoutVars>
-      </dgm:prSet>
+    <dgm:pt modelId="{695C9D34-95FC-428F-873D-B6282BE96811}" type="pres">
+      <dgm:prSet presAssocID="{6BCCACC8-297A-434B-B4C0-CBF55E8A799D}" presName="rootConnector" presStyleLbl="node2" presStyleIdx="4" presStyleCnt="5"/>
       <dgm:spPr/>
       <dgm:t>
         <a:bodyPr/>
@@ -3809,135 +3882,6 @@
         </a:p>
       </dgm:t>
     </dgm:pt>
-    <dgm:pt modelId="{D84F31A6-8A16-490F-B798-6B1CCC52D4CD}" type="pres">
-      <dgm:prSet presAssocID="{210B0EF3-C281-4060-A271-E34BD8547342}" presName="rootConnector" presStyleLbl="node3" presStyleIdx="8" presStyleCnt="9"/>
-      <dgm:spPr/>
-      <dgm:t>
-        <a:bodyPr/>
-        <a:lstStyle/>
-        <a:p>
-          <a:endParaRPr lang="pt-PT"/>
-        </a:p>
-      </dgm:t>
-    </dgm:pt>
-    <dgm:pt modelId="{B7DCC22D-685E-4B67-91EC-8CA4B10F28F1}" type="pres">
-      <dgm:prSet presAssocID="{210B0EF3-C281-4060-A271-E34BD8547342}" presName="hierChild4" presStyleCnt="0"/>
-      <dgm:spPr/>
-    </dgm:pt>
-    <dgm:pt modelId="{6AF3560C-5408-4952-8A6A-679FB0CCDFD1}" type="pres">
-      <dgm:prSet presAssocID="{210B0EF3-C281-4060-A271-E34BD8547342}" presName="hierChild5" presStyleCnt="0"/>
-      <dgm:spPr/>
-    </dgm:pt>
-    <dgm:pt modelId="{9CDF5DD1-7548-4624-9C39-EA2F57F03E6C}" type="pres">
-      <dgm:prSet presAssocID="{3E7D5DE8-38A7-4D01-B3B1-C41B904AFB24}" presName="hierChild5" presStyleCnt="0"/>
-      <dgm:spPr/>
-    </dgm:pt>
-    <dgm:pt modelId="{1FD30025-BE06-4C8D-8024-6353A3A86C64}" type="pres">
-      <dgm:prSet presAssocID="{06A4DF89-C148-4CB0-BC1C-719E15C3A380}" presName="Name37" presStyleLbl="parChTrans1D2" presStyleIdx="3" presStyleCnt="5"/>
-      <dgm:spPr/>
-      <dgm:t>
-        <a:bodyPr/>
-        <a:lstStyle/>
-        <a:p>
-          <a:endParaRPr lang="pt-PT"/>
-        </a:p>
-      </dgm:t>
-    </dgm:pt>
-    <dgm:pt modelId="{031ED071-E8F0-4ADE-BB27-DE25D6F99C8E}" type="pres">
-      <dgm:prSet presAssocID="{CFC8A77C-E037-4F39-89BC-7C46B2FFF6C3}" presName="hierRoot2" presStyleCnt="0">
-        <dgm:presLayoutVars>
-          <dgm:hierBranch val="init"/>
-        </dgm:presLayoutVars>
-      </dgm:prSet>
-      <dgm:spPr/>
-    </dgm:pt>
-    <dgm:pt modelId="{ED920AE2-8DD7-43C4-A091-03032651C021}" type="pres">
-      <dgm:prSet presAssocID="{CFC8A77C-E037-4F39-89BC-7C46B2FFF6C3}" presName="rootComposite" presStyleCnt="0"/>
-      <dgm:spPr/>
-    </dgm:pt>
-    <dgm:pt modelId="{B512DCC2-F8AD-4A88-8224-BF794CC14E60}" type="pres">
-      <dgm:prSet presAssocID="{CFC8A77C-E037-4F39-89BC-7C46B2FFF6C3}" presName="rootText" presStyleLbl="node2" presStyleIdx="3" presStyleCnt="5">
-        <dgm:presLayoutVars>
-          <dgm:chPref val="3"/>
-        </dgm:presLayoutVars>
-      </dgm:prSet>
-      <dgm:spPr/>
-      <dgm:t>
-        <a:bodyPr/>
-        <a:lstStyle/>
-        <a:p>
-          <a:endParaRPr lang="pt-PT"/>
-        </a:p>
-      </dgm:t>
-    </dgm:pt>
-    <dgm:pt modelId="{C385DBD7-122C-4C76-95AA-F0EDDD576213}" type="pres">
-      <dgm:prSet presAssocID="{CFC8A77C-E037-4F39-89BC-7C46B2FFF6C3}" presName="rootConnector" presStyleLbl="node2" presStyleIdx="3" presStyleCnt="5"/>
-      <dgm:spPr/>
-      <dgm:t>
-        <a:bodyPr/>
-        <a:lstStyle/>
-        <a:p>
-          <a:endParaRPr lang="pt-PT"/>
-        </a:p>
-      </dgm:t>
-    </dgm:pt>
-    <dgm:pt modelId="{DE86AFEF-E43B-4AD5-AF14-454FCFC84E45}" type="pres">
-      <dgm:prSet presAssocID="{CFC8A77C-E037-4F39-89BC-7C46B2FFF6C3}" presName="hierChild4" presStyleCnt="0"/>
-      <dgm:spPr/>
-    </dgm:pt>
-    <dgm:pt modelId="{6FF4677D-D383-478C-80F4-343DD5F2C277}" type="pres">
-      <dgm:prSet presAssocID="{CFC8A77C-E037-4F39-89BC-7C46B2FFF6C3}" presName="hierChild5" presStyleCnt="0"/>
-      <dgm:spPr/>
-    </dgm:pt>
-    <dgm:pt modelId="{87BE5EB3-DB60-4F74-8CAB-579081070155}" type="pres">
-      <dgm:prSet presAssocID="{77057196-36D4-4297-8DBE-9DF4DC99769E}" presName="Name37" presStyleLbl="parChTrans1D2" presStyleIdx="4" presStyleCnt="5"/>
-      <dgm:spPr/>
-      <dgm:t>
-        <a:bodyPr/>
-        <a:lstStyle/>
-        <a:p>
-          <a:endParaRPr lang="pt-PT"/>
-        </a:p>
-      </dgm:t>
-    </dgm:pt>
-    <dgm:pt modelId="{B70BC062-C551-4FA6-AA0B-24CA90B943F5}" type="pres">
-      <dgm:prSet presAssocID="{6BCCACC8-297A-434B-B4C0-CBF55E8A799D}" presName="hierRoot2" presStyleCnt="0">
-        <dgm:presLayoutVars>
-          <dgm:hierBranch val="init"/>
-        </dgm:presLayoutVars>
-      </dgm:prSet>
-      <dgm:spPr/>
-    </dgm:pt>
-    <dgm:pt modelId="{A89E6E14-AB18-41E1-BB47-136AAF17BB47}" type="pres">
-      <dgm:prSet presAssocID="{6BCCACC8-297A-434B-B4C0-CBF55E8A799D}" presName="rootComposite" presStyleCnt="0"/>
-      <dgm:spPr/>
-    </dgm:pt>
-    <dgm:pt modelId="{8659CC59-2E2C-408C-A138-42297FB1F7FC}" type="pres">
-      <dgm:prSet presAssocID="{6BCCACC8-297A-434B-B4C0-CBF55E8A799D}" presName="rootText" presStyleLbl="node2" presStyleIdx="4" presStyleCnt="5">
-        <dgm:presLayoutVars>
-          <dgm:chPref val="3"/>
-        </dgm:presLayoutVars>
-      </dgm:prSet>
-      <dgm:spPr/>
-      <dgm:t>
-        <a:bodyPr/>
-        <a:lstStyle/>
-        <a:p>
-          <a:endParaRPr lang="pt-PT"/>
-        </a:p>
-      </dgm:t>
-    </dgm:pt>
-    <dgm:pt modelId="{695C9D34-95FC-428F-873D-B6282BE96811}" type="pres">
-      <dgm:prSet presAssocID="{6BCCACC8-297A-434B-B4C0-CBF55E8A799D}" presName="rootConnector" presStyleLbl="node2" presStyleIdx="4" presStyleCnt="5"/>
-      <dgm:spPr/>
-      <dgm:t>
-        <a:bodyPr/>
-        <a:lstStyle/>
-        <a:p>
-          <a:endParaRPr lang="pt-PT"/>
-        </a:p>
-      </dgm:t>
-    </dgm:pt>
     <dgm:pt modelId="{C932BF2B-95E7-43ED-B8E1-90412F9C1BE7}" type="pres">
       <dgm:prSet presAssocID="{6BCCACC8-297A-434B-B4C0-CBF55E8A799D}" presName="hierChild4" presStyleCnt="0"/>
       <dgm:spPr/>
@@ -3953,11 +3897,12 @@
   </dgm:ptLst>
   <dgm:cxnLst>
     <dgm:cxn modelId="{297E5AFB-69FF-482E-883D-EAFA86EB866E}" type="presOf" srcId="{C4E9236B-D5FB-402F-9C08-8917C5806671}" destId="{1A4D12E3-2EEF-4745-BCD2-3B9AFD0CBE3F}" srcOrd="1" destOrd="0" presId="urn:microsoft.com/office/officeart/2005/8/layout/orgChart1"/>
-    <dgm:cxn modelId="{3F49F218-3AFF-4BEE-8EF8-270B7EC43323}" type="presOf" srcId="{32A588C2-228D-4B26-9C8B-90CDFD0FC08B}" destId="{6AB2AA11-CB4E-478D-B63B-A0BF5B893B44}" srcOrd="1" destOrd="0" presId="urn:microsoft.com/office/officeart/2005/8/layout/orgChart1"/>
     <dgm:cxn modelId="{1D58114B-9E7B-4EE9-9BBB-CA2BC1050428}" srcId="{EFF00522-C837-4800-9089-09C6786FA139}" destId="{D0D5EBBE-C984-451E-A77C-06635B96115A}" srcOrd="0" destOrd="0" parTransId="{2401EE30-6FB4-47FC-B5CB-44E93082BA16}" sibTransId="{4794836D-9F6B-4080-8E70-60D729F37A15}"/>
     <dgm:cxn modelId="{8965F592-C2EF-4A5E-AE72-E3D483E3AC4B}" type="presOf" srcId="{EFF00522-C837-4800-9089-09C6786FA139}" destId="{0A79929F-4539-4070-8896-388E4F787335}" srcOrd="0" destOrd="0" presId="urn:microsoft.com/office/officeart/2005/8/layout/orgChart1"/>
-    <dgm:cxn modelId="{026BB8DD-D4DF-4C7C-AABD-8C8B76A5849F}" type="presOf" srcId="{AF9FAEE0-D707-4D4A-BC4E-B00284790C09}" destId="{7A248573-B914-4159-ACEE-81EFF21A290C}" srcOrd="1" destOrd="0" presId="urn:microsoft.com/office/officeart/2005/8/layout/orgChart1"/>
+    <dgm:cxn modelId="{CA2C0590-BA54-464A-B25E-B7C1CF9B23DF}" type="presOf" srcId="{01DE5603-A9BA-48DC-A812-A9D236837822}" destId="{A11B1B3B-548B-4BF3-BD14-6C594BE6A489}" srcOrd="0" destOrd="0" presId="urn:microsoft.com/office/officeart/2005/8/layout/orgChart1"/>
     <dgm:cxn modelId="{B6F32367-D4A4-4501-A5C5-198502F93225}" type="presOf" srcId="{CFC8A77C-E037-4F39-89BC-7C46B2FFF6C3}" destId="{B512DCC2-F8AD-4A88-8224-BF794CC14E60}" srcOrd="0" destOrd="0" presId="urn:microsoft.com/office/officeart/2005/8/layout/orgChart1"/>
+    <dgm:cxn modelId="{70061ABB-10DC-4AEE-A81B-46ECAC3F63B6}" type="presOf" srcId="{25553316-AE0F-433F-BD8A-E0F17F5D747E}" destId="{CFE66D09-E0AC-4059-9D41-E1709E524C84}" srcOrd="1" destOrd="0" presId="urn:microsoft.com/office/officeart/2005/8/layout/orgChart1"/>
+    <dgm:cxn modelId="{11BE8415-29DF-4CA8-8077-B4094F461AD1}" type="presOf" srcId="{2A732842-69BB-4863-B446-B741C889B5B1}" destId="{DABE2A97-8AFC-46F1-9229-CDFF582F36CD}" srcOrd="0" destOrd="0" presId="urn:microsoft.com/office/officeart/2005/8/layout/orgChart1"/>
     <dgm:cxn modelId="{64B522C9-1881-4836-B21D-A269398ED4E7}" type="presOf" srcId="{06A4DF89-C148-4CB0-BC1C-719E15C3A380}" destId="{1FD30025-BE06-4C8D-8024-6353A3A86C64}" srcOrd="0" destOrd="0" presId="urn:microsoft.com/office/officeart/2005/8/layout/orgChart1"/>
     <dgm:cxn modelId="{67885BAF-5B75-407B-91B2-6F979038E946}" srcId="{F37AA981-A9B4-415F-ADC1-A456EE833205}" destId="{EFF00522-C837-4800-9089-09C6786FA139}" srcOrd="0" destOrd="0" parTransId="{DD3937CD-E1A8-4E5B-BD09-EABAA399CC23}" sibTransId="{719267CB-9490-458C-9394-D74AD204BE1B}"/>
     <dgm:cxn modelId="{8C71F597-48DA-42F5-848B-45FBCBBE231C}" srcId="{EFF00522-C837-4800-9089-09C6786FA139}" destId="{DEB3A288-72B2-4CE3-BA0E-2385DCEA1166}" srcOrd="1" destOrd="0" parTransId="{AE15057E-D275-4CBA-BBDA-7AFB5273F6D0}" sibTransId="{A96C3356-79EF-46AD-95D3-4F7717D0E212}"/>
@@ -3966,52 +3911,51 @@
     <dgm:cxn modelId="{C36633A6-7AC8-43DF-9EBE-C46C838D14D6}" type="presOf" srcId="{3E7D5DE8-38A7-4D01-B3B1-C41B904AFB24}" destId="{D47F8C64-7351-47DD-ABB9-3A4D5CE04EBC}" srcOrd="1" destOrd="0" presId="urn:microsoft.com/office/officeart/2005/8/layout/orgChart1"/>
     <dgm:cxn modelId="{5BE6D81B-EDEC-41FC-9BAD-FD0335C8F068}" type="presOf" srcId="{2FF04469-EC18-4DEF-9211-026033421D7F}" destId="{98EBC135-7D61-4607-8673-88321824B19A}" srcOrd="1" destOrd="0" presId="urn:microsoft.com/office/officeart/2005/8/layout/orgChart1"/>
     <dgm:cxn modelId="{97B2F3CE-CC70-404B-8D86-D5992F7D55A1}" type="presOf" srcId="{9CF9D14A-D997-48A5-ACA0-BD0A85F323A1}" destId="{37F9F289-47AC-4257-A31F-E2E8F2183DC3}" srcOrd="1" destOrd="0" presId="urn:microsoft.com/office/officeart/2005/8/layout/orgChart1"/>
+    <dgm:cxn modelId="{7DECDEAA-0DFB-4024-BC99-75211E705204}" srcId="{D0D5EBBE-C984-451E-A77C-06635B96115A}" destId="{25553316-AE0F-433F-BD8A-E0F17F5D747E}" srcOrd="1" destOrd="0" parTransId="{9D1FF7F3-6BB1-485B-ABFB-CBC54EB7FB2F}" sibTransId="{178316FB-DCE2-4974-BB3C-AD7713B01F9F}"/>
     <dgm:cxn modelId="{C7117D46-60C1-4AC4-AC2C-CCA51D022C98}" srcId="{3E7D5DE8-38A7-4D01-B3B1-C41B904AFB24}" destId="{210B0EF3-C281-4060-A271-E34BD8547342}" srcOrd="5" destOrd="0" parTransId="{ADCBE1B0-B6AB-4350-9FC6-856DD57E9562}" sibTransId="{074E8F6B-D96B-4628-92A9-FFC917EF6C01}"/>
-    <dgm:cxn modelId="{8A65483A-2A4E-4DBB-90B6-1A37CACF6180}" type="presOf" srcId="{AF9FAEE0-D707-4D4A-BC4E-B00284790C09}" destId="{AED2CD70-00FB-4D86-A988-A2B3331A944F}" srcOrd="0" destOrd="0" presId="urn:microsoft.com/office/officeart/2005/8/layout/orgChart1"/>
     <dgm:cxn modelId="{06FBE830-116F-4E6A-84F0-74346010D695}" type="presOf" srcId="{C5D14313-4718-4BA4-8034-5E4E2ACBCC70}" destId="{CFB84857-AF84-4F8B-907E-44B005282350}" srcOrd="1" destOrd="0" presId="urn:microsoft.com/office/officeart/2005/8/layout/orgChart1"/>
     <dgm:cxn modelId="{AB73DCE0-4F8F-4E33-A446-8B950BE7F085}" type="presOf" srcId="{2FF04469-EC18-4DEF-9211-026033421D7F}" destId="{BCC10AE4-DC99-4EA0-B027-3C11C8AFFA0B}" srcOrd="0" destOrd="0" presId="urn:microsoft.com/office/officeart/2005/8/layout/orgChart1"/>
     <dgm:cxn modelId="{8484E588-3BA2-4A2C-A856-2E9A20948E67}" type="presOf" srcId="{D0D5EBBE-C984-451E-A77C-06635B96115A}" destId="{BB899C3E-7977-48D2-838C-0A0A4E22407E}" srcOrd="0" destOrd="0" presId="urn:microsoft.com/office/officeart/2005/8/layout/orgChart1"/>
+    <dgm:cxn modelId="{57D7B1C0-8B1F-4CB3-B7C5-922C7D39F797}" type="presOf" srcId="{FFC74FC4-00ED-4EE0-BC51-6639C0CAB4C0}" destId="{29898FD7-6D50-464C-B5FD-8C53A87EEE52}" srcOrd="1" destOrd="0" presId="urn:microsoft.com/office/officeart/2005/8/layout/orgChart1"/>
     <dgm:cxn modelId="{F7703852-4B24-419F-8990-8F4642258C5C}" type="presOf" srcId="{DEB3A288-72B2-4CE3-BA0E-2385DCEA1166}" destId="{3DCFB508-F20D-419B-97A2-A0EA8AAE62B8}" srcOrd="0" destOrd="0" presId="urn:microsoft.com/office/officeart/2005/8/layout/orgChart1"/>
     <dgm:cxn modelId="{3E0EE4A3-7C9D-4385-92CF-5CA9996AB16B}" type="presOf" srcId="{EFF00522-C837-4800-9089-09C6786FA139}" destId="{15AFF27B-B166-47F4-BEA3-A556EF84A1FE}" srcOrd="1" destOrd="0" presId="urn:microsoft.com/office/officeart/2005/8/layout/orgChart1"/>
     <dgm:cxn modelId="{7076539E-84DB-49E1-9601-83A88D214CF8}" srcId="{3E7D5DE8-38A7-4D01-B3B1-C41B904AFB24}" destId="{2FF04469-EC18-4DEF-9211-026033421D7F}" srcOrd="4" destOrd="0" parTransId="{AE6AB92A-B651-446C-B90D-191341024DCA}" sibTransId="{0637CF52-D892-464E-A103-0804641290C4}"/>
     <dgm:cxn modelId="{CC89F41C-EC73-4164-B979-1E34F8EC7992}" type="presOf" srcId="{DEB3A288-72B2-4CE3-BA0E-2385DCEA1166}" destId="{D1586E0D-5339-4871-B373-DE07F6A4B31A}" srcOrd="1" destOrd="0" presId="urn:microsoft.com/office/officeart/2005/8/layout/orgChart1"/>
     <dgm:cxn modelId="{8C5C1055-60EE-417A-890C-9263B9B0293C}" type="presOf" srcId="{6BCCACC8-297A-434B-B4C0-CBF55E8A799D}" destId="{8659CC59-2E2C-408C-A138-42297FB1F7FC}" srcOrd="0" destOrd="0" presId="urn:microsoft.com/office/officeart/2005/8/layout/orgChart1"/>
     <dgm:cxn modelId="{F4B59A6E-7C30-4166-A4BE-C4CD1FDE9241}" type="presOf" srcId="{FEF5EF31-1DF3-4F02-8BF5-0FAA9FBF05DF}" destId="{29C82EC9-E8DF-43E5-AE26-7FE69F2FE8E3}" srcOrd="1" destOrd="0" presId="urn:microsoft.com/office/officeart/2005/8/layout/orgChart1"/>
-    <dgm:cxn modelId="{412E2FC4-ADBF-4534-B2F3-8F5B88C8016F}" type="presOf" srcId="{6D859D06-D440-4495-BC38-4B0653417247}" destId="{257BA37D-C7F9-4FC4-8625-2A044432F45E}" srcOrd="1" destOrd="0" presId="urn:microsoft.com/office/officeart/2005/8/layout/orgChart1"/>
     <dgm:cxn modelId="{2B7E8BD5-A4C9-447A-8E7F-F81E3739DF41}" type="presOf" srcId="{ADCBE1B0-B6AB-4350-9FC6-856DD57E9562}" destId="{00416E62-FBAF-4AA7-AE51-74C6003471F9}" srcOrd="0" destOrd="0" presId="urn:microsoft.com/office/officeart/2005/8/layout/orgChart1"/>
     <dgm:cxn modelId="{F95DC0C1-9339-4066-9285-8FF13264398D}" type="presOf" srcId="{D0D5EBBE-C984-451E-A77C-06635B96115A}" destId="{1E59B1F0-1959-43EF-B4BA-5DE950985F11}" srcOrd="1" destOrd="0" presId="urn:microsoft.com/office/officeart/2005/8/layout/orgChart1"/>
     <dgm:cxn modelId="{19225BF9-14BF-4A05-BAF0-2E64D97CAC44}" type="presOf" srcId="{77057196-36D4-4297-8DBE-9DF4DC99769E}" destId="{87BE5EB3-DB60-4F74-8CAB-579081070155}" srcOrd="0" destOrd="0" presId="urn:microsoft.com/office/officeart/2005/8/layout/orgChart1"/>
     <dgm:cxn modelId="{40EC0804-C307-4224-887C-7B85E0BC7A88}" type="presOf" srcId="{9CF9D14A-D997-48A5-ACA0-BD0A85F323A1}" destId="{AB7ECE86-F423-469A-804C-9E0A6711CE75}" srcOrd="0" destOrd="0" presId="urn:microsoft.com/office/officeart/2005/8/layout/orgChart1"/>
     <dgm:cxn modelId="{B4EA9C2D-7D0F-4B0E-80FC-F0DE89A8BEF8}" type="presOf" srcId="{D81EE60C-1689-4013-8B94-71E45948E61C}" destId="{FB0D67E1-4705-4C5A-A8BE-E373C4C7F8DC}" srcOrd="0" destOrd="0" presId="urn:microsoft.com/office/officeart/2005/8/layout/orgChart1"/>
-    <dgm:cxn modelId="{BA7D9214-91C9-43C5-930D-8662E2D96E9F}" srcId="{D0D5EBBE-C984-451E-A77C-06635B96115A}" destId="{AF9FAEE0-D707-4D4A-BC4E-B00284790C09}" srcOrd="1" destOrd="0" parTransId="{DF2FF718-F2C1-46BD-B3D2-69C34DDD97AC}" sibTransId="{9F96BC34-2F99-4857-9537-755790E34536}"/>
     <dgm:cxn modelId="{C1915FD1-D65F-4FA9-AE30-83FC60FB964B}" type="presOf" srcId="{C5D14313-4718-4BA4-8034-5E4E2ACBCC70}" destId="{425B22CD-323F-4E0B-BEA0-EC7E00D9ABF2}" srcOrd="0" destOrd="0" presId="urn:microsoft.com/office/officeart/2005/8/layout/orgChart1"/>
     <dgm:cxn modelId="{56EBC832-43D7-4C7F-AC45-6EAAD364E744}" type="presOf" srcId="{04B442D8-6F45-4C79-8A4C-6886FDE02F97}" destId="{DE72DF6E-144C-454B-9565-EC52D8FB4D37}" srcOrd="0" destOrd="0" presId="urn:microsoft.com/office/officeart/2005/8/layout/orgChart1"/>
-    <dgm:cxn modelId="{979B3921-65D4-4C21-A108-2DBE1B0AAAE5}" srcId="{D0D5EBBE-C984-451E-A77C-06635B96115A}" destId="{6D859D06-D440-4495-BC38-4B0653417247}" srcOrd="0" destOrd="0" parTransId="{7ABF7F75-BA81-498E-8999-139ABA277B4F}" sibTransId="{F0F770A4-A5C9-424C-93C8-86B63DB8FE87}"/>
+    <dgm:cxn modelId="{4874DAB9-E15D-43E4-ABDC-D9A3CCB4EBFE}" srcId="{D0D5EBBE-C984-451E-A77C-06635B96115A}" destId="{FFC74FC4-00ED-4EE0-BC51-6639C0CAB4C0}" srcOrd="2" destOrd="0" parTransId="{2A732842-69BB-4863-B446-B741C889B5B1}" sibTransId="{DCE4D878-D34A-4E3F-84A7-0DCD129058B0}"/>
     <dgm:cxn modelId="{E75D4180-7278-49C5-A120-3150DE2407B2}" type="presOf" srcId="{1F891C72-4331-4225-9131-EE90A5156BCC}" destId="{075DE7FD-AB6D-45A1-88B5-F6DE55537A5C}" srcOrd="0" destOrd="0" presId="urn:microsoft.com/office/officeart/2005/8/layout/orgChart1"/>
     <dgm:cxn modelId="{D824B5F1-95EA-4412-A9BE-634ADCAA4D96}" type="presOf" srcId="{C4E9236B-D5FB-402F-9C08-8917C5806671}" destId="{426BD5C4-6298-4765-92B5-5BE6F449DD28}" srcOrd="0" destOrd="0" presId="urn:microsoft.com/office/officeart/2005/8/layout/orgChart1"/>
     <dgm:cxn modelId="{261826DD-4928-4968-9EE8-8603A4DA75BB}" type="presOf" srcId="{CFC8A77C-E037-4F39-89BC-7C46B2FFF6C3}" destId="{C385DBD7-122C-4C76-95AA-F0EDDD576213}" srcOrd="1" destOrd="0" presId="urn:microsoft.com/office/officeart/2005/8/layout/orgChart1"/>
-    <dgm:cxn modelId="{50574EE2-B791-402B-8982-5F339D14BC2A}" srcId="{D0D5EBBE-C984-451E-A77C-06635B96115A}" destId="{32A588C2-228D-4B26-9C8B-90CDFD0FC08B}" srcOrd="2" destOrd="0" parTransId="{188D1000-0E2B-4CE9-B4EC-57DF98E5B370}" sibTransId="{14B0CDC8-4FDC-419A-B7CE-8BD710F85676}"/>
     <dgm:cxn modelId="{70CBB2C2-0071-4329-9A38-8AD1E841005D}" srcId="{EFF00522-C837-4800-9089-09C6786FA139}" destId="{CFC8A77C-E037-4F39-89BC-7C46B2FFF6C3}" srcOrd="3" destOrd="0" parTransId="{06A4DF89-C148-4CB0-BC1C-719E15C3A380}" sibTransId="{B9E8B3FB-6336-44A0-BB31-6CF9D499134C}"/>
-    <dgm:cxn modelId="{2BC993A7-1946-496C-9CFE-5831CDB00FFF}" type="presOf" srcId="{7ABF7F75-BA81-498E-8999-139ABA277B4F}" destId="{BCCB5965-B0E0-45CC-8894-BE1731CC57E2}" srcOrd="0" destOrd="0" presId="urn:microsoft.com/office/officeart/2005/8/layout/orgChart1"/>
     <dgm:cxn modelId="{8C1C42B2-A065-4216-83CB-1050788129D9}" srcId="{EFF00522-C837-4800-9089-09C6786FA139}" destId="{3E7D5DE8-38A7-4D01-B3B1-C41B904AFB24}" srcOrd="2" destOrd="0" parTransId="{1F891C72-4331-4225-9131-EE90A5156BCC}" sibTransId="{2D617AC4-6E9C-47A6-BFAC-93EC82C86111}"/>
     <dgm:cxn modelId="{12AA3CBF-1033-48B0-A6F8-A20337FED22A}" srcId="{3E7D5DE8-38A7-4D01-B3B1-C41B904AFB24}" destId="{C5D14313-4718-4BA4-8034-5E4E2ACBCC70}" srcOrd="1" destOrd="0" parTransId="{04B442D8-6F45-4C79-8A4C-6886FDE02F97}" sibTransId="{EA84DB9B-3D31-4D9E-BF2F-E46226EA56AE}"/>
     <dgm:cxn modelId="{820DA17D-D3D3-44FA-8B6F-1B825415906F}" srcId="{3E7D5DE8-38A7-4D01-B3B1-C41B904AFB24}" destId="{FEF5EF31-1DF3-4F02-8BF5-0FAA9FBF05DF}" srcOrd="3" destOrd="0" parTransId="{C206CBEC-A310-48C5-A1E3-51069AAB7E06}" sibTransId="{33829A28-8B69-4310-A9EC-72FF2B43FA31}"/>
     <dgm:cxn modelId="{DDBD15D0-17BD-4B24-A9AF-029F00981379}" type="presOf" srcId="{AE6AB92A-B651-446C-B90D-191341024DCA}" destId="{1BF37D4C-6B8D-491C-BFA6-EF055187F912}" srcOrd="0" destOrd="0" presId="urn:microsoft.com/office/officeart/2005/8/layout/orgChart1"/>
+    <dgm:cxn modelId="{113C4786-6FE7-4FA6-9A95-2F93C6A1B0FD}" type="presOf" srcId="{9D1FF7F3-6BB1-485B-ABFB-CBC54EB7FB2F}" destId="{FDCF2E21-0BBF-4C89-8E46-93D1F2D60A4C}" srcOrd="0" destOrd="0" presId="urn:microsoft.com/office/officeart/2005/8/layout/orgChart1"/>
+    <dgm:cxn modelId="{99833AF0-7F5E-4C55-9662-A3F65E0B2A6F}" type="presOf" srcId="{01DE5603-A9BA-48DC-A812-A9D236837822}" destId="{CE70EDA1-CEC3-4F76-B0D5-08C75AA61789}" srcOrd="1" destOrd="0" presId="urn:microsoft.com/office/officeart/2005/8/layout/orgChart1"/>
     <dgm:cxn modelId="{59A13B2B-94E3-4E30-B1C8-D4C19B456A98}" type="presOf" srcId="{6BCCACC8-297A-434B-B4C0-CBF55E8A799D}" destId="{695C9D34-95FC-428F-873D-B6282BE96811}" srcOrd="1" destOrd="0" presId="urn:microsoft.com/office/officeart/2005/8/layout/orgChart1"/>
     <dgm:cxn modelId="{C104F494-93EC-4C35-9277-88485A6C79D9}" type="presOf" srcId="{AE15057E-D275-4CBA-BBDA-7AFB5273F6D0}" destId="{A3C064E1-EB83-4A90-BC9B-363A4369B1D9}" srcOrd="0" destOrd="0" presId="urn:microsoft.com/office/officeart/2005/8/layout/orgChart1"/>
-    <dgm:cxn modelId="{08BF06D3-E920-4C30-A863-1EBFD092C556}" type="presOf" srcId="{6D859D06-D440-4495-BC38-4B0653417247}" destId="{5BD05F6E-C87D-423B-8545-489C3582E9A5}" srcOrd="0" destOrd="0" presId="urn:microsoft.com/office/officeart/2005/8/layout/orgChart1"/>
+    <dgm:cxn modelId="{96F12E26-ED17-4B82-8F64-9E98D7FB9B0E}" type="presOf" srcId="{25553316-AE0F-433F-BD8A-E0F17F5D747E}" destId="{3DA29272-8B54-4109-B1CF-306966EBCEA6}" srcOrd="0" destOrd="0" presId="urn:microsoft.com/office/officeart/2005/8/layout/orgChart1"/>
     <dgm:cxn modelId="{2BA0192D-E091-446B-9562-8E04E2C7A7A9}" srcId="{EFF00522-C837-4800-9089-09C6786FA139}" destId="{6BCCACC8-297A-434B-B4C0-CBF55E8A799D}" srcOrd="4" destOrd="0" parTransId="{77057196-36D4-4297-8DBE-9DF4DC99769E}" sibTransId="{E17B637D-8F1E-4395-8504-5FF5013E668B}"/>
+    <dgm:cxn modelId="{D7752290-CEB6-4881-9B10-131AE9D4274D}" type="presOf" srcId="{FFC74FC4-00ED-4EE0-BC51-6639C0CAB4C0}" destId="{B13177B0-B616-471A-B673-341F50F836B6}" srcOrd="0" destOrd="0" presId="urn:microsoft.com/office/officeart/2005/8/layout/orgChart1"/>
     <dgm:cxn modelId="{76937E49-9A6C-4684-AE0E-E0846D99D250}" type="presOf" srcId="{3E7D5DE8-38A7-4D01-B3B1-C41B904AFB24}" destId="{D0C42A0A-227F-498C-9217-1F2A4E39F4AC}" srcOrd="0" destOrd="0" presId="urn:microsoft.com/office/officeart/2005/8/layout/orgChart1"/>
     <dgm:cxn modelId="{6751E3DB-7D1C-4DFF-A50D-2E4D2AA1C036}" type="presOf" srcId="{F37AA981-A9B4-415F-ADC1-A456EE833205}" destId="{E4B09FCC-EACC-4121-8E6E-BD64FF803B59}" srcOrd="0" destOrd="0" presId="urn:microsoft.com/office/officeart/2005/8/layout/orgChart1"/>
     <dgm:cxn modelId="{1A5C9B95-6306-4971-AEB4-0FB6C60D1920}" type="presOf" srcId="{2401EE30-6FB4-47FC-B5CB-44E93082BA16}" destId="{C79737FA-DA68-4B50-9686-82FBED4993F4}" srcOrd="0" destOrd="0" presId="urn:microsoft.com/office/officeart/2005/8/layout/orgChart1"/>
     <dgm:cxn modelId="{C7D94C82-881B-4380-9D07-44A662C49F66}" type="presOf" srcId="{FEF5EF31-1DF3-4F02-8BF5-0FAA9FBF05DF}" destId="{51735A62-65C8-4B72-BC21-EC0033831CB7}" srcOrd="0" destOrd="0" presId="urn:microsoft.com/office/officeart/2005/8/layout/orgChart1"/>
-    <dgm:cxn modelId="{55C3032E-C596-45B0-B0D9-B039ED4AB0B1}" type="presOf" srcId="{188D1000-0E2B-4CE9-B4EC-57DF98E5B370}" destId="{83BFE1B7-4CFE-4414-B2E2-2937D4F9C17F}" srcOrd="0" destOrd="0" presId="urn:microsoft.com/office/officeart/2005/8/layout/orgChart1"/>
-    <dgm:cxn modelId="{3F221A57-9855-4F10-8902-29815A14778C}" type="presOf" srcId="{32A588C2-228D-4B26-9C8B-90CDFD0FC08B}" destId="{9C5E7AE7-E733-492C-8D9D-2B4E12574136}" srcOrd="0" destOrd="0" presId="urn:microsoft.com/office/officeart/2005/8/layout/orgChart1"/>
     <dgm:cxn modelId="{51974BE8-A9E3-4045-8AC0-2BF146D01122}" srcId="{3E7D5DE8-38A7-4D01-B3B1-C41B904AFB24}" destId="{C4E9236B-D5FB-402F-9C08-8917C5806671}" srcOrd="0" destOrd="0" parTransId="{5A94BF89-F459-4076-B825-3EF69867B9E6}" sibTransId="{62DD2125-1C44-478F-B22F-2BED96167201}"/>
     <dgm:cxn modelId="{9DFF448E-6D0C-4B10-A4BB-C20607216AD2}" type="presOf" srcId="{210B0EF3-C281-4060-A271-E34BD8547342}" destId="{D84F31A6-8A16-490F-B798-6B1CCC52D4CD}" srcOrd="1" destOrd="0" presId="urn:microsoft.com/office/officeart/2005/8/layout/orgChart1"/>
-    <dgm:cxn modelId="{88118B8A-E1E2-49A1-95D3-E9EE1A3BBE5B}" type="presOf" srcId="{DF2FF718-F2C1-46BD-B3D2-69C34DDD97AC}" destId="{F5935B02-3EAE-43D8-83D7-0568EA754FE3}" srcOrd="0" destOrd="0" presId="urn:microsoft.com/office/officeart/2005/8/layout/orgChart1"/>
+    <dgm:cxn modelId="{43284CFA-223A-4049-87BA-3120E63505C3}" srcId="{D0D5EBBE-C984-451E-A77C-06635B96115A}" destId="{01DE5603-A9BA-48DC-A812-A9D236837822}" srcOrd="0" destOrd="0" parTransId="{0B69B6BC-1E4A-4E1F-9BE1-0C53B92E33BC}" sibTransId="{69D0B4C8-A61E-4CEB-8F52-6CC20FED1FF6}"/>
     <dgm:cxn modelId="{C4FB8056-6B24-43C9-A2FD-57AF1D92654B}" srcId="{3E7D5DE8-38A7-4D01-B3B1-C41B904AFB24}" destId="{9CF9D14A-D997-48A5-ACA0-BD0A85F323A1}" srcOrd="2" destOrd="0" parTransId="{D81EE60C-1689-4013-8B94-71E45948E61C}" sibTransId="{B3012D63-2D5D-41AB-A6CD-C3EA8612062C}"/>
     <dgm:cxn modelId="{32B18C39-6753-4BA1-AF98-111738B3CB5D}" type="presOf" srcId="{210B0EF3-C281-4060-A271-E34BD8547342}" destId="{F75D6229-E722-4C5A-8752-308DFF186597}" srcOrd="0" destOrd="0" presId="urn:microsoft.com/office/officeart/2005/8/layout/orgChart1"/>
+    <dgm:cxn modelId="{1892F96F-00E2-4EF8-AAB0-04F194594252}" type="presOf" srcId="{0B69B6BC-1E4A-4E1F-9BE1-0C53B92E33BC}" destId="{CF63EB70-7A6D-4FA2-8E46-21CF359D0286}" srcOrd="0" destOrd="0" presId="urn:microsoft.com/office/officeart/2005/8/layout/orgChart1"/>
     <dgm:cxn modelId="{007B4A0A-0E4B-42BD-905B-BDF6999023BA}" type="presParOf" srcId="{E4B09FCC-EACC-4121-8E6E-BD64FF803B59}" destId="{C7C3974A-1DF5-4BF7-A22B-7D65EF9D0681}" srcOrd="0" destOrd="0" presId="urn:microsoft.com/office/officeart/2005/8/layout/orgChart1"/>
     <dgm:cxn modelId="{0B8B6F9D-EC93-49D1-AB15-6F71BC6FE182}" type="presParOf" srcId="{C7C3974A-1DF5-4BF7-A22B-7D65EF9D0681}" destId="{D00FF694-389D-4CD3-B5E2-0572615B4DE4}" srcOrd="0" destOrd="0" presId="urn:microsoft.com/office/officeart/2005/8/layout/orgChart1"/>
     <dgm:cxn modelId="{5FC40C6D-C971-40B3-8425-E45FAA9959E4}" type="presParOf" srcId="{D00FF694-389D-4CD3-B5E2-0572615B4DE4}" destId="{0A79929F-4539-4070-8896-388E4F787335}" srcOrd="0" destOrd="0" presId="urn:microsoft.com/office/officeart/2005/8/layout/orgChart1"/>
@@ -4023,27 +3967,27 @@
     <dgm:cxn modelId="{7D6360DF-D72C-4D78-A574-2C25F3CE62FA}" type="presParOf" srcId="{734E25C4-053E-4335-B498-733C9B31BD37}" destId="{BB899C3E-7977-48D2-838C-0A0A4E22407E}" srcOrd="0" destOrd="0" presId="urn:microsoft.com/office/officeart/2005/8/layout/orgChart1"/>
     <dgm:cxn modelId="{E2037559-A7C1-4533-A17B-CE18F2A02195}" type="presParOf" srcId="{734E25C4-053E-4335-B498-733C9B31BD37}" destId="{1E59B1F0-1959-43EF-B4BA-5DE950985F11}" srcOrd="1" destOrd="0" presId="urn:microsoft.com/office/officeart/2005/8/layout/orgChart1"/>
     <dgm:cxn modelId="{A67FD4E7-AF0F-4E6D-A577-11481AFA90BE}" type="presParOf" srcId="{3CDACF71-9436-40D9-B554-1B1DAEBD747E}" destId="{1361BC6C-9B0B-4206-827D-3BF0B5B79B98}" srcOrd="1" destOrd="0" presId="urn:microsoft.com/office/officeart/2005/8/layout/orgChart1"/>
-    <dgm:cxn modelId="{CE9BF3B8-8B66-48C0-AE30-BDB345AED0CF}" type="presParOf" srcId="{1361BC6C-9B0B-4206-827D-3BF0B5B79B98}" destId="{BCCB5965-B0E0-45CC-8894-BE1731CC57E2}" srcOrd="0" destOrd="0" presId="urn:microsoft.com/office/officeart/2005/8/layout/orgChart1"/>
-    <dgm:cxn modelId="{D26F35E3-484A-4B8B-BF5F-34093C57CD69}" type="presParOf" srcId="{1361BC6C-9B0B-4206-827D-3BF0B5B79B98}" destId="{1CD8D106-1B91-496C-B3DB-996AC3AD5822}" srcOrd="1" destOrd="0" presId="urn:microsoft.com/office/officeart/2005/8/layout/orgChart1"/>
-    <dgm:cxn modelId="{D45CB8FF-A9AB-4B40-AD36-C5369CFFCE48}" type="presParOf" srcId="{1CD8D106-1B91-496C-B3DB-996AC3AD5822}" destId="{1B9CED18-CF7D-4AF9-975C-1844914138B0}" srcOrd="0" destOrd="0" presId="urn:microsoft.com/office/officeart/2005/8/layout/orgChart1"/>
-    <dgm:cxn modelId="{B008CA72-0AAB-422D-BF29-2CB53FF5E519}" type="presParOf" srcId="{1B9CED18-CF7D-4AF9-975C-1844914138B0}" destId="{5BD05F6E-C87D-423B-8545-489C3582E9A5}" srcOrd="0" destOrd="0" presId="urn:microsoft.com/office/officeart/2005/8/layout/orgChart1"/>
-    <dgm:cxn modelId="{2F4AB609-D9EE-4E26-ADF6-ECBD8E0BA17E}" type="presParOf" srcId="{1B9CED18-CF7D-4AF9-975C-1844914138B0}" destId="{257BA37D-C7F9-4FC4-8625-2A044432F45E}" srcOrd="1" destOrd="0" presId="urn:microsoft.com/office/officeart/2005/8/layout/orgChart1"/>
-    <dgm:cxn modelId="{166805EF-FBD8-4422-A6C7-1AB6A3ABDB7A}" type="presParOf" srcId="{1CD8D106-1B91-496C-B3DB-996AC3AD5822}" destId="{21FA8DE6-BE13-427F-B07D-34101809347A}" srcOrd="1" destOrd="0" presId="urn:microsoft.com/office/officeart/2005/8/layout/orgChart1"/>
-    <dgm:cxn modelId="{52D99B22-6045-4D2E-9DFE-8A18FFBEAD58}" type="presParOf" srcId="{1CD8D106-1B91-496C-B3DB-996AC3AD5822}" destId="{36C55898-F9BD-4CF0-99A2-28DD2F3C66C5}" srcOrd="2" destOrd="0" presId="urn:microsoft.com/office/officeart/2005/8/layout/orgChart1"/>
-    <dgm:cxn modelId="{6499049F-98F3-4AC8-BB29-4FA91F098740}" type="presParOf" srcId="{1361BC6C-9B0B-4206-827D-3BF0B5B79B98}" destId="{F5935B02-3EAE-43D8-83D7-0568EA754FE3}" srcOrd="2" destOrd="0" presId="urn:microsoft.com/office/officeart/2005/8/layout/orgChart1"/>
-    <dgm:cxn modelId="{CE980871-A13F-45A6-A976-53D8EB50388C}" type="presParOf" srcId="{1361BC6C-9B0B-4206-827D-3BF0B5B79B98}" destId="{65098B79-47B8-45AD-84EC-59F788BDFBC1}" srcOrd="3" destOrd="0" presId="urn:microsoft.com/office/officeart/2005/8/layout/orgChart1"/>
-    <dgm:cxn modelId="{DA37DF07-CB3A-4345-BD10-7E159E011E37}" type="presParOf" srcId="{65098B79-47B8-45AD-84EC-59F788BDFBC1}" destId="{B7D893E0-1D88-4382-B898-4989216383B2}" srcOrd="0" destOrd="0" presId="urn:microsoft.com/office/officeart/2005/8/layout/orgChart1"/>
-    <dgm:cxn modelId="{14B75180-A0B7-45E7-AE28-63BE99ED13C5}" type="presParOf" srcId="{B7D893E0-1D88-4382-B898-4989216383B2}" destId="{AED2CD70-00FB-4D86-A988-A2B3331A944F}" srcOrd="0" destOrd="0" presId="urn:microsoft.com/office/officeart/2005/8/layout/orgChart1"/>
-    <dgm:cxn modelId="{71730BA8-72D3-4887-9B71-AE7E2717F8A9}" type="presParOf" srcId="{B7D893E0-1D88-4382-B898-4989216383B2}" destId="{7A248573-B914-4159-ACEE-81EFF21A290C}" srcOrd="1" destOrd="0" presId="urn:microsoft.com/office/officeart/2005/8/layout/orgChart1"/>
-    <dgm:cxn modelId="{4B2F6CB1-D7AE-40E5-9397-B3B6394A1489}" type="presParOf" srcId="{65098B79-47B8-45AD-84EC-59F788BDFBC1}" destId="{DEA8D9E0-A8CA-48EF-A2A5-7B4EACBDC6EA}" srcOrd="1" destOrd="0" presId="urn:microsoft.com/office/officeart/2005/8/layout/orgChart1"/>
-    <dgm:cxn modelId="{0FCC3F55-AA08-440B-9B29-1AA70F0E5222}" type="presParOf" srcId="{65098B79-47B8-45AD-84EC-59F788BDFBC1}" destId="{601F07B1-5063-4BCA-9450-53D749FA758F}" srcOrd="2" destOrd="0" presId="urn:microsoft.com/office/officeart/2005/8/layout/orgChart1"/>
-    <dgm:cxn modelId="{0DE09515-B5E9-4327-AD17-C00373309FCF}" type="presParOf" srcId="{1361BC6C-9B0B-4206-827D-3BF0B5B79B98}" destId="{83BFE1B7-4CFE-4414-B2E2-2937D4F9C17F}" srcOrd="4" destOrd="0" presId="urn:microsoft.com/office/officeart/2005/8/layout/orgChart1"/>
-    <dgm:cxn modelId="{1B67BA67-8C72-4838-8E41-D054935B9D5C}" type="presParOf" srcId="{1361BC6C-9B0B-4206-827D-3BF0B5B79B98}" destId="{459CC44D-C8B1-4635-A6BE-852CC0735C79}" srcOrd="5" destOrd="0" presId="urn:microsoft.com/office/officeart/2005/8/layout/orgChart1"/>
-    <dgm:cxn modelId="{5AE885C0-E5F3-4D8C-B952-6BE0CD17145F}" type="presParOf" srcId="{459CC44D-C8B1-4635-A6BE-852CC0735C79}" destId="{729F2795-3FC9-482D-A6E8-681E4BBC0F27}" srcOrd="0" destOrd="0" presId="urn:microsoft.com/office/officeart/2005/8/layout/orgChart1"/>
-    <dgm:cxn modelId="{E3350AB5-7A26-4274-8FDE-6851FA1D5266}" type="presParOf" srcId="{729F2795-3FC9-482D-A6E8-681E4BBC0F27}" destId="{9C5E7AE7-E733-492C-8D9D-2B4E12574136}" srcOrd="0" destOrd="0" presId="urn:microsoft.com/office/officeart/2005/8/layout/orgChart1"/>
-    <dgm:cxn modelId="{71F77C9E-5D6B-4DDF-B37E-AA5FCCADE462}" type="presParOf" srcId="{729F2795-3FC9-482D-A6E8-681E4BBC0F27}" destId="{6AB2AA11-CB4E-478D-B63B-A0BF5B893B44}" srcOrd="1" destOrd="0" presId="urn:microsoft.com/office/officeart/2005/8/layout/orgChart1"/>
-    <dgm:cxn modelId="{F35088B4-DD34-42E9-AA6D-763B90CDB7F6}" type="presParOf" srcId="{459CC44D-C8B1-4635-A6BE-852CC0735C79}" destId="{CB7BB7FB-F6D9-464D-8147-B1D785A2A656}" srcOrd="1" destOrd="0" presId="urn:microsoft.com/office/officeart/2005/8/layout/orgChart1"/>
-    <dgm:cxn modelId="{6D9C1D11-D4B2-4F4A-A07B-25FE48DD0A5B}" type="presParOf" srcId="{459CC44D-C8B1-4635-A6BE-852CC0735C79}" destId="{7D98686E-4B2F-406D-9145-91C4756133B1}" srcOrd="2" destOrd="0" presId="urn:microsoft.com/office/officeart/2005/8/layout/orgChart1"/>
+    <dgm:cxn modelId="{7DA8D7D5-410B-47F4-AD9E-630EBDD298BE}" type="presParOf" srcId="{1361BC6C-9B0B-4206-827D-3BF0B5B79B98}" destId="{CF63EB70-7A6D-4FA2-8E46-21CF359D0286}" srcOrd="0" destOrd="0" presId="urn:microsoft.com/office/officeart/2005/8/layout/orgChart1"/>
+    <dgm:cxn modelId="{1473F8EF-28C8-43FC-BA0D-0E3D17C265A8}" type="presParOf" srcId="{1361BC6C-9B0B-4206-827D-3BF0B5B79B98}" destId="{EEE897D5-0D96-4624-AD67-2EBF28C86E46}" srcOrd="1" destOrd="0" presId="urn:microsoft.com/office/officeart/2005/8/layout/orgChart1"/>
+    <dgm:cxn modelId="{E2789BA0-2470-4BF6-A6A5-FEDCA30D2DC8}" type="presParOf" srcId="{EEE897D5-0D96-4624-AD67-2EBF28C86E46}" destId="{61949F78-54AF-445F-A9C1-09BCC8AB6818}" srcOrd="0" destOrd="0" presId="urn:microsoft.com/office/officeart/2005/8/layout/orgChart1"/>
+    <dgm:cxn modelId="{187FD3D0-6698-4E35-8BC4-54265E336D72}" type="presParOf" srcId="{61949F78-54AF-445F-A9C1-09BCC8AB6818}" destId="{A11B1B3B-548B-4BF3-BD14-6C594BE6A489}" srcOrd="0" destOrd="0" presId="urn:microsoft.com/office/officeart/2005/8/layout/orgChart1"/>
+    <dgm:cxn modelId="{C3C6D37F-EC59-497F-80D3-156F772FC3F4}" type="presParOf" srcId="{61949F78-54AF-445F-A9C1-09BCC8AB6818}" destId="{CE70EDA1-CEC3-4F76-B0D5-08C75AA61789}" srcOrd="1" destOrd="0" presId="urn:microsoft.com/office/officeart/2005/8/layout/orgChart1"/>
+    <dgm:cxn modelId="{0801E4A6-97CE-4DFD-9B1E-B17614402222}" type="presParOf" srcId="{EEE897D5-0D96-4624-AD67-2EBF28C86E46}" destId="{6D8D787A-8B24-44D0-B2C8-8BFD2439CC10}" srcOrd="1" destOrd="0" presId="urn:microsoft.com/office/officeart/2005/8/layout/orgChart1"/>
+    <dgm:cxn modelId="{B22E9A7E-73E5-406A-B37D-B15E68F468E3}" type="presParOf" srcId="{EEE897D5-0D96-4624-AD67-2EBF28C86E46}" destId="{18923BB7-BB28-4E99-BA26-5534ED5EA94F}" srcOrd="2" destOrd="0" presId="urn:microsoft.com/office/officeart/2005/8/layout/orgChart1"/>
+    <dgm:cxn modelId="{46F19FF9-04E3-43BF-8DBE-72F0645A9080}" type="presParOf" srcId="{1361BC6C-9B0B-4206-827D-3BF0B5B79B98}" destId="{FDCF2E21-0BBF-4C89-8E46-93D1F2D60A4C}" srcOrd="2" destOrd="0" presId="urn:microsoft.com/office/officeart/2005/8/layout/orgChart1"/>
+    <dgm:cxn modelId="{B4CE5155-320A-4852-8075-F0BA83C9A0CC}" type="presParOf" srcId="{1361BC6C-9B0B-4206-827D-3BF0B5B79B98}" destId="{579C8BBC-679D-4883-BCD3-A803A1F4A041}" srcOrd="3" destOrd="0" presId="urn:microsoft.com/office/officeart/2005/8/layout/orgChart1"/>
+    <dgm:cxn modelId="{6030E1ED-F292-440E-BC78-5AE077AB997A}" type="presParOf" srcId="{579C8BBC-679D-4883-BCD3-A803A1F4A041}" destId="{6837DE00-8205-422F-BDDD-F17E99CB1BE8}" srcOrd="0" destOrd="0" presId="urn:microsoft.com/office/officeart/2005/8/layout/orgChart1"/>
+    <dgm:cxn modelId="{33CA6FAE-C7C5-4757-80B8-C2373CA84037}" type="presParOf" srcId="{6837DE00-8205-422F-BDDD-F17E99CB1BE8}" destId="{3DA29272-8B54-4109-B1CF-306966EBCEA6}" srcOrd="0" destOrd="0" presId="urn:microsoft.com/office/officeart/2005/8/layout/orgChart1"/>
+    <dgm:cxn modelId="{CE1C6F03-B66A-4946-BBC5-4F5D8E076BAE}" type="presParOf" srcId="{6837DE00-8205-422F-BDDD-F17E99CB1BE8}" destId="{CFE66D09-E0AC-4059-9D41-E1709E524C84}" srcOrd="1" destOrd="0" presId="urn:microsoft.com/office/officeart/2005/8/layout/orgChart1"/>
+    <dgm:cxn modelId="{1A889CBC-2551-4B12-AFFE-7FD3F7D0643C}" type="presParOf" srcId="{579C8BBC-679D-4883-BCD3-A803A1F4A041}" destId="{C27F06AF-A642-4C0F-A633-4CDF443BC104}" srcOrd="1" destOrd="0" presId="urn:microsoft.com/office/officeart/2005/8/layout/orgChart1"/>
+    <dgm:cxn modelId="{0934FC8F-C702-406B-94F1-779F82D0FEEB}" type="presParOf" srcId="{579C8BBC-679D-4883-BCD3-A803A1F4A041}" destId="{945F342B-9689-4322-9AE7-BFD6B915DAEE}" srcOrd="2" destOrd="0" presId="urn:microsoft.com/office/officeart/2005/8/layout/orgChart1"/>
+    <dgm:cxn modelId="{E8C0FD96-86DC-47B7-9C5D-1569EB56AABD}" type="presParOf" srcId="{1361BC6C-9B0B-4206-827D-3BF0B5B79B98}" destId="{DABE2A97-8AFC-46F1-9229-CDFF582F36CD}" srcOrd="4" destOrd="0" presId="urn:microsoft.com/office/officeart/2005/8/layout/orgChart1"/>
+    <dgm:cxn modelId="{5696F6D7-2D0B-4A66-A2E5-808A8F6B5CAE}" type="presParOf" srcId="{1361BC6C-9B0B-4206-827D-3BF0B5B79B98}" destId="{F79A91D2-31E3-4214-A5B3-FDB94EEF9285}" srcOrd="5" destOrd="0" presId="urn:microsoft.com/office/officeart/2005/8/layout/orgChart1"/>
+    <dgm:cxn modelId="{0CCC7D46-96B6-42B8-AFFD-F62B074BAA42}" type="presParOf" srcId="{F79A91D2-31E3-4214-A5B3-FDB94EEF9285}" destId="{7D9010F7-3374-45E6-BB14-A40A8C0DA9AF}" srcOrd="0" destOrd="0" presId="urn:microsoft.com/office/officeart/2005/8/layout/orgChart1"/>
+    <dgm:cxn modelId="{A2C1BC13-158D-4EA4-B48C-19189D8A981C}" type="presParOf" srcId="{7D9010F7-3374-45E6-BB14-A40A8C0DA9AF}" destId="{B13177B0-B616-471A-B673-341F50F836B6}" srcOrd="0" destOrd="0" presId="urn:microsoft.com/office/officeart/2005/8/layout/orgChart1"/>
+    <dgm:cxn modelId="{3AE48574-8010-492A-B783-58A72365BBA5}" type="presParOf" srcId="{7D9010F7-3374-45E6-BB14-A40A8C0DA9AF}" destId="{29898FD7-6D50-464C-B5FD-8C53A87EEE52}" srcOrd="1" destOrd="0" presId="urn:microsoft.com/office/officeart/2005/8/layout/orgChart1"/>
+    <dgm:cxn modelId="{50DB29E6-C213-4D66-94DD-00D5327B8D0D}" type="presParOf" srcId="{F79A91D2-31E3-4214-A5B3-FDB94EEF9285}" destId="{D77A1B47-932A-44EA-B7CE-1DAA48EA4A4B}" srcOrd="1" destOrd="0" presId="urn:microsoft.com/office/officeart/2005/8/layout/orgChart1"/>
+    <dgm:cxn modelId="{3783E0E1-FA96-44C6-9A35-0B005C61AE80}" type="presParOf" srcId="{F79A91D2-31E3-4214-A5B3-FDB94EEF9285}" destId="{7DF5EC82-B2B7-4CDE-A286-05BBF6851BA8}" srcOrd="2" destOrd="0" presId="urn:microsoft.com/office/officeart/2005/8/layout/orgChart1"/>
     <dgm:cxn modelId="{B18CDD17-1833-42ED-B035-047FC65517AA}" type="presParOf" srcId="{3CDACF71-9436-40D9-B554-1B1DAEBD747E}" destId="{AFF660C7-7594-4A5C-9B19-EA55042202B5}" srcOrd="2" destOrd="0" presId="urn:microsoft.com/office/officeart/2005/8/layout/orgChart1"/>
     <dgm:cxn modelId="{BE848EAE-4A9C-408C-8AB0-D574FD68C4BE}" type="presParOf" srcId="{9A71EA88-E86A-4774-A0C2-7A36B7A46C30}" destId="{A3C064E1-EB83-4A90-BC9B-363A4369B1D9}" srcOrd="2" destOrd="0" presId="urn:microsoft.com/office/officeart/2005/8/layout/orgChart1"/>
     <dgm:cxn modelId="{A4546BE2-FF1F-46D3-8652-F2971A86158C}" type="presParOf" srcId="{9A71EA88-E86A-4774-A0C2-7A36B7A46C30}" destId="{5F49EB11-AF2A-43A7-A5F6-C818A93333A4}" srcOrd="3" destOrd="0" presId="urn:microsoft.com/office/officeart/2005/8/layout/orgChart1"/>
@@ -4749,15 +4693,15 @@
         <a:fontRef idx="minor"/>
       </dsp:style>
     </dsp:sp>
-    <dsp:sp modelId="{83BFE1B7-4CFE-4414-B2E2-2937D4F9C17F}">
+    <dsp:sp modelId="{DABE2A97-8AFC-46F1-9229-CDFF582F36CD}">
       <dsp:nvSpPr>
         <dsp:cNvPr id="0" name=""/>
         <dsp:cNvSpPr/>
       </dsp:nvSpPr>
       <dsp:spPr>
         <a:xfrm>
-          <a:off x="107468" y="2105357"/>
-          <a:ext cx="91440" cy="2885513"/>
+          <a:off x="153188" y="2105357"/>
+          <a:ext cx="243152" cy="1660948"/>
         </a:xfrm>
         <a:custGeom>
           <a:avLst/>
@@ -4768,13 +4712,13 @@
           <a:pathLst>
             <a:path>
               <a:moveTo>
-                <a:pt x="45720" y="0"/>
+                <a:pt x="0" y="0"/>
               </a:moveTo>
               <a:lnTo>
-                <a:pt x="45720" y="2885513"/>
+                <a:pt x="0" y="1660948"/>
               </a:lnTo>
               <a:lnTo>
-                <a:pt x="95457" y="2885513"/>
+                <a:pt x="243152" y="1660948"/>
               </a:lnTo>
             </a:path>
           </a:pathLst>
@@ -4808,15 +4752,15 @@
         <a:fontRef idx="minor"/>
       </dsp:style>
     </dsp:sp>
-    <dsp:sp modelId="{F5935B02-3EAE-43D8-83D7-0568EA754FE3}">
+    <dsp:sp modelId="{FDCF2E21-0BBF-4C89-8E46-93D1F2D60A4C}">
       <dsp:nvSpPr>
         <dsp:cNvPr id="0" name=""/>
         <dsp:cNvSpPr/>
       </dsp:nvSpPr>
       <dsp:spPr>
         <a:xfrm>
-          <a:off x="107468" y="2105357"/>
-          <a:ext cx="91440" cy="1803277"/>
+          <a:off x="153188" y="2105357"/>
+          <a:ext cx="228641" cy="2552657"/>
         </a:xfrm>
         <a:custGeom>
           <a:avLst/>
@@ -4827,13 +4771,13 @@
           <a:pathLst>
             <a:path>
               <a:moveTo>
-                <a:pt x="45720" y="0"/>
+                <a:pt x="0" y="0"/>
               </a:moveTo>
               <a:lnTo>
-                <a:pt x="45720" y="1803277"/>
+                <a:pt x="0" y="2552657"/>
               </a:lnTo>
               <a:lnTo>
-                <a:pt x="95457" y="1803277"/>
+                <a:pt x="228641" y="2552657"/>
               </a:lnTo>
             </a:path>
           </a:pathLst>
@@ -4867,15 +4811,15 @@
         <a:fontRef idx="minor"/>
       </dsp:style>
     </dsp:sp>
-    <dsp:sp modelId="{BCCB5965-B0E0-45CC-8894-BE1731CC57E2}">
+    <dsp:sp modelId="{CF63EB70-7A6D-4FA2-8E46-21CF359D0286}">
       <dsp:nvSpPr>
         <dsp:cNvPr id="0" name=""/>
         <dsp:cNvSpPr/>
       </dsp:nvSpPr>
       <dsp:spPr>
         <a:xfrm>
-          <a:off x="107468" y="2105357"/>
-          <a:ext cx="91440" cy="721042"/>
+          <a:off x="153188" y="2105357"/>
+          <a:ext cx="228641" cy="759218"/>
         </a:xfrm>
         <a:custGeom>
           <a:avLst/>
@@ -4886,13 +4830,13 @@
           <a:pathLst>
             <a:path>
               <a:moveTo>
-                <a:pt x="45720" y="0"/>
+                <a:pt x="0" y="0"/>
               </a:moveTo>
               <a:lnTo>
-                <a:pt x="45720" y="721042"/>
+                <a:pt x="0" y="759218"/>
               </a:lnTo>
               <a:lnTo>
-                <a:pt x="95457" y="721042"/>
+                <a:pt x="228641" y="759218"/>
               </a:lnTo>
             </a:path>
           </a:pathLst>
@@ -5170,96 +5114,14 @@
         <a:ext cx="1524274" cy="762137"/>
       </dsp:txXfrm>
     </dsp:sp>
-    <dsp:sp modelId="{5BD05F6E-C87D-423B-8545-489C3582E9A5}">
+    <dsp:sp modelId="{A11B1B3B-548B-4BF3-BD14-6C594BE6A489}">
       <dsp:nvSpPr>
         <dsp:cNvPr id="0" name=""/>
         <dsp:cNvSpPr/>
       </dsp:nvSpPr>
       <dsp:spPr>
         <a:xfrm>
-          <a:off x="202925" y="2445332"/>
-          <a:ext cx="1524274" cy="762137"/>
-        </a:xfrm>
-        <a:prstGeom prst="rect">
-          <a:avLst/>
-        </a:prstGeom>
-        <a:solidFill>
-          <a:schemeClr val="accent1">
-            <a:hueOff val="0"/>
-            <a:satOff val="0"/>
-            <a:lumOff val="0"/>
-            <a:alphaOff val="0"/>
-          </a:schemeClr>
-        </a:solidFill>
-        <a:ln w="12700" cap="flat" cmpd="sng" algn="ctr">
-          <a:solidFill>
-            <a:schemeClr val="lt1">
-              <a:hueOff val="0"/>
-              <a:satOff val="0"/>
-              <a:lumOff val="0"/>
-              <a:alphaOff val="0"/>
-            </a:schemeClr>
-          </a:solidFill>
-          <a:prstDash val="solid"/>
-          <a:miter lim="800000"/>
-        </a:ln>
-        <a:effectLst/>
-      </dsp:spPr>
-      <dsp:style>
-        <a:lnRef idx="2">
-          <a:scrgbClr r="0" g="0" b="0"/>
-        </a:lnRef>
-        <a:fillRef idx="1">
-          <a:scrgbClr r="0" g="0" b="0"/>
-        </a:fillRef>
-        <a:effectRef idx="0">
-          <a:scrgbClr r="0" g="0" b="0"/>
-        </a:effectRef>
-        <a:fontRef idx="minor">
-          <a:schemeClr val="lt1"/>
-        </a:fontRef>
-      </dsp:style>
-      <dsp:txBody>
-        <a:bodyPr spcFirstLastPara="0" vert="horz" wrap="square" lIns="19050" tIns="19050" rIns="19050" bIns="19050" numCol="1" spcCol="1270" anchor="ctr" anchorCtr="0">
-          <a:noAutofit/>
-        </a:bodyPr>
-        <a:lstStyle/>
-        <a:p>
-          <a:pPr lvl="0" algn="ctr" defTabSz="1333500">
-            <a:lnSpc>
-              <a:spcPct val="90000"/>
-            </a:lnSpc>
-            <a:spcBef>
-              <a:spcPct val="0"/>
-            </a:spcBef>
-            <a:spcAft>
-              <a:spcPct val="35000"/>
-            </a:spcAft>
-          </a:pPr>
-          <a:r>
-            <a:rPr lang="pt-PT" sz="3000" u="none" kern="1200" dirty="0"/>
-            <a:t>Porquê </a:t>
-          </a:r>
-          <a:r>
-            <a:rPr lang="pt-PT" sz="3000" u="none" kern="1200" dirty="0" smtClean="0"/>
-            <a:t>Covilhã?</a:t>
-          </a:r>
-          <a:endParaRPr lang="pt-PT" sz="3000" u="none" kern="1200" dirty="0"/>
-        </a:p>
-      </dsp:txBody>
-      <dsp:txXfrm>
-        <a:off x="202925" y="2445332"/>
-        <a:ext cx="1524274" cy="762137"/>
-      </dsp:txXfrm>
-    </dsp:sp>
-    <dsp:sp modelId="{AED2CD70-00FB-4D86-A988-A2B3331A944F}">
-      <dsp:nvSpPr>
-        <dsp:cNvPr id="0" name=""/>
-        <dsp:cNvSpPr/>
-      </dsp:nvSpPr>
-      <dsp:spPr>
-        <a:xfrm>
-          <a:off x="202925" y="3527567"/>
+          <a:off x="381829" y="2483507"/>
           <a:ext cx="1524274" cy="762137"/>
         </a:xfrm>
         <a:prstGeom prst="rect">
@@ -5319,29 +5181,25 @@
             </a:spcAft>
           </a:pPr>
           <a:r>
-            <a:rPr lang="pt-PT" sz="1800" u="none" kern="1200" dirty="0"/>
-            <a:t>Chegar à </a:t>
+            <a:rPr lang="pt-PT" sz="1800" kern="1200" dirty="0" smtClean="0"/>
+            <a:t>Porquê Covilhã?</a:t>
           </a:r>
-          <a:r>
-            <a:rPr lang="pt-PT" sz="1800" u="none" kern="1200" dirty="0" smtClean="0"/>
-            <a:t>Covilhã</a:t>
-          </a:r>
-          <a:endParaRPr lang="pt-PT" sz="1800" u="none" kern="1200" dirty="0"/>
+          <a:endParaRPr lang="pt-PT" sz="1800" kern="1200" dirty="0"/>
         </a:p>
       </dsp:txBody>
       <dsp:txXfrm>
-        <a:off x="202925" y="3527567"/>
+        <a:off x="381829" y="2483507"/>
         <a:ext cx="1524274" cy="762137"/>
       </dsp:txXfrm>
     </dsp:sp>
-    <dsp:sp modelId="{9C5E7AE7-E733-492C-8D9D-2B4E12574136}">
+    <dsp:sp modelId="{3DA29272-8B54-4109-B1CF-306966EBCEA6}">
       <dsp:nvSpPr>
         <dsp:cNvPr id="0" name=""/>
         <dsp:cNvSpPr/>
       </dsp:nvSpPr>
       <dsp:spPr>
         <a:xfrm>
-          <a:off x="202925" y="4609802"/>
+          <a:off x="381829" y="4276946"/>
           <a:ext cx="1524274" cy="762137"/>
         </a:xfrm>
         <a:prstGeom prst="rect">
@@ -5401,13 +5259,92 @@
             </a:spcAft>
           </a:pPr>
           <a:r>
-            <a:rPr lang="pt-PT" sz="1800" u="none" kern="1200" dirty="0"/>
+            <a:rPr lang="pt-PT" sz="1800" kern="1200" dirty="0" smtClean="0"/>
             <a:t>Mapa</a:t>
           </a:r>
+          <a:endParaRPr lang="pt-PT" sz="1800" kern="1200" dirty="0"/>
         </a:p>
       </dsp:txBody>
       <dsp:txXfrm>
-        <a:off x="202925" y="4609802"/>
+        <a:off x="381829" y="4276946"/>
+        <a:ext cx="1524274" cy="762137"/>
+      </dsp:txXfrm>
+    </dsp:sp>
+    <dsp:sp modelId="{B13177B0-B616-471A-B673-341F50F836B6}">
+      <dsp:nvSpPr>
+        <dsp:cNvPr id="0" name=""/>
+        <dsp:cNvSpPr/>
+      </dsp:nvSpPr>
+      <dsp:spPr>
+        <a:xfrm>
+          <a:off x="396340" y="3385238"/>
+          <a:ext cx="1524274" cy="762137"/>
+        </a:xfrm>
+        <a:prstGeom prst="rect">
+          <a:avLst/>
+        </a:prstGeom>
+        <a:solidFill>
+          <a:schemeClr val="accent1">
+            <a:hueOff val="0"/>
+            <a:satOff val="0"/>
+            <a:lumOff val="0"/>
+            <a:alphaOff val="0"/>
+          </a:schemeClr>
+        </a:solidFill>
+        <a:ln w="12700" cap="flat" cmpd="sng" algn="ctr">
+          <a:solidFill>
+            <a:schemeClr val="lt1">
+              <a:hueOff val="0"/>
+              <a:satOff val="0"/>
+              <a:lumOff val="0"/>
+              <a:alphaOff val="0"/>
+            </a:schemeClr>
+          </a:solidFill>
+          <a:prstDash val="solid"/>
+          <a:miter lim="800000"/>
+        </a:ln>
+        <a:effectLst/>
+      </dsp:spPr>
+      <dsp:style>
+        <a:lnRef idx="2">
+          <a:scrgbClr r="0" g="0" b="0"/>
+        </a:lnRef>
+        <a:fillRef idx="1">
+          <a:scrgbClr r="0" g="0" b="0"/>
+        </a:fillRef>
+        <a:effectRef idx="0">
+          <a:scrgbClr r="0" g="0" b="0"/>
+        </a:effectRef>
+        <a:fontRef idx="minor">
+          <a:schemeClr val="lt1"/>
+        </a:fontRef>
+      </dsp:style>
+      <dsp:txBody>
+        <a:bodyPr spcFirstLastPara="0" vert="horz" wrap="square" lIns="11430" tIns="11430" rIns="11430" bIns="11430" numCol="1" spcCol="1270" anchor="ctr" anchorCtr="0">
+          <a:noAutofit/>
+        </a:bodyPr>
+        <a:lstStyle/>
+        <a:p>
+          <a:pPr lvl="0" algn="ctr" defTabSz="800100">
+            <a:lnSpc>
+              <a:spcPct val="90000"/>
+            </a:lnSpc>
+            <a:spcBef>
+              <a:spcPct val="0"/>
+            </a:spcBef>
+            <a:spcAft>
+              <a:spcPct val="35000"/>
+            </a:spcAft>
+          </a:pPr>
+          <a:r>
+            <a:rPr lang="pt-PT" sz="1800" kern="1200" dirty="0" smtClean="0"/>
+            <a:t>Chegar à Covilhã</a:t>
+          </a:r>
+          <a:endParaRPr lang="pt-PT" sz="1800" kern="1200" dirty="0"/>
+        </a:p>
+      </dsp:txBody>
+      <dsp:txXfrm>
+        <a:off x="396340" y="3385238"/>
         <a:ext cx="1524274" cy="762137"/>
       </dsp:txXfrm>
     </dsp:sp>
@@ -10655,7 +10592,7 @@
           <a:p>
             <a:fld id="{FE46BE1C-E5B9-40EB-B480-3B6CCE635393}" type="datetimeFigureOut">
               <a:rPr lang="en-GB" smtClean="0"/>
-              <a:t>18/12/2018</a:t>
+              <a:t>30/12/2018</a:t>
             </a:fld>
             <a:endParaRPr lang="en-GB"/>
           </a:p>
@@ -11807,7 +11744,7 @@
           <a:p>
             <a:fld id="{46E4206C-CDB6-49DB-A49C-1C74FE4EA3F6}" type="datetime1">
               <a:rPr lang="en-GB" smtClean="0"/>
-              <a:t>18/12/2018</a:t>
+              <a:t>30/12/2018</a:t>
             </a:fld>
             <a:endParaRPr lang="en-GB"/>
           </a:p>
@@ -11977,7 +11914,7 @@
           <a:p>
             <a:fld id="{EC42A3EE-7AFB-4F73-B39D-FB9AAAE09D70}" type="datetime1">
               <a:rPr lang="en-GB" smtClean="0"/>
-              <a:t>18/12/2018</a:t>
+              <a:t>30/12/2018</a:t>
             </a:fld>
             <a:endParaRPr lang="en-GB"/>
           </a:p>
@@ -12157,7 +12094,7 @@
           <a:p>
             <a:fld id="{297491F8-B1AD-48C8-B450-A9DE8FC9B4BC}" type="datetime1">
               <a:rPr lang="en-GB" smtClean="0"/>
-              <a:t>18/12/2018</a:t>
+              <a:t>30/12/2018</a:t>
             </a:fld>
             <a:endParaRPr lang="en-GB"/>
           </a:p>
@@ -13059,7 +12996,7 @@
           <a:p>
             <a:fld id="{1241B6BE-13A3-40C5-BAF7-2CC773D00FB0}" type="datetime1">
               <a:rPr lang="en-GB" smtClean="0"/>
-              <a:t>18/12/2018</a:t>
+              <a:t>30/12/2018</a:t>
             </a:fld>
             <a:endParaRPr lang="en-GB"/>
           </a:p>
@@ -13303,7 +13240,7 @@
           <a:p>
             <a:fld id="{30A9CCEB-FEAA-4C72-9118-04BDF5966FFB}" type="datetime1">
               <a:rPr lang="en-GB" smtClean="0"/>
-              <a:t>18/12/2018</a:t>
+              <a:t>30/12/2018</a:t>
             </a:fld>
             <a:endParaRPr lang="en-GB"/>
           </a:p>
@@ -13535,7 +13472,7 @@
           <a:p>
             <a:fld id="{DFAB555E-071C-48B6-AB80-445E4540AC68}" type="datetime1">
               <a:rPr lang="en-GB" smtClean="0"/>
-              <a:t>18/12/2018</a:t>
+              <a:t>30/12/2018</a:t>
             </a:fld>
             <a:endParaRPr lang="en-GB"/>
           </a:p>
@@ -13902,7 +13839,7 @@
           <a:p>
             <a:fld id="{71C8195A-F236-4C56-A7B6-A9E3130AE1F9}" type="datetime1">
               <a:rPr lang="en-GB" smtClean="0"/>
-              <a:t>18/12/2018</a:t>
+              <a:t>30/12/2018</a:t>
             </a:fld>
             <a:endParaRPr lang="en-GB"/>
           </a:p>
@@ -14020,7 +13957,7 @@
           <a:p>
             <a:fld id="{2F2BBF01-7E4A-4B0A-98AA-6A611EFD036E}" type="datetime1">
               <a:rPr lang="en-GB" smtClean="0"/>
-              <a:t>18/12/2018</a:t>
+              <a:t>30/12/2018</a:t>
             </a:fld>
             <a:endParaRPr lang="en-GB"/>
           </a:p>
@@ -14115,7 +14052,7 @@
           <a:p>
             <a:fld id="{6EBF66CE-A945-42FA-B1CB-E96DCD998F84}" type="datetime1">
               <a:rPr lang="en-GB" smtClean="0"/>
-              <a:t>18/12/2018</a:t>
+              <a:t>30/12/2018</a:t>
             </a:fld>
             <a:endParaRPr lang="en-GB"/>
           </a:p>
@@ -14392,7 +14329,7 @@
           <a:p>
             <a:fld id="{8E2C1C88-A111-4B14-B38C-BDD24B4F2065}" type="datetime1">
               <a:rPr lang="en-GB" smtClean="0"/>
-              <a:t>18/12/2018</a:t>
+              <a:t>30/12/2018</a:t>
             </a:fld>
             <a:endParaRPr lang="en-GB"/>
           </a:p>
@@ -14649,7 +14586,7 @@
           <a:p>
             <a:fld id="{A033B5E6-D2E8-4024-8FEA-9A34E9CC2096}" type="datetime1">
               <a:rPr lang="en-GB" smtClean="0"/>
-              <a:t>18/12/2018</a:t>
+              <a:t>30/12/2018</a:t>
             </a:fld>
             <a:endParaRPr lang="en-GB"/>
           </a:p>
@@ -14861,7 +14798,7 @@
           <a:p>
             <a:fld id="{86124722-C52C-4725-B554-5890676B8B27}" type="datetime1">
               <a:rPr lang="en-GB" smtClean="0"/>
-              <a:t>18/12/2018</a:t>
+              <a:t>30/12/2018</a:t>
             </a:fld>
             <a:endParaRPr lang="en-GB"/>
           </a:p>
@@ -16088,7 +16025,7 @@
           <p:cNvPr id="2" name="Content Placeholder 1">
             <a:extLst>
               <a:ext uri="{FF2B5EF4-FFF2-40B4-BE49-F238E27FC236}">
-                <a16:creationId xmlns:a16="http://schemas.microsoft.com/office/drawing/2014/main" xmlns="" id="{61284A3C-35C7-47BB-B5EF-3A5AFD39F048}"/>
+                <a16:creationId xmlns="" xmlns:a16="http://schemas.microsoft.com/office/drawing/2014/main" id="{61284A3C-35C7-47BB-B5EF-3A5AFD39F048}"/>
               </a:ext>
             </a:extLst>
           </p:cNvPr>
@@ -16113,7 +16050,7 @@
           <p:cNvPr id="3" name="Content Placeholder 2">
             <a:extLst>
               <a:ext uri="{FF2B5EF4-FFF2-40B4-BE49-F238E27FC236}">
-                <a16:creationId xmlns:a16="http://schemas.microsoft.com/office/drawing/2014/main" xmlns="" id="{75B62007-2099-491F-B9CC-679828859075}"/>
+                <a16:creationId xmlns="" xmlns:a16="http://schemas.microsoft.com/office/drawing/2014/main" id="{75B62007-2099-491F-B9CC-679828859075}"/>
               </a:ext>
             </a:extLst>
           </p:cNvPr>
@@ -16135,35 +16072,10 @@
       </p:sp>
       <p:sp>
         <p:nvSpPr>
-          <p:cNvPr id="4" name="Content Placeholder 3">
-            <a:extLst>
-              <a:ext uri="{FF2B5EF4-FFF2-40B4-BE49-F238E27FC236}">
-                <a16:creationId xmlns:a16="http://schemas.microsoft.com/office/drawing/2014/main" xmlns="" id="{B573A8A9-0BDE-4B35-955D-A5C9FAFE6755}"/>
-              </a:ext>
-            </a:extLst>
-          </p:cNvPr>
-          <p:cNvSpPr>
-            <a:spLocks noGrp="1"/>
-          </p:cNvSpPr>
-          <p:nvPr>
-            <p:ph idx="11"/>
-          </p:nvPr>
-        </p:nvSpPr>
-        <p:spPr/>
-        <p:txBody>
-          <a:bodyPr/>
-          <a:lstStyle/>
-          <a:p>
-            <a:endParaRPr lang="pt-PT" dirty="0"/>
-          </a:p>
-        </p:txBody>
-      </p:sp>
-      <p:sp>
-        <p:nvSpPr>
           <p:cNvPr id="5" name="Content Placeholder 4">
             <a:extLst>
               <a:ext uri="{FF2B5EF4-FFF2-40B4-BE49-F238E27FC236}">
-                <a16:creationId xmlns:a16="http://schemas.microsoft.com/office/drawing/2014/main" xmlns="" id="{03F0B0E7-9DC5-4E64-84FC-E41A42350BE1}"/>
+                <a16:creationId xmlns="" xmlns:a16="http://schemas.microsoft.com/office/drawing/2014/main" id="{03F0B0E7-9DC5-4E64-84FC-E41A42350BE1}"/>
               </a:ext>
             </a:extLst>
           </p:cNvPr>
@@ -16188,7 +16100,7 @@
           <p:cNvPr id="6" name="Content Placeholder 5">
             <a:extLst>
               <a:ext uri="{FF2B5EF4-FFF2-40B4-BE49-F238E27FC236}">
-                <a16:creationId xmlns:a16="http://schemas.microsoft.com/office/drawing/2014/main" xmlns="" id="{AAD76EA7-FFDD-4221-8BFA-2CF2F90A53A9}"/>
+                <a16:creationId xmlns="" xmlns:a16="http://schemas.microsoft.com/office/drawing/2014/main" id="{AAD76EA7-FFDD-4221-8BFA-2CF2F90A53A9}"/>
               </a:ext>
             </a:extLst>
           </p:cNvPr>
@@ -16206,16 +16118,49 @@
           <a:p>
             <a:r>
               <a:rPr lang="pt-PT" dirty="0" smtClean="0"/>
-              <a:t>Calendário</a:t>
+              <a:t>Música</a:t>
             </a:r>
             <a:endParaRPr lang="pt-PT" dirty="0"/>
           </a:p>
         </p:txBody>
       </p:sp>
+      <p:pic>
+        <p:nvPicPr>
+          <p:cNvPr id="7" name="Google Shape;218;p21"/>
+          <p:cNvPicPr preferRelativeResize="0">
+            <a:picLocks noGrp="1"/>
+          </p:cNvPicPr>
+          <p:nvPr>
+            <p:ph idx="11"/>
+          </p:nvPr>
+        </p:nvPicPr>
+        <p:blipFill rotWithShape="1">
+          <a:blip r:embed="rId2">
+            <a:alphaModFix/>
+          </a:blip>
+          <a:srcRect/>
+          <a:stretch/>
+        </p:blipFill>
+        <p:spPr>
+          <a:xfrm>
+            <a:off x="1967430" y="684213"/>
+            <a:ext cx="3367639" cy="3194050"/>
+          </a:xfrm>
+          <a:prstGeom prst="rect">
+            <a:avLst/>
+          </a:prstGeom>
+          <a:solidFill>
+            <a:srgbClr val="FBE4D4"/>
+          </a:solidFill>
+          <a:ln>
+            <a:noFill/>
+          </a:ln>
+        </p:spPr>
+      </p:pic>
     </p:spTree>
     <p:extLst>
       <p:ext uri="{BB962C8B-B14F-4D97-AF65-F5344CB8AC3E}">
-        <p14:creationId xmlns:p14="http://schemas.microsoft.com/office/powerpoint/2010/main" val="1324516063"/>
+        <p14:creationId xmlns:p14="http://schemas.microsoft.com/office/powerpoint/2010/main" val="4011758723"/>
       </p:ext>
     </p:extLst>
   </p:cSld>
@@ -16244,13 +16189,7 @@
       </p:grpSpPr>
       <p:sp>
         <p:nvSpPr>
-          <p:cNvPr id="2" name="Content Placeholder 1">
-            <a:extLst>
-              <a:ext uri="{FF2B5EF4-FFF2-40B4-BE49-F238E27FC236}">
-                <a16:creationId xmlns:a16="http://schemas.microsoft.com/office/drawing/2014/main" xmlns="" id="{61284A3C-35C7-47BB-B5EF-3A5AFD39F048}"/>
-              </a:ext>
-            </a:extLst>
-          </p:cNvPr>
+          <p:cNvPr id="2" name="Marcador de Posição de Conteúdo 1"/>
           <p:cNvSpPr>
             <a:spLocks noGrp="1"/>
           </p:cNvSpPr>
@@ -16263,19 +16202,13 @@
           <a:bodyPr/>
           <a:lstStyle/>
           <a:p>
-            <a:endParaRPr lang="pt-PT" dirty="0"/>
+            <a:endParaRPr lang="pt-PT"/>
           </a:p>
         </p:txBody>
       </p:sp>
       <p:sp>
         <p:nvSpPr>
-          <p:cNvPr id="3" name="Content Placeholder 2">
-            <a:extLst>
-              <a:ext uri="{FF2B5EF4-FFF2-40B4-BE49-F238E27FC236}">
-                <a16:creationId xmlns:a16="http://schemas.microsoft.com/office/drawing/2014/main" xmlns="" id="{75B62007-2099-491F-B9CC-679828859075}"/>
-              </a:ext>
-            </a:extLst>
-          </p:cNvPr>
+          <p:cNvPr id="3" name="Marcador de Posição de Conteúdo 2"/>
           <p:cNvSpPr>
             <a:spLocks noGrp="1"/>
           </p:cNvSpPr>
@@ -16288,44 +16221,13 @@
           <a:bodyPr/>
           <a:lstStyle/>
           <a:p>
-            <a:endParaRPr lang="pt-PT" dirty="0"/>
+            <a:endParaRPr lang="pt-PT"/>
           </a:p>
         </p:txBody>
       </p:sp>
       <p:sp>
         <p:nvSpPr>
-          <p:cNvPr id="4" name="Content Placeholder 3">
-            <a:extLst>
-              <a:ext uri="{FF2B5EF4-FFF2-40B4-BE49-F238E27FC236}">
-                <a16:creationId xmlns:a16="http://schemas.microsoft.com/office/drawing/2014/main" xmlns="" id="{B573A8A9-0BDE-4B35-955D-A5C9FAFE6755}"/>
-              </a:ext>
-            </a:extLst>
-          </p:cNvPr>
-          <p:cNvSpPr>
-            <a:spLocks noGrp="1"/>
-          </p:cNvSpPr>
-          <p:nvPr>
-            <p:ph idx="11"/>
-          </p:nvPr>
-        </p:nvSpPr>
-        <p:spPr/>
-        <p:txBody>
-          <a:bodyPr/>
-          <a:lstStyle/>
-          <a:p>
-            <a:endParaRPr lang="pt-PT" dirty="0"/>
-          </a:p>
-        </p:txBody>
-      </p:sp>
-      <p:sp>
-        <p:nvSpPr>
-          <p:cNvPr id="5" name="Content Placeholder 4">
-            <a:extLst>
-              <a:ext uri="{FF2B5EF4-FFF2-40B4-BE49-F238E27FC236}">
-                <a16:creationId xmlns:a16="http://schemas.microsoft.com/office/drawing/2014/main" xmlns="" id="{03F0B0E7-9DC5-4E64-84FC-E41A42350BE1}"/>
-              </a:ext>
-            </a:extLst>
-          </p:cNvPr>
+          <p:cNvPr id="5" name="Marcador de Posição de Conteúdo 4"/>
           <p:cNvSpPr>
             <a:spLocks noGrp="1"/>
           </p:cNvSpPr>
@@ -16338,19 +16240,13 @@
           <a:bodyPr/>
           <a:lstStyle/>
           <a:p>
-            <a:endParaRPr lang="pt-PT" dirty="0"/>
+            <a:endParaRPr lang="pt-PT"/>
           </a:p>
         </p:txBody>
       </p:sp>
       <p:sp>
         <p:nvSpPr>
-          <p:cNvPr id="6" name="Content Placeholder 5">
-            <a:extLst>
-              <a:ext uri="{FF2B5EF4-FFF2-40B4-BE49-F238E27FC236}">
-                <a16:creationId xmlns:a16="http://schemas.microsoft.com/office/drawing/2014/main" xmlns="" id="{AAD76EA7-FFDD-4221-8BFA-2CF2F90A53A9}"/>
-              </a:ext>
-            </a:extLst>
-          </p:cNvPr>
+          <p:cNvPr id="6" name="Marcador de Posição de Conteúdo 5"/>
           <p:cNvSpPr>
             <a:spLocks noGrp="1"/>
           </p:cNvSpPr>
@@ -16365,16 +16261,49 @@
           <a:p>
             <a:r>
               <a:rPr lang="pt-PT" dirty="0" smtClean="0"/>
-              <a:t>Artes</a:t>
+              <a:t>Noite</a:t>
             </a:r>
             <a:endParaRPr lang="pt-PT" dirty="0"/>
           </a:p>
         </p:txBody>
       </p:sp>
+      <p:pic>
+        <p:nvPicPr>
+          <p:cNvPr id="7" name="Google Shape;218;p21"/>
+          <p:cNvPicPr preferRelativeResize="0">
+            <a:picLocks noGrp="1"/>
+          </p:cNvPicPr>
+          <p:nvPr>
+            <p:ph idx="11"/>
+          </p:nvPr>
+        </p:nvPicPr>
+        <p:blipFill rotWithShape="1">
+          <a:blip r:embed="rId2">
+            <a:alphaModFix/>
+          </a:blip>
+          <a:srcRect/>
+          <a:stretch/>
+        </p:blipFill>
+        <p:spPr>
+          <a:xfrm>
+            <a:off x="1967430" y="684213"/>
+            <a:ext cx="3367639" cy="3194050"/>
+          </a:xfrm>
+          <a:prstGeom prst="rect">
+            <a:avLst/>
+          </a:prstGeom>
+          <a:solidFill>
+            <a:srgbClr val="FBE4D4"/>
+          </a:solidFill>
+          <a:ln>
+            <a:noFill/>
+          </a:ln>
+        </p:spPr>
+      </p:pic>
     </p:spTree>
     <p:extLst>
       <p:ext uri="{BB962C8B-B14F-4D97-AF65-F5344CB8AC3E}">
-        <p14:creationId xmlns:p14="http://schemas.microsoft.com/office/powerpoint/2010/main" val="3402220871"/>
+        <p14:creationId xmlns:p14="http://schemas.microsoft.com/office/powerpoint/2010/main" val="145047405"/>
       </p:ext>
     </p:extLst>
   </p:cSld>
@@ -16406,7 +16335,7 @@
           <p:cNvPr id="2" name="Content Placeholder 1">
             <a:extLst>
               <a:ext uri="{FF2B5EF4-FFF2-40B4-BE49-F238E27FC236}">
-                <a16:creationId xmlns:a16="http://schemas.microsoft.com/office/drawing/2014/main" xmlns="" id="{61284A3C-35C7-47BB-B5EF-3A5AFD39F048}"/>
+                <a16:creationId xmlns="" xmlns:a16="http://schemas.microsoft.com/office/drawing/2014/main" id="{61284A3C-35C7-47BB-B5EF-3A5AFD39F048}"/>
               </a:ext>
             </a:extLst>
           </p:cNvPr>
@@ -16431,7 +16360,7 @@
           <p:cNvPr id="3" name="Content Placeholder 2">
             <a:extLst>
               <a:ext uri="{FF2B5EF4-FFF2-40B4-BE49-F238E27FC236}">
-                <a16:creationId xmlns:a16="http://schemas.microsoft.com/office/drawing/2014/main" xmlns="" id="{75B62007-2099-491F-B9CC-679828859075}"/>
+                <a16:creationId xmlns="" xmlns:a16="http://schemas.microsoft.com/office/drawing/2014/main" id="{75B62007-2099-491F-B9CC-679828859075}"/>
               </a:ext>
             </a:extLst>
           </p:cNvPr>
@@ -16453,35 +16382,10 @@
       </p:sp>
       <p:sp>
         <p:nvSpPr>
-          <p:cNvPr id="4" name="Content Placeholder 3">
-            <a:extLst>
-              <a:ext uri="{FF2B5EF4-FFF2-40B4-BE49-F238E27FC236}">
-                <a16:creationId xmlns:a16="http://schemas.microsoft.com/office/drawing/2014/main" xmlns="" id="{B573A8A9-0BDE-4B35-955D-A5C9FAFE6755}"/>
-              </a:ext>
-            </a:extLst>
-          </p:cNvPr>
-          <p:cNvSpPr>
-            <a:spLocks noGrp="1"/>
-          </p:cNvSpPr>
-          <p:nvPr>
-            <p:ph idx="11"/>
-          </p:nvPr>
-        </p:nvSpPr>
-        <p:spPr/>
-        <p:txBody>
-          <a:bodyPr/>
-          <a:lstStyle/>
-          <a:p>
-            <a:endParaRPr lang="pt-PT" dirty="0"/>
-          </a:p>
-        </p:txBody>
-      </p:sp>
-      <p:sp>
-        <p:nvSpPr>
           <p:cNvPr id="5" name="Content Placeholder 4">
             <a:extLst>
               <a:ext uri="{FF2B5EF4-FFF2-40B4-BE49-F238E27FC236}">
-                <a16:creationId xmlns:a16="http://schemas.microsoft.com/office/drawing/2014/main" xmlns="" id="{03F0B0E7-9DC5-4E64-84FC-E41A42350BE1}"/>
+                <a16:creationId xmlns="" xmlns:a16="http://schemas.microsoft.com/office/drawing/2014/main" id="{03F0B0E7-9DC5-4E64-84FC-E41A42350BE1}"/>
               </a:ext>
             </a:extLst>
           </p:cNvPr>
@@ -16506,7 +16410,7 @@
           <p:cNvPr id="6" name="Content Placeholder 5">
             <a:extLst>
               <a:ext uri="{FF2B5EF4-FFF2-40B4-BE49-F238E27FC236}">
-                <a16:creationId xmlns:a16="http://schemas.microsoft.com/office/drawing/2014/main" xmlns="" id="{AAD76EA7-FFDD-4221-8BFA-2CF2F90A53A9}"/>
+                <a16:creationId xmlns="" xmlns:a16="http://schemas.microsoft.com/office/drawing/2014/main" id="{AAD76EA7-FFDD-4221-8BFA-2CF2F90A53A9}"/>
               </a:ext>
             </a:extLst>
           </p:cNvPr>
@@ -16524,16 +16428,49 @@
           <a:p>
             <a:r>
               <a:rPr lang="pt-PT" dirty="0" smtClean="0"/>
-              <a:t>Música</a:t>
+              <a:t>Cultura</a:t>
             </a:r>
             <a:endParaRPr lang="pt-PT" dirty="0"/>
           </a:p>
         </p:txBody>
       </p:sp>
+      <p:pic>
+        <p:nvPicPr>
+          <p:cNvPr id="7" name="Google Shape;218;p21"/>
+          <p:cNvPicPr preferRelativeResize="0">
+            <a:picLocks noGrp="1"/>
+          </p:cNvPicPr>
+          <p:nvPr>
+            <p:ph idx="11"/>
+          </p:nvPr>
+        </p:nvPicPr>
+        <p:blipFill rotWithShape="1">
+          <a:blip r:embed="rId2">
+            <a:alphaModFix/>
+          </a:blip>
+          <a:srcRect/>
+          <a:stretch/>
+        </p:blipFill>
+        <p:spPr>
+          <a:xfrm>
+            <a:off x="1967430" y="684213"/>
+            <a:ext cx="3367639" cy="3194050"/>
+          </a:xfrm>
+          <a:prstGeom prst="rect">
+            <a:avLst/>
+          </a:prstGeom>
+          <a:solidFill>
+            <a:srgbClr val="FBE4D4"/>
+          </a:solidFill>
+          <a:ln>
+            <a:noFill/>
+          </a:ln>
+        </p:spPr>
+      </p:pic>
     </p:spTree>
     <p:extLst>
       <p:ext uri="{BB962C8B-B14F-4D97-AF65-F5344CB8AC3E}">
-        <p14:creationId xmlns:p14="http://schemas.microsoft.com/office/powerpoint/2010/main" val="4011758723"/>
+        <p14:creationId xmlns:p14="http://schemas.microsoft.com/office/powerpoint/2010/main" val="3944840309"/>
       </p:ext>
     </p:extLst>
   </p:cSld>
@@ -16544,6 +16481,173 @@
 </file>
 
 <file path=ppt/slides/slide13.xml><?xml version="1.0" encoding="utf-8"?>
+<p:sld xmlns:a="http://schemas.openxmlformats.org/drawingml/2006/main" xmlns:r="http://schemas.openxmlformats.org/officeDocument/2006/relationships" xmlns:p="http://schemas.openxmlformats.org/presentationml/2006/main">
+  <p:cSld>
+    <p:spTree>
+      <p:nvGrpSpPr>
+        <p:cNvPr id="1" name=""/>
+        <p:cNvGrpSpPr/>
+        <p:nvPr/>
+      </p:nvGrpSpPr>
+      <p:grpSpPr>
+        <a:xfrm>
+          <a:off x="0" y="0"/>
+          <a:ext cx="0" cy="0"/>
+          <a:chOff x="0" y="0"/>
+          <a:chExt cx="0" cy="0"/>
+        </a:xfrm>
+      </p:grpSpPr>
+      <p:sp>
+        <p:nvSpPr>
+          <p:cNvPr id="2" name="Content Placeholder 1">
+            <a:extLst>
+              <a:ext uri="{FF2B5EF4-FFF2-40B4-BE49-F238E27FC236}">
+                <a16:creationId xmlns="" xmlns:a16="http://schemas.microsoft.com/office/drawing/2014/main" id="{61284A3C-35C7-47BB-B5EF-3A5AFD39F048}"/>
+              </a:ext>
+            </a:extLst>
+          </p:cNvPr>
+          <p:cNvSpPr>
+            <a:spLocks noGrp="1"/>
+          </p:cNvSpPr>
+          <p:nvPr>
+            <p:ph idx="1"/>
+          </p:nvPr>
+        </p:nvSpPr>
+        <p:spPr/>
+        <p:txBody>
+          <a:bodyPr/>
+          <a:lstStyle/>
+          <a:p>
+            <a:endParaRPr lang="pt-PT" dirty="0"/>
+          </a:p>
+        </p:txBody>
+      </p:sp>
+      <p:sp>
+        <p:nvSpPr>
+          <p:cNvPr id="3" name="Content Placeholder 2">
+            <a:extLst>
+              <a:ext uri="{FF2B5EF4-FFF2-40B4-BE49-F238E27FC236}">
+                <a16:creationId xmlns="" xmlns:a16="http://schemas.microsoft.com/office/drawing/2014/main" id="{75B62007-2099-491F-B9CC-679828859075}"/>
+              </a:ext>
+            </a:extLst>
+          </p:cNvPr>
+          <p:cNvSpPr>
+            <a:spLocks noGrp="1"/>
+          </p:cNvSpPr>
+          <p:nvPr>
+            <p:ph idx="10"/>
+          </p:nvPr>
+        </p:nvSpPr>
+        <p:spPr/>
+        <p:txBody>
+          <a:bodyPr/>
+          <a:lstStyle/>
+          <a:p>
+            <a:endParaRPr lang="pt-PT" dirty="0"/>
+          </a:p>
+        </p:txBody>
+      </p:sp>
+      <p:sp>
+        <p:nvSpPr>
+          <p:cNvPr id="5" name="Content Placeholder 4">
+            <a:extLst>
+              <a:ext uri="{FF2B5EF4-FFF2-40B4-BE49-F238E27FC236}">
+                <a16:creationId xmlns="" xmlns:a16="http://schemas.microsoft.com/office/drawing/2014/main" id="{03F0B0E7-9DC5-4E64-84FC-E41A42350BE1}"/>
+              </a:ext>
+            </a:extLst>
+          </p:cNvPr>
+          <p:cNvSpPr>
+            <a:spLocks noGrp="1"/>
+          </p:cNvSpPr>
+          <p:nvPr>
+            <p:ph idx="12"/>
+          </p:nvPr>
+        </p:nvSpPr>
+        <p:spPr/>
+        <p:txBody>
+          <a:bodyPr/>
+          <a:lstStyle/>
+          <a:p>
+            <a:endParaRPr lang="pt-PT" dirty="0"/>
+          </a:p>
+        </p:txBody>
+      </p:sp>
+      <p:sp>
+        <p:nvSpPr>
+          <p:cNvPr id="6" name="Content Placeholder 5">
+            <a:extLst>
+              <a:ext uri="{FF2B5EF4-FFF2-40B4-BE49-F238E27FC236}">
+                <a16:creationId xmlns="" xmlns:a16="http://schemas.microsoft.com/office/drawing/2014/main" id="{AAD76EA7-FFDD-4221-8BFA-2CF2F90A53A9}"/>
+              </a:ext>
+            </a:extLst>
+          </p:cNvPr>
+          <p:cNvSpPr>
+            <a:spLocks noGrp="1"/>
+          </p:cNvSpPr>
+          <p:nvPr>
+            <p:ph idx="13"/>
+          </p:nvPr>
+        </p:nvSpPr>
+        <p:spPr/>
+        <p:txBody>
+          <a:bodyPr/>
+          <a:lstStyle/>
+          <a:p>
+            <a:r>
+              <a:rPr lang="pt-PT" dirty="0" smtClean="0"/>
+              <a:t>Desporto </a:t>
+            </a:r>
+            <a:endParaRPr lang="pt-PT" dirty="0"/>
+          </a:p>
+        </p:txBody>
+      </p:sp>
+      <p:pic>
+        <p:nvPicPr>
+          <p:cNvPr id="7" name="Google Shape;218;p21"/>
+          <p:cNvPicPr preferRelativeResize="0">
+            <a:picLocks noGrp="1"/>
+          </p:cNvPicPr>
+          <p:nvPr>
+            <p:ph idx="11"/>
+          </p:nvPr>
+        </p:nvPicPr>
+        <p:blipFill rotWithShape="1">
+          <a:blip r:embed="rId2">
+            <a:alphaModFix/>
+          </a:blip>
+          <a:srcRect/>
+          <a:stretch/>
+        </p:blipFill>
+        <p:spPr>
+          <a:xfrm>
+            <a:off x="1967430" y="684213"/>
+            <a:ext cx="3367639" cy="3194050"/>
+          </a:xfrm>
+          <a:prstGeom prst="rect">
+            <a:avLst/>
+          </a:prstGeom>
+          <a:solidFill>
+            <a:srgbClr val="FBE4D4"/>
+          </a:solidFill>
+          <a:ln>
+            <a:noFill/>
+          </a:ln>
+        </p:spPr>
+      </p:pic>
+    </p:spTree>
+    <p:extLst>
+      <p:ext uri="{BB962C8B-B14F-4D97-AF65-F5344CB8AC3E}">
+        <p14:creationId xmlns:p14="http://schemas.microsoft.com/office/powerpoint/2010/main" val="3201941665"/>
+      </p:ext>
+    </p:extLst>
+  </p:cSld>
+  <p:clrMapOvr>
+    <a:masterClrMapping/>
+  </p:clrMapOvr>
+</p:sld>
+</file>
+
+<file path=ppt/slides/slide14.xml><?xml version="1.0" encoding="utf-8"?>
 <p:sld xmlns:a="http://schemas.openxmlformats.org/drawingml/2006/main" xmlns:r="http://schemas.openxmlformats.org/officeDocument/2006/relationships" xmlns:p="http://schemas.openxmlformats.org/presentationml/2006/main">
   <p:cSld>
     <p:spTree>
@@ -16600,25 +16704,6 @@
       </p:sp>
       <p:sp>
         <p:nvSpPr>
-          <p:cNvPr id="4" name="Marcador de Posição de Conteúdo 3"/>
-          <p:cNvSpPr>
-            <a:spLocks noGrp="1"/>
-          </p:cNvSpPr>
-          <p:nvPr>
-            <p:ph idx="11"/>
-          </p:nvPr>
-        </p:nvSpPr>
-        <p:spPr/>
-        <p:txBody>
-          <a:bodyPr/>
-          <a:lstStyle/>
-          <a:p>
-            <a:endParaRPr lang="pt-PT"/>
-          </a:p>
-        </p:txBody>
-      </p:sp>
-      <p:sp>
-        <p:nvSpPr>
           <p:cNvPr id="5" name="Marcador de Posição de Conteúdo 4"/>
           <p:cNvSpPr>
             <a:spLocks noGrp="1"/>
@@ -16653,175 +16738,49 @@
           <a:p>
             <a:r>
               <a:rPr lang="pt-PT" dirty="0" smtClean="0"/>
-              <a:t>Noite</a:t>
+              <a:t>Em destaque</a:t>
             </a:r>
             <a:endParaRPr lang="pt-PT" dirty="0"/>
           </a:p>
         </p:txBody>
       </p:sp>
+      <p:pic>
+        <p:nvPicPr>
+          <p:cNvPr id="7" name="Google Shape;218;p21"/>
+          <p:cNvPicPr preferRelativeResize="0">
+            <a:picLocks noGrp="1"/>
+          </p:cNvPicPr>
+          <p:nvPr>
+            <p:ph idx="11"/>
+          </p:nvPr>
+        </p:nvPicPr>
+        <p:blipFill rotWithShape="1">
+          <a:blip r:embed="rId2">
+            <a:alphaModFix/>
+          </a:blip>
+          <a:srcRect/>
+          <a:stretch/>
+        </p:blipFill>
+        <p:spPr>
+          <a:xfrm>
+            <a:off x="1967430" y="684213"/>
+            <a:ext cx="3367639" cy="3194050"/>
+          </a:xfrm>
+          <a:prstGeom prst="rect">
+            <a:avLst/>
+          </a:prstGeom>
+          <a:solidFill>
+            <a:srgbClr val="FBE4D4"/>
+          </a:solidFill>
+          <a:ln>
+            <a:noFill/>
+          </a:ln>
+        </p:spPr>
+      </p:pic>
     </p:spTree>
     <p:extLst>
       <p:ext uri="{BB962C8B-B14F-4D97-AF65-F5344CB8AC3E}">
-        <p14:creationId xmlns:p14="http://schemas.microsoft.com/office/powerpoint/2010/main" val="145047405"/>
-      </p:ext>
-    </p:extLst>
-  </p:cSld>
-  <p:clrMapOvr>
-    <a:masterClrMapping/>
-  </p:clrMapOvr>
-</p:sld>
-</file>
-
-<file path=ppt/slides/slide14.xml><?xml version="1.0" encoding="utf-8"?>
-<p:sld xmlns:a="http://schemas.openxmlformats.org/drawingml/2006/main" xmlns:r="http://schemas.openxmlformats.org/officeDocument/2006/relationships" xmlns:p="http://schemas.openxmlformats.org/presentationml/2006/main">
-  <p:cSld>
-    <p:spTree>
-      <p:nvGrpSpPr>
-        <p:cNvPr id="1" name=""/>
-        <p:cNvGrpSpPr/>
-        <p:nvPr/>
-      </p:nvGrpSpPr>
-      <p:grpSpPr>
-        <a:xfrm>
-          <a:off x="0" y="0"/>
-          <a:ext cx="0" cy="0"/>
-          <a:chOff x="0" y="0"/>
-          <a:chExt cx="0" cy="0"/>
-        </a:xfrm>
-      </p:grpSpPr>
-      <p:sp>
-        <p:nvSpPr>
-          <p:cNvPr id="2" name="Content Placeholder 1">
-            <a:extLst>
-              <a:ext uri="{FF2B5EF4-FFF2-40B4-BE49-F238E27FC236}">
-                <a16:creationId xmlns:a16="http://schemas.microsoft.com/office/drawing/2014/main" xmlns="" id="{61284A3C-35C7-47BB-B5EF-3A5AFD39F048}"/>
-              </a:ext>
-            </a:extLst>
-          </p:cNvPr>
-          <p:cNvSpPr>
-            <a:spLocks noGrp="1"/>
-          </p:cNvSpPr>
-          <p:nvPr>
-            <p:ph idx="1"/>
-          </p:nvPr>
-        </p:nvSpPr>
-        <p:spPr/>
-        <p:txBody>
-          <a:bodyPr/>
-          <a:lstStyle/>
-          <a:p>
-            <a:endParaRPr lang="pt-PT" dirty="0"/>
-          </a:p>
-        </p:txBody>
-      </p:sp>
-      <p:sp>
-        <p:nvSpPr>
-          <p:cNvPr id="3" name="Content Placeholder 2">
-            <a:extLst>
-              <a:ext uri="{FF2B5EF4-FFF2-40B4-BE49-F238E27FC236}">
-                <a16:creationId xmlns:a16="http://schemas.microsoft.com/office/drawing/2014/main" xmlns="" id="{75B62007-2099-491F-B9CC-679828859075}"/>
-              </a:ext>
-            </a:extLst>
-          </p:cNvPr>
-          <p:cNvSpPr>
-            <a:spLocks noGrp="1"/>
-          </p:cNvSpPr>
-          <p:nvPr>
-            <p:ph idx="10"/>
-          </p:nvPr>
-        </p:nvSpPr>
-        <p:spPr/>
-        <p:txBody>
-          <a:bodyPr/>
-          <a:lstStyle/>
-          <a:p>
-            <a:endParaRPr lang="pt-PT" dirty="0"/>
-          </a:p>
-        </p:txBody>
-      </p:sp>
-      <p:sp>
-        <p:nvSpPr>
-          <p:cNvPr id="4" name="Content Placeholder 3">
-            <a:extLst>
-              <a:ext uri="{FF2B5EF4-FFF2-40B4-BE49-F238E27FC236}">
-                <a16:creationId xmlns:a16="http://schemas.microsoft.com/office/drawing/2014/main" xmlns="" id="{B573A8A9-0BDE-4B35-955D-A5C9FAFE6755}"/>
-              </a:ext>
-            </a:extLst>
-          </p:cNvPr>
-          <p:cNvSpPr>
-            <a:spLocks noGrp="1"/>
-          </p:cNvSpPr>
-          <p:nvPr>
-            <p:ph idx="11"/>
-          </p:nvPr>
-        </p:nvSpPr>
-        <p:spPr/>
-        <p:txBody>
-          <a:bodyPr/>
-          <a:lstStyle/>
-          <a:p>
-            <a:endParaRPr lang="pt-PT" dirty="0"/>
-          </a:p>
-        </p:txBody>
-      </p:sp>
-      <p:sp>
-        <p:nvSpPr>
-          <p:cNvPr id="5" name="Content Placeholder 4">
-            <a:extLst>
-              <a:ext uri="{FF2B5EF4-FFF2-40B4-BE49-F238E27FC236}">
-                <a16:creationId xmlns:a16="http://schemas.microsoft.com/office/drawing/2014/main" xmlns="" id="{03F0B0E7-9DC5-4E64-84FC-E41A42350BE1}"/>
-              </a:ext>
-            </a:extLst>
-          </p:cNvPr>
-          <p:cNvSpPr>
-            <a:spLocks noGrp="1"/>
-          </p:cNvSpPr>
-          <p:nvPr>
-            <p:ph idx="12"/>
-          </p:nvPr>
-        </p:nvSpPr>
-        <p:spPr/>
-        <p:txBody>
-          <a:bodyPr/>
-          <a:lstStyle/>
-          <a:p>
-            <a:endParaRPr lang="pt-PT" dirty="0"/>
-          </a:p>
-        </p:txBody>
-      </p:sp>
-      <p:sp>
-        <p:nvSpPr>
-          <p:cNvPr id="6" name="Content Placeholder 5">
-            <a:extLst>
-              <a:ext uri="{FF2B5EF4-FFF2-40B4-BE49-F238E27FC236}">
-                <a16:creationId xmlns:a16="http://schemas.microsoft.com/office/drawing/2014/main" xmlns="" id="{AAD76EA7-FFDD-4221-8BFA-2CF2F90A53A9}"/>
-              </a:ext>
-            </a:extLst>
-          </p:cNvPr>
-          <p:cNvSpPr>
-            <a:spLocks noGrp="1"/>
-          </p:cNvSpPr>
-          <p:nvPr>
-            <p:ph idx="13"/>
-          </p:nvPr>
-        </p:nvSpPr>
-        <p:spPr/>
-        <p:txBody>
-          <a:bodyPr/>
-          <a:lstStyle/>
-          <a:p>
-            <a:r>
-              <a:rPr lang="pt-PT" dirty="0" smtClean="0"/>
-              <a:t>Cultura</a:t>
-            </a:r>
-            <a:endParaRPr lang="pt-PT" dirty="0"/>
-          </a:p>
-        </p:txBody>
-      </p:sp>
-    </p:spTree>
-    <p:extLst>
-      <p:ext uri="{BB962C8B-B14F-4D97-AF65-F5344CB8AC3E}">
-        <p14:creationId xmlns:p14="http://schemas.microsoft.com/office/powerpoint/2010/main" val="3944840309"/>
+        <p14:creationId xmlns:p14="http://schemas.microsoft.com/office/powerpoint/2010/main" val="1369871826"/>
       </p:ext>
     </p:extLst>
   </p:cSld>
@@ -16850,13 +16809,7 @@
       </p:grpSpPr>
       <p:sp>
         <p:nvSpPr>
-          <p:cNvPr id="2" name="Content Placeholder 1">
-            <a:extLst>
-              <a:ext uri="{FF2B5EF4-FFF2-40B4-BE49-F238E27FC236}">
-                <a16:creationId xmlns:a16="http://schemas.microsoft.com/office/drawing/2014/main" xmlns="" id="{61284A3C-35C7-47BB-B5EF-3A5AFD39F048}"/>
-              </a:ext>
-            </a:extLst>
-          </p:cNvPr>
+          <p:cNvPr id="2" name="Marcador de Posição de Conteúdo 1"/>
           <p:cNvSpPr>
             <a:spLocks noGrp="1"/>
           </p:cNvSpPr>
@@ -16869,19 +16822,13 @@
           <a:bodyPr/>
           <a:lstStyle/>
           <a:p>
-            <a:endParaRPr lang="pt-PT" dirty="0"/>
+            <a:endParaRPr lang="pt-PT"/>
           </a:p>
         </p:txBody>
       </p:sp>
       <p:sp>
         <p:nvSpPr>
-          <p:cNvPr id="3" name="Content Placeholder 2">
-            <a:extLst>
-              <a:ext uri="{FF2B5EF4-FFF2-40B4-BE49-F238E27FC236}">
-                <a16:creationId xmlns:a16="http://schemas.microsoft.com/office/drawing/2014/main" xmlns="" id="{75B62007-2099-491F-B9CC-679828859075}"/>
-              </a:ext>
-            </a:extLst>
-          </p:cNvPr>
+          <p:cNvPr id="3" name="Marcador de Posição de Conteúdo 2"/>
           <p:cNvSpPr>
             <a:spLocks noGrp="1"/>
           </p:cNvSpPr>
@@ -16894,44 +16841,13 @@
           <a:bodyPr/>
           <a:lstStyle/>
           <a:p>
-            <a:endParaRPr lang="pt-PT" dirty="0"/>
+            <a:endParaRPr lang="pt-PT"/>
           </a:p>
         </p:txBody>
       </p:sp>
       <p:sp>
         <p:nvSpPr>
-          <p:cNvPr id="4" name="Content Placeholder 3">
-            <a:extLst>
-              <a:ext uri="{FF2B5EF4-FFF2-40B4-BE49-F238E27FC236}">
-                <a16:creationId xmlns:a16="http://schemas.microsoft.com/office/drawing/2014/main" xmlns="" id="{B573A8A9-0BDE-4B35-955D-A5C9FAFE6755}"/>
-              </a:ext>
-            </a:extLst>
-          </p:cNvPr>
-          <p:cNvSpPr>
-            <a:spLocks noGrp="1"/>
-          </p:cNvSpPr>
-          <p:nvPr>
-            <p:ph idx="11"/>
-          </p:nvPr>
-        </p:nvSpPr>
-        <p:spPr/>
-        <p:txBody>
-          <a:bodyPr/>
-          <a:lstStyle/>
-          <a:p>
-            <a:endParaRPr lang="pt-PT" dirty="0"/>
-          </a:p>
-        </p:txBody>
-      </p:sp>
-      <p:sp>
-        <p:nvSpPr>
-          <p:cNvPr id="5" name="Content Placeholder 4">
-            <a:extLst>
-              <a:ext uri="{FF2B5EF4-FFF2-40B4-BE49-F238E27FC236}">
-                <a16:creationId xmlns:a16="http://schemas.microsoft.com/office/drawing/2014/main" xmlns="" id="{03F0B0E7-9DC5-4E64-84FC-E41A42350BE1}"/>
-              </a:ext>
-            </a:extLst>
-          </p:cNvPr>
+          <p:cNvPr id="5" name="Marcador de Posição de Conteúdo 4"/>
           <p:cNvSpPr>
             <a:spLocks noGrp="1"/>
           </p:cNvSpPr>
@@ -16944,19 +16860,13 @@
           <a:bodyPr/>
           <a:lstStyle/>
           <a:p>
-            <a:endParaRPr lang="pt-PT" dirty="0"/>
+            <a:endParaRPr lang="pt-PT"/>
           </a:p>
         </p:txBody>
       </p:sp>
       <p:sp>
         <p:nvSpPr>
-          <p:cNvPr id="6" name="Content Placeholder 5">
-            <a:extLst>
-              <a:ext uri="{FF2B5EF4-FFF2-40B4-BE49-F238E27FC236}">
-                <a16:creationId xmlns:a16="http://schemas.microsoft.com/office/drawing/2014/main" xmlns="" id="{AAD76EA7-FFDD-4221-8BFA-2CF2F90A53A9}"/>
-              </a:ext>
-            </a:extLst>
-          </p:cNvPr>
+          <p:cNvPr id="6" name="Marcador de Posição de Conteúdo 5"/>
           <p:cNvSpPr>
             <a:spLocks noGrp="1"/>
           </p:cNvSpPr>
@@ -16971,16 +16881,49 @@
           <a:p>
             <a:r>
               <a:rPr lang="pt-PT" dirty="0" smtClean="0"/>
-              <a:t>Desporto </a:t>
+              <a:t>Sobre</a:t>
             </a:r>
             <a:endParaRPr lang="pt-PT" dirty="0"/>
           </a:p>
         </p:txBody>
       </p:sp>
+      <p:pic>
+        <p:nvPicPr>
+          <p:cNvPr id="7" name="Google Shape;227;p22"/>
+          <p:cNvPicPr preferRelativeResize="0">
+            <a:picLocks noGrp="1"/>
+          </p:cNvPicPr>
+          <p:nvPr>
+            <p:ph idx="11"/>
+          </p:nvPr>
+        </p:nvPicPr>
+        <p:blipFill rotWithShape="1">
+          <a:blip r:embed="rId2">
+            <a:alphaModFix/>
+          </a:blip>
+          <a:srcRect/>
+          <a:stretch/>
+        </p:blipFill>
+        <p:spPr>
+          <a:xfrm>
+            <a:off x="1967430" y="684213"/>
+            <a:ext cx="3367639" cy="3194050"/>
+          </a:xfrm>
+          <a:prstGeom prst="rect">
+            <a:avLst/>
+          </a:prstGeom>
+          <a:solidFill>
+            <a:srgbClr val="FBE4D4"/>
+          </a:solidFill>
+          <a:ln>
+            <a:noFill/>
+          </a:ln>
+        </p:spPr>
+      </p:pic>
     </p:spTree>
     <p:extLst>
       <p:ext uri="{BB962C8B-B14F-4D97-AF65-F5344CB8AC3E}">
-        <p14:creationId xmlns:p14="http://schemas.microsoft.com/office/powerpoint/2010/main" val="3201941665"/>
+        <p14:creationId xmlns:p14="http://schemas.microsoft.com/office/powerpoint/2010/main" val="971092631"/>
       </p:ext>
     </p:extLst>
   </p:cSld>
@@ -17047,25 +16990,6 @@
       </p:sp>
       <p:sp>
         <p:nvSpPr>
-          <p:cNvPr id="4" name="Marcador de Posição de Conteúdo 3"/>
-          <p:cNvSpPr>
-            <a:spLocks noGrp="1"/>
-          </p:cNvSpPr>
-          <p:nvPr>
-            <p:ph idx="11"/>
-          </p:nvPr>
-        </p:nvSpPr>
-        <p:spPr/>
-        <p:txBody>
-          <a:bodyPr/>
-          <a:lstStyle/>
-          <a:p>
-            <a:endParaRPr lang="pt-PT"/>
-          </a:p>
-        </p:txBody>
-      </p:sp>
-      <p:sp>
-        <p:nvSpPr>
           <p:cNvPr id="5" name="Marcador de Posição de Conteúdo 4"/>
           <p:cNvSpPr>
             <a:spLocks noGrp="1"/>
@@ -17100,16 +17024,49 @@
           <a:p>
             <a:r>
               <a:rPr lang="pt-PT" dirty="0" smtClean="0"/>
-              <a:t>Em destaque</a:t>
+              <a:t>Contactos</a:t>
             </a:r>
             <a:endParaRPr lang="pt-PT" dirty="0"/>
           </a:p>
         </p:txBody>
       </p:sp>
+      <p:pic>
+        <p:nvPicPr>
+          <p:cNvPr id="7" name="Google Shape;236;p23"/>
+          <p:cNvPicPr preferRelativeResize="0">
+            <a:picLocks noGrp="1"/>
+          </p:cNvPicPr>
+          <p:nvPr>
+            <p:ph idx="11"/>
+          </p:nvPr>
+        </p:nvPicPr>
+        <p:blipFill rotWithShape="1">
+          <a:blip r:embed="rId2">
+            <a:alphaModFix/>
+          </a:blip>
+          <a:srcRect/>
+          <a:stretch/>
+        </p:blipFill>
+        <p:spPr>
+          <a:xfrm>
+            <a:off x="1967430" y="684213"/>
+            <a:ext cx="3367639" cy="3194050"/>
+          </a:xfrm>
+          <a:prstGeom prst="rect">
+            <a:avLst/>
+          </a:prstGeom>
+          <a:solidFill>
+            <a:srgbClr val="FBE4D4"/>
+          </a:solidFill>
+          <a:ln>
+            <a:noFill/>
+          </a:ln>
+        </p:spPr>
+      </p:pic>
     </p:spTree>
     <p:extLst>
       <p:ext uri="{BB962C8B-B14F-4D97-AF65-F5344CB8AC3E}">
-        <p14:creationId xmlns:p14="http://schemas.microsoft.com/office/powerpoint/2010/main" val="1369871826"/>
+        <p14:creationId xmlns:p14="http://schemas.microsoft.com/office/powerpoint/2010/main" val="384230816"/>
       </p:ext>
     </p:extLst>
   </p:cSld>
@@ -17167,7 +17124,7 @@
           <p:cNvPr id="6" name="Content Placeholder 5">
             <a:extLst>
               <a:ext uri="{FF2B5EF4-FFF2-40B4-BE49-F238E27FC236}">
-                <a16:creationId xmlns:a16="http://schemas.microsoft.com/office/drawing/2014/main" xmlns="" id="{D2F8EBE6-665F-4846-A148-9D6DDE6E6817}"/>
+                <a16:creationId xmlns="" xmlns:a16="http://schemas.microsoft.com/office/drawing/2014/main" id="{D2F8EBE6-665F-4846-A148-9D6DDE6E6817}"/>
               </a:ext>
             </a:extLst>
           </p:cNvPr>
@@ -17380,7 +17337,7 @@
           <p:cNvPr id="7" name="Content Placeholder 6">
             <a:extLst>
               <a:ext uri="{FF2B5EF4-FFF2-40B4-BE49-F238E27FC236}">
-                <a16:creationId xmlns:a16="http://schemas.microsoft.com/office/drawing/2014/main" xmlns="" id="{6A3312CD-3A32-4B92-800D-BCF4662960EA}"/>
+                <a16:creationId xmlns="" xmlns:a16="http://schemas.microsoft.com/office/drawing/2014/main" id="{6A3312CD-3A32-4B92-800D-BCF4662960EA}"/>
               </a:ext>
             </a:extLst>
           </p:cNvPr>
@@ -17418,7 +17375,7 @@
           <p:cNvPr id="4" name="Picture 3">
             <a:extLst>
               <a:ext uri="{FF2B5EF4-FFF2-40B4-BE49-F238E27FC236}">
-                <a16:creationId xmlns:a16="http://schemas.microsoft.com/office/drawing/2014/main" xmlns="" id="{6B77C82E-A7D5-43FA-B0E1-FABD1A26BE05}"/>
+                <a16:creationId xmlns="" xmlns:a16="http://schemas.microsoft.com/office/drawing/2014/main" id="{6B77C82E-A7D5-43FA-B0E1-FABD1A26BE05}"/>
               </a:ext>
             </a:extLst>
           </p:cNvPr>
@@ -17477,7 +17434,7 @@
           <p:cNvPr id="2" name="Title 1">
             <a:extLst>
               <a:ext uri="{FF2B5EF4-FFF2-40B4-BE49-F238E27FC236}">
-                <a16:creationId xmlns:a16="http://schemas.microsoft.com/office/drawing/2014/main" xmlns="" id="{146D3ED9-1C44-49AB-9A69-32D9A044581F}"/>
+                <a16:creationId xmlns="" xmlns:a16="http://schemas.microsoft.com/office/drawing/2014/main" id="{146D3ED9-1C44-49AB-9A69-32D9A044581F}"/>
               </a:ext>
             </a:extLst>
           </p:cNvPr>
@@ -17505,7 +17462,7 @@
           <p:cNvPr id="3" name="Content Placeholder 2">
             <a:extLst>
               <a:ext uri="{FF2B5EF4-FFF2-40B4-BE49-F238E27FC236}">
-                <a16:creationId xmlns:a16="http://schemas.microsoft.com/office/drawing/2014/main" xmlns="" id="{976A4E5C-F24A-4C41-A632-95938F25BA18}"/>
+                <a16:creationId xmlns="" xmlns:a16="http://schemas.microsoft.com/office/drawing/2014/main" id="{976A4E5C-F24A-4C41-A632-95938F25BA18}"/>
               </a:ext>
             </a:extLst>
           </p:cNvPr>
@@ -17575,7 +17532,7 @@
           <p:cNvPr id="4" name="Slide Number Placeholder 3">
             <a:extLst>
               <a:ext uri="{FF2B5EF4-FFF2-40B4-BE49-F238E27FC236}">
-                <a16:creationId xmlns:a16="http://schemas.microsoft.com/office/drawing/2014/main" xmlns="" id="{B255EC2C-DA39-47EF-81AE-82C02C61A452}"/>
+                <a16:creationId xmlns="" xmlns:a16="http://schemas.microsoft.com/office/drawing/2014/main" id="{B255EC2C-DA39-47EF-81AE-82C02C61A452}"/>
               </a:ext>
             </a:extLst>
           </p:cNvPr>
@@ -17634,7 +17591,7 @@
           <p:cNvPr id="7" name="Diagram 4">
             <a:extLst>
               <a:ext uri="{FF2B5EF4-FFF2-40B4-BE49-F238E27FC236}">
-                <a16:creationId xmlns:a16="http://schemas.microsoft.com/office/drawing/2014/main" xmlns="" id="{26FDAC6F-257B-4A6D-9996-585B03A417C8}"/>
+                <a16:creationId xmlns="" xmlns:a16="http://schemas.microsoft.com/office/drawing/2014/main" id="{26FDAC6F-257B-4A6D-9996-585B03A417C8}"/>
               </a:ext>
             </a:extLst>
           </p:cNvPr>
@@ -17642,7 +17599,7 @@
           <p:nvPr>
             <p:extLst>
               <p:ext uri="{D42A27DB-BD31-4B8C-83A1-F6EECF244321}">
-                <p14:modId xmlns:p14="http://schemas.microsoft.com/office/powerpoint/2010/main" val="272399959"/>
+                <p14:modId xmlns:p14="http://schemas.microsoft.com/office/powerpoint/2010/main" val="242989442"/>
               </p:ext>
             </p:extLst>
           </p:nvPr>
@@ -17692,7 +17649,7 @@
           <p:cNvPr id="2" name="Content Placeholder 1">
             <a:extLst>
               <a:ext uri="{FF2B5EF4-FFF2-40B4-BE49-F238E27FC236}">
-                <a16:creationId xmlns:a16="http://schemas.microsoft.com/office/drawing/2014/main" xmlns="" id="{61284A3C-35C7-47BB-B5EF-3A5AFD39F048}"/>
+                <a16:creationId xmlns="" xmlns:a16="http://schemas.microsoft.com/office/drawing/2014/main" id="{61284A3C-35C7-47BB-B5EF-3A5AFD39F048}"/>
               </a:ext>
             </a:extLst>
           </p:cNvPr>
@@ -17712,64 +17669,25 @@
               <a:rPr lang="pt-PT" dirty="0">
                 <a:hlinkClick r:id="rId2"/>
               </a:rPr>
-              <a:t>https://</a:t>
-            </a:r>
-            <a:r>
-              <a:rPr lang="pt-PT" dirty="0" smtClean="0">
-                <a:hlinkClick r:id="rId2"/>
-              </a:rPr>
-              <a:t>pt.wikipedia.org/wiki/Castelo_Branco</a:t>
-            </a:r>
-            <a:endParaRPr lang="pt-PT" dirty="0" smtClean="0"/>
+              <a:t>http://www.lisbonne-idee.pt/p4820-wool-fest-covilha-descentralizacao-artistica.html</a:t>
+            </a:r>
+            <a:endParaRPr lang="pt-PT" dirty="0"/>
           </a:p>
           <a:p>
             <a:r>
               <a:rPr lang="pt-PT" dirty="0">
                 <a:hlinkClick r:id="rId3"/>
               </a:rPr>
-              <a:t>https://turismodocentro.pt/artigo-regiao/serra-da-estrela</a:t>
-            </a:r>
-            <a:r>
-              <a:rPr lang="pt-PT" dirty="0" smtClean="0">
-                <a:hlinkClick r:id="rId3"/>
-              </a:rPr>
-              <a:t>/</a:t>
-            </a:r>
-            <a:endParaRPr lang="pt-PT" dirty="0" smtClean="0"/>
-          </a:p>
-          <a:p>
-            <a:r>
-              <a:rPr lang="pt-PT" dirty="0">
+              <a:t>https://www.tripadvisor.pt/Attractions-g189145-Activities-c47-Covilha_Castelo_Branco_District_Central_Portugal.html</a:t>
+            </a:r>
+            <a:endParaRPr lang="pt-PT" dirty="0"/>
+          </a:p>
+          <a:p>
+            <a:r>
+              <a:rPr lang="pt-PT">
                 <a:hlinkClick r:id="rId4"/>
               </a:rPr>
-              <a:t>http://www.anil.pt/?</a:t>
-            </a:r>
-            <a:r>
-              <a:rPr lang="pt-PT" dirty="0" smtClean="0">
-                <a:hlinkClick r:id="rId4"/>
-              </a:rPr>
-              <a:t>cix=883</a:t>
-            </a:r>
-            <a:endParaRPr lang="pt-PT" dirty="0" smtClean="0"/>
-          </a:p>
-          <a:p>
-            <a:r>
-              <a:rPr lang="pt-PT" dirty="0" smtClean="0">
-                <a:hlinkClick r:id="rId5"/>
-              </a:rPr>
-              <a:t>https</a:t>
-            </a:r>
-            <a:r>
-              <a:rPr lang="pt-PT" dirty="0">
-                <a:hlinkClick r:id="rId5"/>
-              </a:rPr>
-              <a:t>://www.ubi.pt</a:t>
-            </a:r>
-            <a:r>
-              <a:rPr lang="pt-PT" dirty="0" smtClean="0">
-                <a:hlinkClick r:id="rId5"/>
-              </a:rPr>
-              <a:t>/</a:t>
+              <a:t>https://turismodocentro.pt</a:t>
             </a:r>
             <a:endParaRPr lang="pt-PT" dirty="0" smtClean="0"/>
           </a:p>
@@ -17780,7 +17698,7 @@
           <p:cNvPr id="3" name="Content Placeholder 2">
             <a:extLst>
               <a:ext uri="{FF2B5EF4-FFF2-40B4-BE49-F238E27FC236}">
-                <a16:creationId xmlns:a16="http://schemas.microsoft.com/office/drawing/2014/main" xmlns="" id="{75B62007-2099-491F-B9CC-679828859075}"/>
+                <a16:creationId xmlns="" xmlns:a16="http://schemas.microsoft.com/office/drawing/2014/main" id="{75B62007-2099-491F-B9CC-679828859075}"/>
               </a:ext>
             </a:extLst>
           </p:cNvPr>
@@ -17802,35 +17720,10 @@
       </p:sp>
       <p:sp>
         <p:nvSpPr>
-          <p:cNvPr id="4" name="Content Placeholder 3">
-            <a:extLst>
-              <a:ext uri="{FF2B5EF4-FFF2-40B4-BE49-F238E27FC236}">
-                <a16:creationId xmlns:a16="http://schemas.microsoft.com/office/drawing/2014/main" xmlns="" id="{B573A8A9-0BDE-4B35-955D-A5C9FAFE6755}"/>
-              </a:ext>
-            </a:extLst>
-          </p:cNvPr>
-          <p:cNvSpPr>
-            <a:spLocks noGrp="1"/>
-          </p:cNvSpPr>
-          <p:nvPr>
-            <p:ph idx="11"/>
-          </p:nvPr>
-        </p:nvSpPr>
-        <p:spPr/>
-        <p:txBody>
-          <a:bodyPr/>
-          <a:lstStyle/>
-          <a:p>
-            <a:endParaRPr lang="pt-PT" dirty="0"/>
-          </a:p>
-        </p:txBody>
-      </p:sp>
-      <p:sp>
-        <p:nvSpPr>
           <p:cNvPr id="5" name="Content Placeholder 4">
             <a:extLst>
               <a:ext uri="{FF2B5EF4-FFF2-40B4-BE49-F238E27FC236}">
-                <a16:creationId xmlns:a16="http://schemas.microsoft.com/office/drawing/2014/main" xmlns="" id="{03F0B0E7-9DC5-4E64-84FC-E41A42350BE1}"/>
+                <a16:creationId xmlns="" xmlns:a16="http://schemas.microsoft.com/office/drawing/2014/main" id="{03F0B0E7-9DC5-4E64-84FC-E41A42350BE1}"/>
               </a:ext>
             </a:extLst>
           </p:cNvPr>
@@ -17844,30 +17737,50 @@
         <p:spPr/>
         <p:txBody>
           <a:bodyPr>
-            <a:normAutofit lnSpcReduction="10000"/>
+            <a:normAutofit fontScale="92500" lnSpcReduction="10000"/>
           </a:bodyPr>
           <a:lstStyle/>
           <a:p>
             <a:r>
-              <a:rPr lang="pt-PT" sz="1400" dirty="0"/>
-              <a:t>A Covilhã, exemplo bastante original de uma “cidade de montanha” pertence ao distrito de Castelo Branco e é conhecida como a porta de entrada na Serra da </a:t>
-            </a:r>
-            <a:r>
-              <a:rPr lang="pt-PT" sz="1400" dirty="0" smtClean="0"/>
-              <a:t>Estrela. </a:t>
-            </a:r>
-            <a:r>
-              <a:rPr lang="pt-PT" sz="1400" dirty="0"/>
-              <a:t>Chegar à </a:t>
-            </a:r>
-            <a:r>
-              <a:rPr lang="pt-PT" sz="1400" dirty="0" smtClean="0"/>
-              <a:t>Covilhã </a:t>
-            </a:r>
-            <a:r>
-              <a:rPr lang="pt-PT" sz="1400" dirty="0"/>
-              <a:t>traduz-se em conhecer a indústria de lanifícios e praticar atividades ao ar livre em plena Serra da Estrela. A demografia da cidade afirmou-se desde tempos antigos e a Covilhã teve logo na sua indústria de lanifícios uma das suas principais referências. A gastronomia da região destaca-se pelo célebre queijo da Serra. No centro histórico da cidade podemos comtemplar pinturas e esculturas de arte urbana realizadas por alguns nomes consagrados. A diversidade de atividades de lazer e a universidade cativam os jovens a conhecer melhor o que esta cidade tem para oferecer.</a:t>
-            </a:r>
+              <a:rPr lang="pt-PT" dirty="0" smtClean="0"/>
+              <a:t>Porquê Covilhã? - Na </a:t>
+            </a:r>
+            <a:r>
+              <a:rPr lang="pt-PT" dirty="0"/>
+              <a:t>Covilhã e nas proximidades tem oportunidade de conhecer os Castelos, a arte urbana, a Universidade, as Aldeias Históricas, a Rota da Lã e das Antigas Judiarias e fazendo um dos percursos que lhe dão a conhecer o património cultural desta região. Para além disso a o Parque Natural da Serra da Estrela providencia o turismo de montanha, mas na verdade há muito para fazer na Covilhã para além da neve. </a:t>
+            </a:r>
+            <a:endParaRPr lang="pt-PT" dirty="0" smtClean="0"/>
+          </a:p>
+          <a:p>
+            <a:r>
+              <a:rPr lang="pt-PT" dirty="0" smtClean="0"/>
+              <a:t>Como chegar? - A </a:t>
+            </a:r>
+            <a:r>
+              <a:rPr lang="pt-PT" dirty="0"/>
+              <a:t>cidade da Covilhã é uma cidade da região Centro do País, de fácil acesso graças à vasta rede de autoestradas.</a:t>
+            </a:r>
+          </a:p>
+          <a:p>
+            <a:r>
+              <a:rPr lang="pt-PT" dirty="0"/>
+              <a:t>Vindo do Norte deve seguir a A1 em direção a Lisboa, saindo na A25 em direção à Guarda, e por fim na A23 até à Covilhã.</a:t>
+            </a:r>
+          </a:p>
+          <a:p>
+            <a:r>
+              <a:rPr lang="pt-PT" dirty="0"/>
+              <a:t>Rumando do Sul deve seguir a A1 em direção ao Norte e depois sair na A23 até à Covilhã.</a:t>
+            </a:r>
+          </a:p>
+          <a:p>
+            <a:r>
+              <a:rPr lang="pt-PT" dirty="0"/>
+              <a:t>Se se encontra no Centro, o IP3 poderá levá-lo à cidade de Viseu, para de seguida sair para a A25 em direção à Guarda e por fim para a A23 até à Covilhã.</a:t>
+            </a:r>
+          </a:p>
+          <a:p>
+            <a:endParaRPr lang="pt-PT" dirty="0"/>
           </a:p>
           <a:p>
             <a:endParaRPr lang="pt-PT" dirty="0"/>
@@ -17879,7 +17792,7 @@
           <p:cNvPr id="6" name="Content Placeholder 5">
             <a:extLst>
               <a:ext uri="{FF2B5EF4-FFF2-40B4-BE49-F238E27FC236}">
-                <a16:creationId xmlns:a16="http://schemas.microsoft.com/office/drawing/2014/main" xmlns="" id="{AAD76EA7-FFDD-4221-8BFA-2CF2F90A53A9}"/>
+                <a16:creationId xmlns="" xmlns:a16="http://schemas.microsoft.com/office/drawing/2014/main" id="{AAD76EA7-FFDD-4221-8BFA-2CF2F90A53A9}"/>
               </a:ext>
             </a:extLst>
           </p:cNvPr>
@@ -17902,6 +17815,39 @@
           </a:p>
         </p:txBody>
       </p:sp>
+      <p:pic>
+        <p:nvPicPr>
+          <p:cNvPr id="7" name="Google Shape;200;p19"/>
+          <p:cNvPicPr preferRelativeResize="0">
+            <a:picLocks noGrp="1"/>
+          </p:cNvPicPr>
+          <p:nvPr>
+            <p:ph idx="11"/>
+          </p:nvPr>
+        </p:nvPicPr>
+        <p:blipFill rotWithShape="1">
+          <a:blip r:embed="rId5">
+            <a:alphaModFix/>
+          </a:blip>
+          <a:srcRect/>
+          <a:stretch/>
+        </p:blipFill>
+        <p:spPr>
+          <a:xfrm>
+            <a:off x="2703833" y="684213"/>
+            <a:ext cx="1894834" cy="3194050"/>
+          </a:xfrm>
+          <a:prstGeom prst="rect">
+            <a:avLst/>
+          </a:prstGeom>
+          <a:solidFill>
+            <a:srgbClr val="FBE4D4"/>
+          </a:solidFill>
+          <a:ln>
+            <a:noFill/>
+          </a:ln>
+        </p:spPr>
+      </p:pic>
     </p:spTree>
     <p:extLst>
       <p:ext uri="{BB962C8B-B14F-4D97-AF65-F5344CB8AC3E}">
@@ -17937,7 +17883,7 @@
           <p:cNvPr id="2" name="Content Placeholder 1">
             <a:extLst>
               <a:ext uri="{FF2B5EF4-FFF2-40B4-BE49-F238E27FC236}">
-                <a16:creationId xmlns:a16="http://schemas.microsoft.com/office/drawing/2014/main" xmlns="" id="{61284A3C-35C7-47BB-B5EF-3A5AFD39F048}"/>
+                <a16:creationId xmlns="" xmlns:a16="http://schemas.microsoft.com/office/drawing/2014/main" id="{61284A3C-35C7-47BB-B5EF-3A5AFD39F048}"/>
               </a:ext>
             </a:extLst>
           </p:cNvPr>
@@ -17953,30 +17899,6 @@
           <a:bodyPr/>
           <a:lstStyle/>
           <a:p>
-            <a:r>
-              <a:rPr lang="pt-PT" dirty="0">
-                <a:hlinkClick r:id="rId2"/>
-              </a:rPr>
-              <a:t>http://www.lisbonne-idee.pt/p4820-wool-fest-covilha-descentralizacao-artistica.html</a:t>
-            </a:r>
-            <a:endParaRPr lang="pt-PT" dirty="0"/>
-          </a:p>
-          <a:p>
-            <a:r>
-              <a:rPr lang="pt-PT" dirty="0">
-                <a:hlinkClick r:id="rId3"/>
-              </a:rPr>
-              <a:t>https://</a:t>
-            </a:r>
-            <a:r>
-              <a:rPr lang="pt-PT" dirty="0" smtClean="0">
-                <a:hlinkClick r:id="rId3"/>
-              </a:rPr>
-              <a:t>www.tripadvisor.pt/Attractions-g189145-Activities-c47-Covilha_Castelo_Branco_District_Central_Portugal.html</a:t>
-            </a:r>
-            <a:endParaRPr lang="pt-PT" dirty="0" smtClean="0"/>
-          </a:p>
-          <a:p>
             <a:endParaRPr lang="pt-PT" dirty="0"/>
           </a:p>
         </p:txBody>
@@ -17986,7 +17908,7 @@
           <p:cNvPr id="3" name="Content Placeholder 2">
             <a:extLst>
               <a:ext uri="{FF2B5EF4-FFF2-40B4-BE49-F238E27FC236}">
-                <a16:creationId xmlns:a16="http://schemas.microsoft.com/office/drawing/2014/main" xmlns="" id="{75B62007-2099-491F-B9CC-679828859075}"/>
+                <a16:creationId xmlns="" xmlns:a16="http://schemas.microsoft.com/office/drawing/2014/main" id="{75B62007-2099-491F-B9CC-679828859075}"/>
               </a:ext>
             </a:extLst>
           </p:cNvPr>
@@ -18008,35 +17930,10 @@
       </p:sp>
       <p:sp>
         <p:nvSpPr>
-          <p:cNvPr id="4" name="Content Placeholder 3">
-            <a:extLst>
-              <a:ext uri="{FF2B5EF4-FFF2-40B4-BE49-F238E27FC236}">
-                <a16:creationId xmlns:a16="http://schemas.microsoft.com/office/drawing/2014/main" xmlns="" id="{B573A8A9-0BDE-4B35-955D-A5C9FAFE6755}"/>
-              </a:ext>
-            </a:extLst>
-          </p:cNvPr>
-          <p:cNvSpPr>
-            <a:spLocks noGrp="1"/>
-          </p:cNvSpPr>
-          <p:nvPr>
-            <p:ph idx="11"/>
-          </p:nvPr>
-        </p:nvSpPr>
-        <p:spPr/>
-        <p:txBody>
-          <a:bodyPr/>
-          <a:lstStyle/>
-          <a:p>
-            <a:endParaRPr lang="pt-PT" dirty="0"/>
-          </a:p>
-        </p:txBody>
-      </p:sp>
-      <p:sp>
-        <p:nvSpPr>
           <p:cNvPr id="5" name="Content Placeholder 4">
             <a:extLst>
               <a:ext uri="{FF2B5EF4-FFF2-40B4-BE49-F238E27FC236}">
-                <a16:creationId xmlns:a16="http://schemas.microsoft.com/office/drawing/2014/main" xmlns="" id="{03F0B0E7-9DC5-4E64-84FC-E41A42350BE1}"/>
+                <a16:creationId xmlns="" xmlns:a16="http://schemas.microsoft.com/office/drawing/2014/main" id="{03F0B0E7-9DC5-4E64-84FC-E41A42350BE1}"/>
               </a:ext>
             </a:extLst>
           </p:cNvPr>
@@ -18049,15 +17946,10 @@
         </p:nvSpPr>
         <p:spPr/>
         <p:txBody>
-          <a:bodyPr>
-            <a:normAutofit/>
-          </a:bodyPr>
+          <a:bodyPr/>
           <a:lstStyle/>
           <a:p>
-            <a:r>
-              <a:rPr lang="pt-PT" sz="1400" dirty="0"/>
-              <a:t>Na Covilhã e nas proximidades tem oportunidade de conhecer os Castelos, a arte urbana, a Universidade, as Aldeias Históricas, a Rota da Lã e das Antigas Judiarias e fazendo um dos percursos que lhe dão a conhecer o património cultural desta região. Para além disso a o Parque Natural da Serra da Estrela providencia o turismo de montanha, mas na verdade há muito para fazer na Covilhã para além da neve. </a:t>
-            </a:r>
+            <a:endParaRPr lang="pt-PT" dirty="0"/>
           </a:p>
         </p:txBody>
       </p:sp>
@@ -18066,7 +17958,7 @@
           <p:cNvPr id="6" name="Content Placeholder 5">
             <a:extLst>
               <a:ext uri="{FF2B5EF4-FFF2-40B4-BE49-F238E27FC236}">
-                <a16:creationId xmlns:a16="http://schemas.microsoft.com/office/drawing/2014/main" xmlns="" id="{AAD76EA7-FFDD-4221-8BFA-2CF2F90A53A9}"/>
+                <a16:creationId xmlns="" xmlns:a16="http://schemas.microsoft.com/office/drawing/2014/main" id="{AAD76EA7-FFDD-4221-8BFA-2CF2F90A53A9}"/>
               </a:ext>
             </a:extLst>
           </p:cNvPr>
@@ -18083,21 +17975,50 @@
           <a:lstStyle/>
           <a:p>
             <a:r>
-              <a:rPr lang="pt-PT" dirty="0"/>
-              <a:t>Porquê </a:t>
-            </a:r>
-            <a:r>
               <a:rPr lang="pt-PT" dirty="0" smtClean="0"/>
-              <a:t>Covilhã?</a:t>
+              <a:t>Calendário</a:t>
             </a:r>
             <a:endParaRPr lang="pt-PT" dirty="0"/>
           </a:p>
         </p:txBody>
       </p:sp>
+      <p:pic>
+        <p:nvPicPr>
+          <p:cNvPr id="7" name="Google Shape;209;p20"/>
+          <p:cNvPicPr preferRelativeResize="0">
+            <a:picLocks noGrp="1"/>
+          </p:cNvPicPr>
+          <p:nvPr>
+            <p:ph idx="11"/>
+          </p:nvPr>
+        </p:nvPicPr>
+        <p:blipFill rotWithShape="1">
+          <a:blip r:embed="rId2">
+            <a:alphaModFix/>
+          </a:blip>
+          <a:srcRect/>
+          <a:stretch/>
+        </p:blipFill>
+        <p:spPr>
+          <a:xfrm>
+            <a:off x="1969910" y="684213"/>
+            <a:ext cx="3362679" cy="3194050"/>
+          </a:xfrm>
+          <a:prstGeom prst="rect">
+            <a:avLst/>
+          </a:prstGeom>
+          <a:solidFill>
+            <a:srgbClr val="FBE4D4"/>
+          </a:solidFill>
+          <a:ln>
+            <a:noFill/>
+          </a:ln>
+        </p:spPr>
+      </p:pic>
     </p:spTree>
     <p:extLst>
       <p:ext uri="{BB962C8B-B14F-4D97-AF65-F5344CB8AC3E}">
-        <p14:creationId xmlns:p14="http://schemas.microsoft.com/office/powerpoint/2010/main" val="2316728216"/>
+        <p14:creationId xmlns:p14="http://schemas.microsoft.com/office/powerpoint/2010/main" val="1324516063"/>
       </p:ext>
     </p:extLst>
   </p:cSld>
@@ -18129,7 +18050,7 @@
           <p:cNvPr id="2" name="Content Placeholder 1">
             <a:extLst>
               <a:ext uri="{FF2B5EF4-FFF2-40B4-BE49-F238E27FC236}">
-                <a16:creationId xmlns:a16="http://schemas.microsoft.com/office/drawing/2014/main" xmlns="" id="{61284A3C-35C7-47BB-B5EF-3A5AFD39F048}"/>
+                <a16:creationId xmlns="" xmlns:a16="http://schemas.microsoft.com/office/drawing/2014/main" id="{61284A3C-35C7-47BB-B5EF-3A5AFD39F048}"/>
               </a:ext>
             </a:extLst>
           </p:cNvPr>
@@ -18145,24 +18066,6 @@
           <a:bodyPr/>
           <a:lstStyle/>
           <a:p>
-            <a:r>
-              <a:rPr lang="pt-PT" dirty="0">
-                <a:hlinkClick r:id="rId2"/>
-              </a:rPr>
-              <a:t>https://turismodocentro.pt</a:t>
-            </a:r>
-            <a:r>
-              <a:rPr lang="pt-PT" dirty="0" smtClean="0">
-                <a:hlinkClick r:id="rId2"/>
-              </a:rPr>
-              <a:t>/</a:t>
-            </a:r>
-            <a:endParaRPr lang="pt-PT" dirty="0" smtClean="0"/>
-          </a:p>
-          <a:p>
-            <a:pPr marL="0" indent="0">
-              <a:buNone/>
-            </a:pPr>
             <a:endParaRPr lang="pt-PT" dirty="0"/>
           </a:p>
         </p:txBody>
@@ -18172,7 +18075,7 @@
           <p:cNvPr id="3" name="Content Placeholder 2">
             <a:extLst>
               <a:ext uri="{FF2B5EF4-FFF2-40B4-BE49-F238E27FC236}">
-                <a16:creationId xmlns:a16="http://schemas.microsoft.com/office/drawing/2014/main" xmlns="" id="{75B62007-2099-491F-B9CC-679828859075}"/>
+                <a16:creationId xmlns="" xmlns:a16="http://schemas.microsoft.com/office/drawing/2014/main" id="{75B62007-2099-491F-B9CC-679828859075}"/>
               </a:ext>
             </a:extLst>
           </p:cNvPr>
@@ -18194,35 +18097,10 @@
       </p:sp>
       <p:sp>
         <p:nvSpPr>
-          <p:cNvPr id="4" name="Content Placeholder 3">
-            <a:extLst>
-              <a:ext uri="{FF2B5EF4-FFF2-40B4-BE49-F238E27FC236}">
-                <a16:creationId xmlns:a16="http://schemas.microsoft.com/office/drawing/2014/main" xmlns="" id="{B573A8A9-0BDE-4B35-955D-A5C9FAFE6755}"/>
-              </a:ext>
-            </a:extLst>
-          </p:cNvPr>
-          <p:cNvSpPr>
-            <a:spLocks noGrp="1"/>
-          </p:cNvSpPr>
-          <p:nvPr>
-            <p:ph idx="11"/>
-          </p:nvPr>
-        </p:nvSpPr>
-        <p:spPr/>
-        <p:txBody>
-          <a:bodyPr/>
-          <a:lstStyle/>
-          <a:p>
-            <a:endParaRPr lang="pt-PT" dirty="0"/>
-          </a:p>
-        </p:txBody>
-      </p:sp>
-      <p:sp>
-        <p:nvSpPr>
           <p:cNvPr id="5" name="Content Placeholder 4">
             <a:extLst>
               <a:ext uri="{FF2B5EF4-FFF2-40B4-BE49-F238E27FC236}">
-                <a16:creationId xmlns:a16="http://schemas.microsoft.com/office/drawing/2014/main" xmlns="" id="{03F0B0E7-9DC5-4E64-84FC-E41A42350BE1}"/>
+                <a16:creationId xmlns="" xmlns:a16="http://schemas.microsoft.com/office/drawing/2014/main" id="{03F0B0E7-9DC5-4E64-84FC-E41A42350BE1}"/>
               </a:ext>
             </a:extLst>
           </p:cNvPr>
@@ -18238,34 +18116,7 @@
           <a:bodyPr/>
           <a:lstStyle/>
           <a:p>
-            <a:r>
-              <a:rPr lang="pt-PT" sz="1400" dirty="0"/>
-              <a:t>A cidade da Covilhã é uma cidade da região Centro do País, de fácil acesso graças à vasta rede de autoestradas.</a:t>
-            </a:r>
-          </a:p>
-          <a:p>
-            <a:r>
-              <a:rPr lang="pt-PT" sz="1400" dirty="0"/>
-              <a:t>Vindo do Norte deve seguir a A1 em direção a Lisboa, saindo na A25 em direção à Guarda, e por fim na A23 até à Covilhã.</a:t>
-            </a:r>
-          </a:p>
-          <a:p>
-            <a:r>
-              <a:rPr lang="pt-PT" sz="1400" dirty="0"/>
-              <a:t>Rumando do Sul deve seguir a A1 em direção ao Norte e depois sair na A23 até à Covilhã.</a:t>
-            </a:r>
-          </a:p>
-          <a:p>
-            <a:r>
-              <a:rPr lang="pt-PT" sz="1400" dirty="0"/>
-              <a:t>Se se encontra no Centro, o IP3 poderá levá-lo à cidade de Viseu, para de seguida sair para a A25 em direção à Guarda e por fim para a A23 até à Covilhã.</a:t>
-            </a:r>
-          </a:p>
-          <a:p>
-            <a:pPr marL="0" indent="0">
-              <a:buNone/>
-            </a:pPr>
-            <a:endParaRPr lang="pt-PT" sz="1400" dirty="0"/>
+            <a:endParaRPr lang="pt-PT" dirty="0"/>
           </a:p>
         </p:txBody>
       </p:sp>
@@ -18274,7 +18125,7 @@
           <p:cNvPr id="6" name="Content Placeholder 5">
             <a:extLst>
               <a:ext uri="{FF2B5EF4-FFF2-40B4-BE49-F238E27FC236}">
-                <a16:creationId xmlns:a16="http://schemas.microsoft.com/office/drawing/2014/main" xmlns="" id="{AAD76EA7-FFDD-4221-8BFA-2CF2F90A53A9}"/>
+                <a16:creationId xmlns="" xmlns:a16="http://schemas.microsoft.com/office/drawing/2014/main" id="{AAD76EA7-FFDD-4221-8BFA-2CF2F90A53A9}"/>
               </a:ext>
             </a:extLst>
           </p:cNvPr>
@@ -18292,16 +18143,49 @@
           <a:p>
             <a:r>
               <a:rPr lang="pt-PT" dirty="0" smtClean="0"/>
-              <a:t>Chegar à Covilhã</a:t>
+              <a:t>Categorias</a:t>
             </a:r>
             <a:endParaRPr lang="pt-PT" dirty="0"/>
           </a:p>
         </p:txBody>
       </p:sp>
+      <p:pic>
+        <p:nvPicPr>
+          <p:cNvPr id="7" name="Google Shape;218;p21"/>
+          <p:cNvPicPr preferRelativeResize="0">
+            <a:picLocks noGrp="1"/>
+          </p:cNvPicPr>
+          <p:nvPr>
+            <p:ph idx="11"/>
+          </p:nvPr>
+        </p:nvPicPr>
+        <p:blipFill rotWithShape="1">
+          <a:blip r:embed="rId2">
+            <a:alphaModFix/>
+          </a:blip>
+          <a:srcRect/>
+          <a:stretch/>
+        </p:blipFill>
+        <p:spPr>
+          <a:xfrm>
+            <a:off x="1967430" y="684213"/>
+            <a:ext cx="3367639" cy="3194050"/>
+          </a:xfrm>
+          <a:prstGeom prst="rect">
+            <a:avLst/>
+          </a:prstGeom>
+          <a:solidFill>
+            <a:srgbClr val="FBE4D4"/>
+          </a:solidFill>
+          <a:ln>
+            <a:noFill/>
+          </a:ln>
+        </p:spPr>
+      </p:pic>
     </p:spTree>
     <p:extLst>
       <p:ext uri="{BB962C8B-B14F-4D97-AF65-F5344CB8AC3E}">
-        <p14:creationId xmlns:p14="http://schemas.microsoft.com/office/powerpoint/2010/main" val="452397108"/>
+        <p14:creationId xmlns:p14="http://schemas.microsoft.com/office/powerpoint/2010/main" val="3402220871"/>
       </p:ext>
     </p:extLst>
   </p:cSld>
@@ -18330,13 +18214,7 @@
       </p:grpSpPr>
       <p:sp>
         <p:nvSpPr>
-          <p:cNvPr id="2" name="Content Placeholder 1">
-            <a:extLst>
-              <a:ext uri="{FF2B5EF4-FFF2-40B4-BE49-F238E27FC236}">
-                <a16:creationId xmlns:a16="http://schemas.microsoft.com/office/drawing/2014/main" xmlns="" id="{61284A3C-35C7-47BB-B5EF-3A5AFD39F048}"/>
-              </a:ext>
-            </a:extLst>
-          </p:cNvPr>
+          <p:cNvPr id="2" name="Marcador de Posição de Conteúdo 1"/>
           <p:cNvSpPr>
             <a:spLocks noGrp="1"/>
           </p:cNvSpPr>
@@ -18349,19 +18227,13 @@
           <a:bodyPr/>
           <a:lstStyle/>
           <a:p>
-            <a:endParaRPr lang="pt-PT" dirty="0"/>
+            <a:endParaRPr lang="pt-PT"/>
           </a:p>
         </p:txBody>
       </p:sp>
       <p:sp>
         <p:nvSpPr>
-          <p:cNvPr id="3" name="Content Placeholder 2">
-            <a:extLst>
-              <a:ext uri="{FF2B5EF4-FFF2-40B4-BE49-F238E27FC236}">
-                <a16:creationId xmlns:a16="http://schemas.microsoft.com/office/drawing/2014/main" xmlns="" id="{75B62007-2099-491F-B9CC-679828859075}"/>
-              </a:ext>
-            </a:extLst>
-          </p:cNvPr>
+          <p:cNvPr id="3" name="Marcador de Posição de Conteúdo 2"/>
           <p:cNvSpPr>
             <a:spLocks noGrp="1"/>
           </p:cNvSpPr>
@@ -18374,44 +18246,13 @@
           <a:bodyPr/>
           <a:lstStyle/>
           <a:p>
-            <a:endParaRPr lang="pt-PT" dirty="0"/>
+            <a:endParaRPr lang="pt-PT"/>
           </a:p>
         </p:txBody>
       </p:sp>
       <p:sp>
         <p:nvSpPr>
-          <p:cNvPr id="4" name="Content Placeholder 3">
-            <a:extLst>
-              <a:ext uri="{FF2B5EF4-FFF2-40B4-BE49-F238E27FC236}">
-                <a16:creationId xmlns:a16="http://schemas.microsoft.com/office/drawing/2014/main" xmlns="" id="{B573A8A9-0BDE-4B35-955D-A5C9FAFE6755}"/>
-              </a:ext>
-            </a:extLst>
-          </p:cNvPr>
-          <p:cNvSpPr>
-            <a:spLocks noGrp="1"/>
-          </p:cNvSpPr>
-          <p:nvPr>
-            <p:ph idx="11"/>
-          </p:nvPr>
-        </p:nvSpPr>
-        <p:spPr/>
-        <p:txBody>
-          <a:bodyPr/>
-          <a:lstStyle/>
-          <a:p>
-            <a:endParaRPr lang="pt-PT" dirty="0"/>
-          </a:p>
-        </p:txBody>
-      </p:sp>
-      <p:sp>
-        <p:nvSpPr>
-          <p:cNvPr id="5" name="Content Placeholder 4">
-            <a:extLst>
-              <a:ext uri="{FF2B5EF4-FFF2-40B4-BE49-F238E27FC236}">
-                <a16:creationId xmlns:a16="http://schemas.microsoft.com/office/drawing/2014/main" xmlns="" id="{03F0B0E7-9DC5-4E64-84FC-E41A42350BE1}"/>
-              </a:ext>
-            </a:extLst>
-          </p:cNvPr>
+          <p:cNvPr id="5" name="Marcador de Posição de Conteúdo 4"/>
           <p:cNvSpPr>
             <a:spLocks noGrp="1"/>
           </p:cNvSpPr>
@@ -18424,19 +18265,13 @@
           <a:bodyPr/>
           <a:lstStyle/>
           <a:p>
-            <a:endParaRPr lang="pt-PT" dirty="0"/>
+            <a:endParaRPr lang="pt-PT"/>
           </a:p>
         </p:txBody>
       </p:sp>
       <p:sp>
         <p:nvSpPr>
-          <p:cNvPr id="6" name="Content Placeholder 5">
-            <a:extLst>
-              <a:ext uri="{FF2B5EF4-FFF2-40B4-BE49-F238E27FC236}">
-                <a16:creationId xmlns:a16="http://schemas.microsoft.com/office/drawing/2014/main" xmlns="" id="{AAD76EA7-FFDD-4221-8BFA-2CF2F90A53A9}"/>
-              </a:ext>
-            </a:extLst>
-          </p:cNvPr>
+          <p:cNvPr id="6" name="Marcador de Posição de Conteúdo 5"/>
           <p:cNvSpPr>
             <a:spLocks noGrp="1"/>
           </p:cNvSpPr>
@@ -18451,16 +18286,49 @@
           <a:p>
             <a:r>
               <a:rPr lang="pt-PT" dirty="0" smtClean="0"/>
-              <a:t>Mapa</a:t>
+              <a:t>Artes</a:t>
             </a:r>
             <a:endParaRPr lang="pt-PT" dirty="0"/>
           </a:p>
         </p:txBody>
       </p:sp>
+      <p:pic>
+        <p:nvPicPr>
+          <p:cNvPr id="7" name="Google Shape;218;p21"/>
+          <p:cNvPicPr preferRelativeResize="0">
+            <a:picLocks noGrp="1"/>
+          </p:cNvPicPr>
+          <p:nvPr>
+            <p:ph idx="11"/>
+          </p:nvPr>
+        </p:nvPicPr>
+        <p:blipFill rotWithShape="1">
+          <a:blip r:embed="rId2">
+            <a:alphaModFix/>
+          </a:blip>
+          <a:srcRect/>
+          <a:stretch/>
+        </p:blipFill>
+        <p:spPr>
+          <a:xfrm>
+            <a:off x="1967430" y="684213"/>
+            <a:ext cx="3367639" cy="3194050"/>
+          </a:xfrm>
+          <a:prstGeom prst="rect">
+            <a:avLst/>
+          </a:prstGeom>
+          <a:solidFill>
+            <a:srgbClr val="FBE4D4"/>
+          </a:solidFill>
+          <a:ln>
+            <a:noFill/>
+          </a:ln>
+        </p:spPr>
+      </p:pic>
     </p:spTree>
     <p:extLst>
       <p:ext uri="{BB962C8B-B14F-4D97-AF65-F5344CB8AC3E}">
-        <p14:creationId xmlns:p14="http://schemas.microsoft.com/office/powerpoint/2010/main" val="2701093968"/>
+        <p14:creationId xmlns:p14="http://schemas.microsoft.com/office/powerpoint/2010/main" val="2969093673"/>
       </p:ext>
     </p:extLst>
   </p:cSld>

</xml_diff>